<commit_message>
Updated imagery and text of EBU MXF SDK - EBUCore.docx. More to come...
</commit_message>
<xml_diff>
--- a/doc/EBU MXF SDK - EBUCore - images.pptx
+++ b/doc/EBU MXF SDK - EBUCore - images.pptx
@@ -9,6 +9,7 @@
     <p:sldId id="256" r:id="rId3"/>
     <p:sldId id="257" r:id="rId4"/>
     <p:sldId id="258" r:id="rId5"/>
+    <p:sldId id="259" r:id="rId6"/>
   </p:sldIdLst>
   <p:sldSz cx="9144000" cy="6858000" type="screen4x3"/>
   <p:notesSz cx="6858000" cy="9144000"/>
@@ -291,7 +292,7 @@
           <a:p>
             <a:fld id="{F0AA596B-07FD-418F-9BC7-89A9D7D4BC61}" type="datetimeFigureOut">
               <a:rPr lang="en-GB" smtClean="0"/>
-              <a:t>01/08/2012</a:t>
+              <a:t>03/09/2012</a:t>
             </a:fld>
             <a:endParaRPr lang="en-GB"/>
           </a:p>
@@ -461,7 +462,7 @@
           <a:p>
             <a:fld id="{F0AA596B-07FD-418F-9BC7-89A9D7D4BC61}" type="datetimeFigureOut">
               <a:rPr lang="en-GB" smtClean="0"/>
-              <a:t>01/08/2012</a:t>
+              <a:t>03/09/2012</a:t>
             </a:fld>
             <a:endParaRPr lang="en-GB"/>
           </a:p>
@@ -641,7 +642,7 @@
           <a:p>
             <a:fld id="{F0AA596B-07FD-418F-9BC7-89A9D7D4BC61}" type="datetimeFigureOut">
               <a:rPr lang="en-GB" smtClean="0"/>
-              <a:t>01/08/2012</a:t>
+              <a:t>03/09/2012</a:t>
             </a:fld>
             <a:endParaRPr lang="en-GB"/>
           </a:p>
@@ -910,7 +911,7 @@
                 </a:solidFill>
               </a:rPr>
               <a:pPr/>
-              <a:t>1/08/2012</a:t>
+              <a:t>3/09/2012</a:t>
             </a:fld>
             <a:endParaRPr lang="nl-BE">
               <a:solidFill>
@@ -1208,7 +1209,7 @@
                 </a:solidFill>
               </a:rPr>
               <a:pPr/>
-              <a:t>1/08/2012</a:t>
+              <a:t>3/09/2012</a:t>
             </a:fld>
             <a:endParaRPr lang="nl-BE">
               <a:solidFill>
@@ -1486,7 +1487,7 @@
                 </a:solidFill>
               </a:rPr>
               <a:pPr/>
-              <a:t>1/08/2012</a:t>
+              <a:t>3/09/2012</a:t>
             </a:fld>
             <a:endParaRPr lang="nl-BE">
               <a:solidFill>
@@ -1806,7 +1807,7 @@
                 </a:solidFill>
               </a:rPr>
               <a:pPr/>
-              <a:t>1/08/2012</a:t>
+              <a:t>3/09/2012</a:t>
             </a:fld>
             <a:endParaRPr lang="nl-BE">
               <a:solidFill>
@@ -2260,7 +2261,7 @@
                 </a:solidFill>
               </a:rPr>
               <a:pPr/>
-              <a:t>1/08/2012</a:t>
+              <a:t>3/09/2012</a:t>
             </a:fld>
             <a:endParaRPr lang="nl-BE">
               <a:solidFill>
@@ -2410,7 +2411,7 @@
                 </a:solidFill>
               </a:rPr>
               <a:pPr/>
-              <a:t>1/08/2012</a:t>
+              <a:t>3/09/2012</a:t>
             </a:fld>
             <a:endParaRPr lang="nl-BE">
               <a:solidFill>
@@ -2537,7 +2538,7 @@
                 </a:solidFill>
               </a:rPr>
               <a:pPr/>
-              <a:t>1/08/2012</a:t>
+              <a:t>3/09/2012</a:t>
             </a:fld>
             <a:endParaRPr lang="nl-BE">
               <a:solidFill>
@@ -2846,7 +2847,7 @@
                 </a:solidFill>
               </a:rPr>
               <a:pPr/>
-              <a:t>1/08/2012</a:t>
+              <a:t>3/09/2012</a:t>
             </a:fld>
             <a:endParaRPr lang="nl-BE">
               <a:solidFill>
@@ -3041,7 +3042,7 @@
           <a:p>
             <a:fld id="{F0AA596B-07FD-418F-9BC7-89A9D7D4BC61}" type="datetimeFigureOut">
               <a:rPr lang="en-GB" smtClean="0"/>
-              <a:t>01/08/2012</a:t>
+              <a:t>03/09/2012</a:t>
             </a:fld>
             <a:endParaRPr lang="en-GB"/>
           </a:p>
@@ -3305,7 +3306,7 @@
                 </a:solidFill>
               </a:rPr>
               <a:pPr/>
-              <a:t>1/08/2012</a:t>
+              <a:t>3/09/2012</a:t>
             </a:fld>
             <a:endParaRPr lang="nl-BE">
               <a:solidFill>
@@ -3507,7 +3508,7 @@
                 </a:solidFill>
               </a:rPr>
               <a:pPr/>
-              <a:t>1/08/2012</a:t>
+              <a:t>3/09/2012</a:t>
             </a:fld>
             <a:endParaRPr lang="nl-BE">
               <a:solidFill>
@@ -3719,7 +3720,7 @@
                 </a:solidFill>
               </a:rPr>
               <a:pPr/>
-              <a:t>1/08/2012</a:t>
+              <a:t>3/09/2012</a:t>
             </a:fld>
             <a:endParaRPr lang="nl-BE">
               <a:solidFill>
@@ -3990,7 +3991,7 @@
           <a:p>
             <a:fld id="{F0AA596B-07FD-418F-9BC7-89A9D7D4BC61}" type="datetimeFigureOut">
               <a:rPr lang="en-GB" smtClean="0"/>
-              <a:t>01/08/2012</a:t>
+              <a:t>03/09/2012</a:t>
             </a:fld>
             <a:endParaRPr lang="en-GB"/>
           </a:p>
@@ -4278,7 +4279,7 @@
           <a:p>
             <a:fld id="{F0AA596B-07FD-418F-9BC7-89A9D7D4BC61}" type="datetimeFigureOut">
               <a:rPr lang="en-GB" smtClean="0"/>
-              <a:t>01/08/2012</a:t>
+              <a:t>03/09/2012</a:t>
             </a:fld>
             <a:endParaRPr lang="en-GB"/>
           </a:p>
@@ -4700,7 +4701,7 @@
           <a:p>
             <a:fld id="{F0AA596B-07FD-418F-9BC7-89A9D7D4BC61}" type="datetimeFigureOut">
               <a:rPr lang="en-GB" smtClean="0"/>
-              <a:t>01/08/2012</a:t>
+              <a:t>03/09/2012</a:t>
             </a:fld>
             <a:endParaRPr lang="en-GB"/>
           </a:p>
@@ -4818,7 +4819,7 @@
           <a:p>
             <a:fld id="{F0AA596B-07FD-418F-9BC7-89A9D7D4BC61}" type="datetimeFigureOut">
               <a:rPr lang="en-GB" smtClean="0"/>
-              <a:t>01/08/2012</a:t>
+              <a:t>03/09/2012</a:t>
             </a:fld>
             <a:endParaRPr lang="en-GB"/>
           </a:p>
@@ -4913,7 +4914,7 @@
           <a:p>
             <a:fld id="{F0AA596B-07FD-418F-9BC7-89A9D7D4BC61}" type="datetimeFigureOut">
               <a:rPr lang="en-GB" smtClean="0"/>
-              <a:t>01/08/2012</a:t>
+              <a:t>03/09/2012</a:t>
             </a:fld>
             <a:endParaRPr lang="en-GB"/>
           </a:p>
@@ -5190,7 +5191,7 @@
           <a:p>
             <a:fld id="{F0AA596B-07FD-418F-9BC7-89A9D7D4BC61}" type="datetimeFigureOut">
               <a:rPr lang="en-GB" smtClean="0"/>
-              <a:t>01/08/2012</a:t>
+              <a:t>03/09/2012</a:t>
             </a:fld>
             <a:endParaRPr lang="en-GB"/>
           </a:p>
@@ -5443,7 +5444,7 @@
           <a:p>
             <a:fld id="{F0AA596B-07FD-418F-9BC7-89A9D7D4BC61}" type="datetimeFigureOut">
               <a:rPr lang="en-GB" smtClean="0"/>
-              <a:t>01/08/2012</a:t>
+              <a:t>03/09/2012</a:t>
             </a:fld>
             <a:endParaRPr lang="en-GB"/>
           </a:p>
@@ -5656,7 +5657,7 @@
           <a:p>
             <a:fld id="{F0AA596B-07FD-418F-9BC7-89A9D7D4BC61}" type="datetimeFigureOut">
               <a:rPr lang="en-GB" smtClean="0"/>
-              <a:t>01/08/2012</a:t>
+              <a:t>03/09/2012</a:t>
             </a:fld>
             <a:endParaRPr lang="en-GB"/>
           </a:p>
@@ -6183,7 +6184,7 @@
                 </a:solidFill>
               </a:rPr>
               <a:pPr/>
-              <a:t>1/08/2012</a:t>
+              <a:t>3/09/2012</a:t>
             </a:fld>
             <a:endParaRPr lang="nl-BE">
               <a:solidFill>
@@ -7193,8 +7194,8 @@
         </p:nvSpPr>
         <p:spPr>
           <a:xfrm>
-            <a:off x="3347864" y="2854260"/>
-            <a:ext cx="1129437" cy="756056"/>
+            <a:off x="3347864" y="2852936"/>
+            <a:ext cx="1129437" cy="757380"/>
           </a:xfrm>
           <a:prstGeom prst="rect">
             <a:avLst/>
@@ -7298,7 +7299,7 @@
         <p:spPr>
           <a:xfrm flipV="1">
             <a:off x="4477301" y="3230965"/>
-            <a:ext cx="1297064" cy="1323"/>
+            <a:ext cx="1297064" cy="661"/>
           </a:xfrm>
           <a:prstGeom prst="bentConnector3">
             <a:avLst>
@@ -7381,7 +7382,7 @@
         <p:spPr>
           <a:xfrm>
             <a:off x="3087848" y="3230966"/>
-            <a:ext cx="260016" cy="1322"/>
+            <a:ext cx="260016" cy="660"/>
           </a:xfrm>
           <a:prstGeom prst="bentConnector3">
             <a:avLst>
@@ -8659,8 +8660,8 @@
         </p:nvCxnSpPr>
         <p:spPr>
           <a:xfrm rot="16200000" flipH="1">
-            <a:off x="3754301" y="2695978"/>
-            <a:ext cx="316562" cy="1"/>
+            <a:off x="3754963" y="2695316"/>
+            <a:ext cx="315238" cy="1"/>
           </a:xfrm>
           <a:prstGeom prst="bentConnector3">
             <a:avLst>
@@ -10183,6 +10184,2673 @@
     <p:extLst>
       <p:ext uri="{BB962C8B-B14F-4D97-AF65-F5344CB8AC3E}">
         <p14:creationId xmlns:p14="http://schemas.microsoft.com/office/powerpoint/2010/main" val="257762561"/>
+      </p:ext>
+    </p:extLst>
+  </p:cSld>
+  <p:clrMapOvr>
+    <a:masterClrMapping/>
+  </p:clrMapOvr>
+  <p:timing>
+    <p:tnLst>
+      <p:par>
+        <p:cTn id="1" dur="indefinite" restart="never" nodeType="tmRoot"/>
+      </p:par>
+    </p:tnLst>
+  </p:timing>
+</p:sld>
+</file>
+
+<file path=ppt/slides/slide4.xml><?xml version="1.0" encoding="utf-8"?>
+<p:sld xmlns:a="http://schemas.openxmlformats.org/drawingml/2006/main" xmlns:r="http://schemas.openxmlformats.org/officeDocument/2006/relationships" xmlns:p="http://schemas.openxmlformats.org/presentationml/2006/main">
+  <p:cSld>
+    <p:spTree>
+      <p:nvGrpSpPr>
+        <p:cNvPr id="1" name=""/>
+        <p:cNvGrpSpPr/>
+        <p:nvPr/>
+      </p:nvGrpSpPr>
+      <p:grpSpPr>
+        <a:xfrm>
+          <a:off x="0" y="0"/>
+          <a:ext cx="0" cy="0"/>
+          <a:chOff x="0" y="0"/>
+          <a:chExt cx="0" cy="0"/>
+        </a:xfrm>
+      </p:grpSpPr>
+      <p:sp>
+        <p:nvSpPr>
+          <p:cNvPr id="2" name="Title 1"/>
+          <p:cNvSpPr>
+            <a:spLocks noGrp="1"/>
+          </p:cNvSpPr>
+          <p:nvPr>
+            <p:ph type="title"/>
+          </p:nvPr>
+        </p:nvSpPr>
+        <p:spPr/>
+        <p:txBody>
+          <a:bodyPr>
+            <a:normAutofit/>
+          </a:bodyPr>
+          <a:lstStyle/>
+          <a:p>
+            <a:endParaRPr lang="en-GB" dirty="0"/>
+          </a:p>
+        </p:txBody>
+      </p:sp>
+      <p:sp>
+        <p:nvSpPr>
+          <p:cNvPr id="3" name="Content Placeholder 2"/>
+          <p:cNvSpPr>
+            <a:spLocks noGrp="1"/>
+          </p:cNvSpPr>
+          <p:nvPr>
+            <p:ph idx="1"/>
+          </p:nvPr>
+        </p:nvSpPr>
+        <p:spPr>
+          <a:xfrm>
+            <a:off x="457200" y="1556792"/>
+            <a:ext cx="8229600" cy="4525963"/>
+          </a:xfrm>
+        </p:spPr>
+        <p:txBody>
+          <a:bodyPr/>
+          <a:lstStyle/>
+          <a:p>
+            <a:endParaRPr lang="en-US" dirty="0" smtClean="0"/>
+          </a:p>
+        </p:txBody>
+      </p:sp>
+      <p:sp>
+        <p:nvSpPr>
+          <p:cNvPr id="5" name="Rectangle 4"/>
+          <p:cNvSpPr/>
+          <p:nvPr/>
+        </p:nvSpPr>
+        <p:spPr>
+          <a:xfrm>
+            <a:off x="5884759" y="4037471"/>
+            <a:ext cx="960386" cy="581993"/>
+          </a:xfrm>
+          <a:prstGeom prst="rect">
+            <a:avLst/>
+          </a:prstGeom>
+        </p:spPr>
+        <p:style>
+          <a:lnRef idx="1">
+            <a:schemeClr val="accent3"/>
+          </a:lnRef>
+          <a:fillRef idx="2">
+            <a:schemeClr val="accent3"/>
+          </a:fillRef>
+          <a:effectRef idx="1">
+            <a:schemeClr val="accent3"/>
+          </a:effectRef>
+          <a:fontRef idx="minor">
+            <a:schemeClr val="dk1"/>
+          </a:fontRef>
+        </p:style>
+        <p:txBody>
+          <a:bodyPr rtlCol="0" anchor="ctr"/>
+          <a:lstStyle/>
+          <a:p>
+            <a:pPr algn="ctr"/>
+            <a:r>
+              <a:rPr lang="nl-BE" sz="1200" dirty="0">
+                <a:solidFill>
+                  <a:prstClr val="black"/>
+                </a:solidFill>
+              </a:rPr>
+              <a:t>Compressed</a:t>
+            </a:r>
+            <a:br>
+              <a:rPr lang="nl-BE" sz="1200" dirty="0">
+                <a:solidFill>
+                  <a:prstClr val="black"/>
+                </a:solidFill>
+              </a:rPr>
+            </a:br>
+            <a:r>
+              <a:rPr lang="nl-BE" sz="1200" dirty="0">
+                <a:solidFill>
+                  <a:prstClr val="black"/>
+                </a:solidFill>
+              </a:rPr>
+              <a:t>Video</a:t>
+            </a:r>
+          </a:p>
+          <a:p>
+            <a:pPr algn="ctr"/>
+            <a:r>
+              <a:rPr lang="nl-BE" sz="1200" dirty="0">
+                <a:solidFill>
+                  <a:prstClr val="black"/>
+                </a:solidFill>
+              </a:rPr>
+              <a:t>Frames</a:t>
+            </a:r>
+          </a:p>
+        </p:txBody>
+      </p:sp>
+      <p:sp>
+        <p:nvSpPr>
+          <p:cNvPr id="6" name="Rectangle 5"/>
+          <p:cNvSpPr/>
+          <p:nvPr/>
+        </p:nvSpPr>
+        <p:spPr>
+          <a:xfrm>
+            <a:off x="6093956" y="3935907"/>
+            <a:ext cx="960386" cy="581993"/>
+          </a:xfrm>
+          <a:prstGeom prst="rect">
+            <a:avLst/>
+          </a:prstGeom>
+        </p:spPr>
+        <p:style>
+          <a:lnRef idx="1">
+            <a:schemeClr val="accent3"/>
+          </a:lnRef>
+          <a:fillRef idx="2">
+            <a:schemeClr val="accent3"/>
+          </a:fillRef>
+          <a:effectRef idx="1">
+            <a:schemeClr val="accent3"/>
+          </a:effectRef>
+          <a:fontRef idx="minor">
+            <a:schemeClr val="dk1"/>
+          </a:fontRef>
+        </p:style>
+        <p:txBody>
+          <a:bodyPr rtlCol="0" anchor="ctr"/>
+          <a:lstStyle/>
+          <a:p>
+            <a:pPr algn="ctr"/>
+            <a:r>
+              <a:rPr lang="nl-BE" sz="1200" dirty="0">
+                <a:solidFill>
+                  <a:prstClr val="black"/>
+                </a:solidFill>
+              </a:rPr>
+              <a:t>Compressed</a:t>
+            </a:r>
+            <a:br>
+              <a:rPr lang="nl-BE" sz="1200" dirty="0">
+                <a:solidFill>
+                  <a:prstClr val="black"/>
+                </a:solidFill>
+              </a:rPr>
+            </a:br>
+            <a:r>
+              <a:rPr lang="nl-BE" sz="1200" dirty="0">
+                <a:solidFill>
+                  <a:prstClr val="black"/>
+                </a:solidFill>
+              </a:rPr>
+              <a:t>Video</a:t>
+            </a:r>
+          </a:p>
+          <a:p>
+            <a:pPr algn="ctr"/>
+            <a:r>
+              <a:rPr lang="nl-BE" sz="1200" dirty="0">
+                <a:solidFill>
+                  <a:prstClr val="black"/>
+                </a:solidFill>
+              </a:rPr>
+              <a:t>Frames</a:t>
+            </a:r>
+          </a:p>
+        </p:txBody>
+      </p:sp>
+      <p:sp>
+        <p:nvSpPr>
+          <p:cNvPr id="7" name="Rectangle 6"/>
+          <p:cNvSpPr/>
+          <p:nvPr/>
+        </p:nvSpPr>
+        <p:spPr>
+          <a:xfrm>
+            <a:off x="5884759" y="3182727"/>
+            <a:ext cx="960386" cy="574403"/>
+          </a:xfrm>
+          <a:prstGeom prst="rect">
+            <a:avLst/>
+          </a:prstGeom>
+        </p:spPr>
+        <p:style>
+          <a:lnRef idx="1">
+            <a:schemeClr val="accent3"/>
+          </a:lnRef>
+          <a:fillRef idx="2">
+            <a:schemeClr val="accent3"/>
+          </a:fillRef>
+          <a:effectRef idx="1">
+            <a:schemeClr val="accent3"/>
+          </a:effectRef>
+          <a:fontRef idx="minor">
+            <a:schemeClr val="dk1"/>
+          </a:fontRef>
+        </p:style>
+        <p:txBody>
+          <a:bodyPr rtlCol="0" anchor="ctr"/>
+          <a:lstStyle/>
+          <a:p>
+            <a:pPr algn="ctr"/>
+            <a:r>
+              <a:rPr lang="nl-BE" sz="1200" dirty="0">
+                <a:solidFill>
+                  <a:prstClr val="black"/>
+                </a:solidFill>
+              </a:rPr>
+              <a:t>Compressed</a:t>
+            </a:r>
+            <a:br>
+              <a:rPr lang="nl-BE" sz="1200" dirty="0">
+                <a:solidFill>
+                  <a:prstClr val="black"/>
+                </a:solidFill>
+              </a:rPr>
+            </a:br>
+            <a:r>
+              <a:rPr lang="nl-BE" sz="1200" dirty="0">
+                <a:solidFill>
+                  <a:prstClr val="black"/>
+                </a:solidFill>
+              </a:rPr>
+              <a:t>Audio</a:t>
+            </a:r>
+            <a:br>
+              <a:rPr lang="nl-BE" sz="1200" dirty="0">
+                <a:solidFill>
+                  <a:prstClr val="black"/>
+                </a:solidFill>
+              </a:rPr>
+            </a:br>
+            <a:r>
+              <a:rPr lang="nl-BE" sz="1200" dirty="0">
+                <a:solidFill>
+                  <a:prstClr val="black"/>
+                </a:solidFill>
+              </a:rPr>
+              <a:t>Samples</a:t>
+            </a:r>
+          </a:p>
+        </p:txBody>
+      </p:sp>
+      <p:sp>
+        <p:nvSpPr>
+          <p:cNvPr id="8" name="Rectangle 7"/>
+          <p:cNvSpPr/>
+          <p:nvPr/>
+        </p:nvSpPr>
+        <p:spPr>
+          <a:xfrm>
+            <a:off x="6093956" y="3106750"/>
+            <a:ext cx="960386" cy="574403"/>
+          </a:xfrm>
+          <a:prstGeom prst="rect">
+            <a:avLst/>
+          </a:prstGeom>
+        </p:spPr>
+        <p:style>
+          <a:lnRef idx="1">
+            <a:schemeClr val="accent3"/>
+          </a:lnRef>
+          <a:fillRef idx="2">
+            <a:schemeClr val="accent3"/>
+          </a:fillRef>
+          <a:effectRef idx="1">
+            <a:schemeClr val="accent3"/>
+          </a:effectRef>
+          <a:fontRef idx="minor">
+            <a:schemeClr val="dk1"/>
+          </a:fontRef>
+        </p:style>
+        <p:txBody>
+          <a:bodyPr rtlCol="0" anchor="ctr"/>
+          <a:lstStyle/>
+          <a:p>
+            <a:pPr algn="ctr"/>
+            <a:r>
+              <a:rPr lang="nl-BE" sz="1200" dirty="0">
+                <a:solidFill>
+                  <a:prstClr val="black"/>
+                </a:solidFill>
+              </a:rPr>
+              <a:t>Compressed</a:t>
+            </a:r>
+            <a:br>
+              <a:rPr lang="nl-BE" sz="1200" dirty="0">
+                <a:solidFill>
+                  <a:prstClr val="black"/>
+                </a:solidFill>
+              </a:rPr>
+            </a:br>
+            <a:r>
+              <a:rPr lang="nl-BE" sz="1200" dirty="0">
+                <a:solidFill>
+                  <a:prstClr val="black"/>
+                </a:solidFill>
+              </a:rPr>
+              <a:t>Audio</a:t>
+            </a:r>
+            <a:br>
+              <a:rPr lang="nl-BE" sz="1200" dirty="0">
+                <a:solidFill>
+                  <a:prstClr val="black"/>
+                </a:solidFill>
+              </a:rPr>
+            </a:br>
+            <a:r>
+              <a:rPr lang="nl-BE" sz="1200" dirty="0">
+                <a:solidFill>
+                  <a:prstClr val="black"/>
+                </a:solidFill>
+              </a:rPr>
+              <a:t>Samples</a:t>
+            </a:r>
+          </a:p>
+        </p:txBody>
+      </p:sp>
+      <p:sp>
+        <p:nvSpPr>
+          <p:cNvPr id="10" name="Rectangle 9"/>
+          <p:cNvSpPr/>
+          <p:nvPr/>
+        </p:nvSpPr>
+        <p:spPr>
+          <a:xfrm>
+            <a:off x="2048565" y="2435441"/>
+            <a:ext cx="5763795" cy="3801871"/>
+          </a:xfrm>
+          <a:prstGeom prst="rect">
+            <a:avLst/>
+          </a:prstGeom>
+          <a:ln>
+            <a:prstDash val="dash"/>
+          </a:ln>
+        </p:spPr>
+        <p:style>
+          <a:lnRef idx="1">
+            <a:schemeClr val="accent3"/>
+          </a:lnRef>
+          <a:fillRef idx="2">
+            <a:schemeClr val="accent3"/>
+          </a:fillRef>
+          <a:effectRef idx="1">
+            <a:schemeClr val="accent3"/>
+          </a:effectRef>
+          <a:fontRef idx="minor">
+            <a:schemeClr val="dk1"/>
+          </a:fontRef>
+        </p:style>
+        <p:txBody>
+          <a:bodyPr rtlCol="0" anchor="b"/>
+          <a:lstStyle/>
+          <a:p>
+            <a:pPr algn="ctr"/>
+            <a:r>
+              <a:rPr lang="nl-BE" sz="1600" dirty="0">
+                <a:solidFill>
+                  <a:prstClr val="black"/>
+                </a:solidFill>
+              </a:rPr>
+              <a:t>MXF SDK</a:t>
+            </a:r>
+          </a:p>
+        </p:txBody>
+      </p:sp>
+      <p:sp>
+        <p:nvSpPr>
+          <p:cNvPr id="12" name="Rectangle 11"/>
+          <p:cNvSpPr/>
+          <p:nvPr/>
+        </p:nvSpPr>
+        <p:spPr>
+          <a:xfrm>
+            <a:off x="2339752" y="2780929"/>
+            <a:ext cx="748096" cy="828066"/>
+          </a:xfrm>
+          <a:prstGeom prst="rect">
+            <a:avLst/>
+          </a:prstGeom>
+        </p:spPr>
+        <p:style>
+          <a:lnRef idx="1">
+            <a:schemeClr val="accent3"/>
+          </a:lnRef>
+          <a:fillRef idx="2">
+            <a:schemeClr val="accent3"/>
+          </a:fillRef>
+          <a:effectRef idx="1">
+            <a:schemeClr val="accent3"/>
+          </a:effectRef>
+          <a:fontRef idx="minor">
+            <a:schemeClr val="dk1"/>
+          </a:fontRef>
+        </p:style>
+        <p:txBody>
+          <a:bodyPr rtlCol="0" anchor="ctr"/>
+          <a:lstStyle/>
+          <a:p>
+            <a:pPr algn="ctr"/>
+            <a:r>
+              <a:rPr lang="nl-BE" sz="1000" i="1" dirty="0">
+                <a:solidFill>
+                  <a:prstClr val="black"/>
+                </a:solidFill>
+              </a:rPr>
+              <a:t>EBUCore </a:t>
+            </a:r>
+            <a:r>
+              <a:rPr lang="nl-BE" sz="1000" i="1" dirty="0" smtClean="0">
+                <a:solidFill>
+                  <a:prstClr val="black"/>
+                </a:solidFill>
+              </a:rPr>
+              <a:t>Parser/</a:t>
+            </a:r>
+            <a:br>
+              <a:rPr lang="nl-BE" sz="1000" i="1" dirty="0" smtClean="0">
+                <a:solidFill>
+                  <a:prstClr val="black"/>
+                </a:solidFill>
+              </a:rPr>
+            </a:br>
+            <a:r>
+              <a:rPr lang="nl-BE" sz="1000" i="1" dirty="0" smtClean="0">
+                <a:solidFill>
+                  <a:prstClr val="black"/>
+                </a:solidFill>
+              </a:rPr>
+              <a:t>Writer</a:t>
+            </a:r>
+            <a:endParaRPr lang="nl-BE" sz="1000" i="1" dirty="0">
+              <a:solidFill>
+                <a:prstClr val="black"/>
+              </a:solidFill>
+            </a:endParaRPr>
+          </a:p>
+        </p:txBody>
+      </p:sp>
+      <p:sp>
+        <p:nvSpPr>
+          <p:cNvPr id="15" name="Rectangle 14"/>
+          <p:cNvSpPr/>
+          <p:nvPr/>
+        </p:nvSpPr>
+        <p:spPr>
+          <a:xfrm>
+            <a:off x="2339752" y="3789041"/>
+            <a:ext cx="748096" cy="775461"/>
+          </a:xfrm>
+          <a:prstGeom prst="rect">
+            <a:avLst/>
+          </a:prstGeom>
+        </p:spPr>
+        <p:style>
+          <a:lnRef idx="1">
+            <a:schemeClr val="accent3"/>
+          </a:lnRef>
+          <a:fillRef idx="2">
+            <a:schemeClr val="accent3"/>
+          </a:fillRef>
+          <a:effectRef idx="1">
+            <a:schemeClr val="accent3"/>
+          </a:effectRef>
+          <a:fontRef idx="minor">
+            <a:schemeClr val="dk1"/>
+          </a:fontRef>
+        </p:style>
+        <p:txBody>
+          <a:bodyPr rtlCol="0" anchor="ctr"/>
+          <a:lstStyle/>
+          <a:p>
+            <a:pPr algn="ctr"/>
+            <a:r>
+              <a:rPr lang="nl-BE" sz="1000" i="1" dirty="0">
+                <a:solidFill>
+                  <a:prstClr val="black"/>
+                </a:solidFill>
+              </a:rPr>
+              <a:t>Essence </a:t>
+            </a:r>
+            <a:r>
+              <a:rPr lang="nl-BE" sz="1000" i="1" dirty="0" smtClean="0">
+                <a:solidFill>
+                  <a:prstClr val="black"/>
+                </a:solidFill>
+              </a:rPr>
+              <a:t>Processor/</a:t>
+            </a:r>
+            <a:br>
+              <a:rPr lang="nl-BE" sz="1000" i="1" dirty="0" smtClean="0">
+                <a:solidFill>
+                  <a:prstClr val="black"/>
+                </a:solidFill>
+              </a:rPr>
+            </a:br>
+            <a:r>
+              <a:rPr lang="nl-BE" sz="1000" i="1" dirty="0" smtClean="0">
+                <a:solidFill>
+                  <a:prstClr val="black"/>
+                </a:solidFill>
+              </a:rPr>
+              <a:t>Writer</a:t>
+            </a:r>
+            <a:endParaRPr lang="nl-BE" sz="1000" i="1" dirty="0">
+              <a:solidFill>
+                <a:prstClr val="black"/>
+              </a:solidFill>
+            </a:endParaRPr>
+          </a:p>
+        </p:txBody>
+      </p:sp>
+      <p:sp>
+        <p:nvSpPr>
+          <p:cNvPr id="19" name="Rectangle 18"/>
+          <p:cNvSpPr/>
+          <p:nvPr/>
+        </p:nvSpPr>
+        <p:spPr>
+          <a:xfrm>
+            <a:off x="3347864" y="2783228"/>
+            <a:ext cx="1129437" cy="827088"/>
+          </a:xfrm>
+          <a:prstGeom prst="rect">
+            <a:avLst/>
+          </a:prstGeom>
+        </p:spPr>
+        <p:style>
+          <a:lnRef idx="1">
+            <a:schemeClr val="accent3"/>
+          </a:lnRef>
+          <a:fillRef idx="2">
+            <a:schemeClr val="accent3"/>
+          </a:fillRef>
+          <a:effectRef idx="1">
+            <a:schemeClr val="accent3"/>
+          </a:effectRef>
+          <a:fontRef idx="minor">
+            <a:schemeClr val="dk1"/>
+          </a:fontRef>
+        </p:style>
+        <p:txBody>
+          <a:bodyPr rtlCol="0" anchor="ctr"/>
+          <a:lstStyle/>
+          <a:p>
+            <a:pPr algn="ctr"/>
+            <a:r>
+              <a:rPr lang="nl-BE" sz="1200" dirty="0">
+                <a:solidFill>
+                  <a:prstClr val="black"/>
+                </a:solidFill>
+              </a:rPr>
+              <a:t>Schema-based</a:t>
+            </a:r>
+          </a:p>
+          <a:p>
+            <a:pPr algn="ctr"/>
+            <a:r>
+              <a:rPr lang="nl-BE" sz="1200" dirty="0">
+                <a:solidFill>
+                  <a:prstClr val="black"/>
+                </a:solidFill>
+              </a:rPr>
+              <a:t>EBUCore object model</a:t>
+            </a:r>
+          </a:p>
+        </p:txBody>
+      </p:sp>
+      <p:sp>
+        <p:nvSpPr>
+          <p:cNvPr id="20" name="Rectangle 19"/>
+          <p:cNvSpPr/>
+          <p:nvPr/>
+        </p:nvSpPr>
+        <p:spPr>
+          <a:xfrm>
+            <a:off x="5774365" y="3763405"/>
+            <a:ext cx="1129436" cy="545566"/>
+          </a:xfrm>
+          <a:prstGeom prst="rect">
+            <a:avLst/>
+          </a:prstGeom>
+        </p:spPr>
+        <p:style>
+          <a:lnRef idx="1">
+            <a:schemeClr val="accent3"/>
+          </a:lnRef>
+          <a:fillRef idx="2">
+            <a:schemeClr val="accent3"/>
+          </a:fillRef>
+          <a:effectRef idx="1">
+            <a:schemeClr val="accent3"/>
+          </a:effectRef>
+          <a:fontRef idx="minor">
+            <a:schemeClr val="dk1"/>
+          </a:fontRef>
+        </p:style>
+        <p:txBody>
+          <a:bodyPr rtlCol="0" anchor="ctr"/>
+          <a:lstStyle/>
+          <a:p>
+            <a:pPr algn="ctr"/>
+            <a:r>
+              <a:rPr lang="nl-BE" sz="1200" dirty="0">
+                <a:solidFill>
+                  <a:prstClr val="black"/>
+                </a:solidFill>
+              </a:rPr>
+              <a:t>Structural Metadata</a:t>
+            </a:r>
+          </a:p>
+        </p:txBody>
+      </p:sp>
+      <p:cxnSp>
+        <p:nvCxnSpPr>
+          <p:cNvPr id="24" name="Elbow Connector 23"/>
+          <p:cNvCxnSpPr>
+            <a:stCxn id="19" idx="3"/>
+            <a:endCxn id="109" idx="1"/>
+          </p:cNvCxnSpPr>
+          <p:nvPr/>
+        </p:nvCxnSpPr>
+        <p:spPr>
+          <a:xfrm flipV="1">
+            <a:off x="4477301" y="3194961"/>
+            <a:ext cx="1297064" cy="1811"/>
+          </a:xfrm>
+          <a:prstGeom prst="bentConnector3">
+            <a:avLst>
+              <a:gd name="adj1" fmla="val 50000"/>
+            </a:avLst>
+          </a:prstGeom>
+          <a:ln w="25400">
+            <a:solidFill>
+              <a:schemeClr val="tx1"/>
+            </a:solidFill>
+            <a:headEnd type="arrow" w="med" len="med"/>
+            <a:tailEnd type="arrow" w="med" len="med"/>
+          </a:ln>
+        </p:spPr>
+        <p:style>
+          <a:lnRef idx="1">
+            <a:schemeClr val="accent1"/>
+          </a:lnRef>
+          <a:fillRef idx="0">
+            <a:schemeClr val="accent1"/>
+          </a:fillRef>
+          <a:effectRef idx="0">
+            <a:schemeClr val="accent1"/>
+          </a:effectRef>
+          <a:fontRef idx="minor">
+            <a:schemeClr val="tx1"/>
+          </a:fontRef>
+        </p:style>
+      </p:cxnSp>
+      <p:cxnSp>
+        <p:nvCxnSpPr>
+          <p:cNvPr id="25" name="Elbow Connector 24"/>
+          <p:cNvCxnSpPr>
+            <a:stCxn id="109" idx="3"/>
+          </p:cNvCxnSpPr>
+          <p:nvPr/>
+        </p:nvCxnSpPr>
+        <p:spPr>
+          <a:xfrm>
+            <a:off x="6903802" y="3194961"/>
+            <a:ext cx="267819" cy="37327"/>
+          </a:xfrm>
+          <a:prstGeom prst="bentConnector3">
+            <a:avLst>
+              <a:gd name="adj1" fmla="val 50000"/>
+            </a:avLst>
+          </a:prstGeom>
+          <a:ln w="25400">
+            <a:solidFill>
+              <a:schemeClr val="tx1"/>
+            </a:solidFill>
+            <a:headEnd type="arrow" w="med" len="med"/>
+            <a:tailEnd type="arrow" w="med" len="med"/>
+          </a:ln>
+        </p:spPr>
+        <p:style>
+          <a:lnRef idx="1">
+            <a:schemeClr val="accent1"/>
+          </a:lnRef>
+          <a:fillRef idx="0">
+            <a:schemeClr val="accent1"/>
+          </a:fillRef>
+          <a:effectRef idx="0">
+            <a:schemeClr val="accent1"/>
+          </a:effectRef>
+          <a:fontRef idx="minor">
+            <a:schemeClr val="tx1"/>
+          </a:fontRef>
+        </p:style>
+      </p:cxnSp>
+      <p:cxnSp>
+        <p:nvCxnSpPr>
+          <p:cNvPr id="26" name="Elbow Connector 25"/>
+          <p:cNvCxnSpPr>
+            <a:stCxn id="12" idx="3"/>
+            <a:endCxn id="19" idx="1"/>
+          </p:cNvCxnSpPr>
+          <p:nvPr/>
+        </p:nvCxnSpPr>
+        <p:spPr>
+          <a:xfrm>
+            <a:off x="3087848" y="3194962"/>
+            <a:ext cx="260016" cy="1810"/>
+          </a:xfrm>
+          <a:prstGeom prst="bentConnector3">
+            <a:avLst>
+              <a:gd name="adj1" fmla="val 50000"/>
+            </a:avLst>
+          </a:prstGeom>
+          <a:ln w="25400">
+            <a:solidFill>
+              <a:schemeClr val="tx1"/>
+            </a:solidFill>
+            <a:headEnd type="arrow" w="med" len="med"/>
+            <a:tailEnd type="arrow" w="med" len="med"/>
+          </a:ln>
+        </p:spPr>
+        <p:style>
+          <a:lnRef idx="1">
+            <a:schemeClr val="accent1"/>
+          </a:lnRef>
+          <a:fillRef idx="0">
+            <a:schemeClr val="accent1"/>
+          </a:fillRef>
+          <a:effectRef idx="0">
+            <a:schemeClr val="accent1"/>
+          </a:effectRef>
+          <a:fontRef idx="minor">
+            <a:schemeClr val="tx1"/>
+          </a:fontRef>
+        </p:style>
+      </p:cxnSp>
+      <p:cxnSp>
+        <p:nvCxnSpPr>
+          <p:cNvPr id="27" name="Elbow Connector 26"/>
+          <p:cNvCxnSpPr>
+            <a:stCxn id="15" idx="3"/>
+            <a:endCxn id="20" idx="1"/>
+          </p:cNvCxnSpPr>
+          <p:nvPr/>
+        </p:nvCxnSpPr>
+        <p:spPr>
+          <a:xfrm flipV="1">
+            <a:off x="3087848" y="4036188"/>
+            <a:ext cx="2686517" cy="140584"/>
+          </a:xfrm>
+          <a:prstGeom prst="bentConnector3">
+            <a:avLst>
+              <a:gd name="adj1" fmla="val 75200"/>
+            </a:avLst>
+          </a:prstGeom>
+          <a:ln w="25400">
+            <a:solidFill>
+              <a:schemeClr val="tx1"/>
+            </a:solidFill>
+            <a:headEnd type="arrow" w="med" len="med"/>
+            <a:tailEnd type="arrow" w="med" len="med"/>
+          </a:ln>
+        </p:spPr>
+        <p:style>
+          <a:lnRef idx="1">
+            <a:schemeClr val="accent1"/>
+          </a:lnRef>
+          <a:fillRef idx="0">
+            <a:schemeClr val="accent1"/>
+          </a:fillRef>
+          <a:effectRef idx="0">
+            <a:schemeClr val="accent1"/>
+          </a:effectRef>
+          <a:fontRef idx="minor">
+            <a:schemeClr val="tx1"/>
+          </a:fontRef>
+        </p:style>
+      </p:cxnSp>
+      <p:cxnSp>
+        <p:nvCxnSpPr>
+          <p:cNvPr id="31" name="Elbow Connector 30"/>
+          <p:cNvCxnSpPr>
+            <a:stCxn id="14" idx="3"/>
+            <a:endCxn id="173" idx="2"/>
+          </p:cNvCxnSpPr>
+          <p:nvPr/>
+        </p:nvCxnSpPr>
+        <p:spPr>
+          <a:xfrm>
+            <a:off x="7668344" y="4329101"/>
+            <a:ext cx="360040" cy="40316"/>
+          </a:xfrm>
+          <a:prstGeom prst="bentConnector3">
+            <a:avLst>
+              <a:gd name="adj1" fmla="val 50000"/>
+            </a:avLst>
+          </a:prstGeom>
+          <a:ln w="25400">
+            <a:solidFill>
+              <a:schemeClr val="tx1"/>
+            </a:solidFill>
+            <a:headEnd type="arrow" w="med" len="med"/>
+            <a:tailEnd type="arrow" w="med" len="med"/>
+          </a:ln>
+        </p:spPr>
+        <p:style>
+          <a:lnRef idx="1">
+            <a:schemeClr val="accent1"/>
+          </a:lnRef>
+          <a:fillRef idx="0">
+            <a:schemeClr val="accent1"/>
+          </a:fillRef>
+          <a:effectRef idx="0">
+            <a:schemeClr val="accent1"/>
+          </a:effectRef>
+          <a:fontRef idx="minor">
+            <a:schemeClr val="tx1"/>
+          </a:fontRef>
+        </p:style>
+      </p:cxnSp>
+      <p:cxnSp>
+        <p:nvCxnSpPr>
+          <p:cNvPr id="32" name="Elbow Connector 31"/>
+          <p:cNvCxnSpPr>
+            <a:stCxn id="63" idx="3"/>
+            <a:endCxn id="12" idx="1"/>
+          </p:cNvCxnSpPr>
+          <p:nvPr/>
+        </p:nvCxnSpPr>
+        <p:spPr>
+          <a:xfrm>
+            <a:off x="1560962" y="2908484"/>
+            <a:ext cx="778790" cy="286478"/>
+          </a:xfrm>
+          <a:prstGeom prst="bentConnector3">
+            <a:avLst>
+              <a:gd name="adj1" fmla="val 50000"/>
+            </a:avLst>
+          </a:prstGeom>
+          <a:ln w="25400">
+            <a:solidFill>
+              <a:schemeClr val="tx1"/>
+            </a:solidFill>
+            <a:headEnd type="arrow" w="med" len="med"/>
+            <a:tailEnd type="arrow" w="med" len="med"/>
+          </a:ln>
+        </p:spPr>
+        <p:style>
+          <a:lnRef idx="1">
+            <a:schemeClr val="accent1"/>
+          </a:lnRef>
+          <a:fillRef idx="0">
+            <a:schemeClr val="accent1"/>
+          </a:fillRef>
+          <a:effectRef idx="0">
+            <a:schemeClr val="accent1"/>
+          </a:effectRef>
+          <a:fontRef idx="minor">
+            <a:schemeClr val="tx1"/>
+          </a:fontRef>
+        </p:style>
+      </p:cxnSp>
+      <p:sp>
+        <p:nvSpPr>
+          <p:cNvPr id="36" name="Rectangle 35"/>
+          <p:cNvSpPr/>
+          <p:nvPr/>
+        </p:nvSpPr>
+        <p:spPr>
+          <a:xfrm>
+            <a:off x="769052" y="3964903"/>
+            <a:ext cx="960386" cy="574403"/>
+          </a:xfrm>
+          <a:prstGeom prst="rect">
+            <a:avLst/>
+          </a:prstGeom>
+        </p:spPr>
+        <p:style>
+          <a:lnRef idx="1">
+            <a:schemeClr val="accent3"/>
+          </a:lnRef>
+          <a:fillRef idx="2">
+            <a:schemeClr val="accent3"/>
+          </a:fillRef>
+          <a:effectRef idx="1">
+            <a:schemeClr val="accent3"/>
+          </a:effectRef>
+          <a:fontRef idx="minor">
+            <a:schemeClr val="dk1"/>
+          </a:fontRef>
+        </p:style>
+        <p:txBody>
+          <a:bodyPr rtlCol="0" anchor="ctr"/>
+          <a:lstStyle/>
+          <a:p>
+            <a:pPr algn="ctr"/>
+            <a:endParaRPr lang="nl-BE" sz="1200" dirty="0">
+              <a:solidFill>
+                <a:prstClr val="black"/>
+              </a:solidFill>
+            </a:endParaRPr>
+          </a:p>
+        </p:txBody>
+      </p:sp>
+      <p:sp>
+        <p:nvSpPr>
+          <p:cNvPr id="37" name="Rectangle 36"/>
+          <p:cNvSpPr/>
+          <p:nvPr/>
+        </p:nvSpPr>
+        <p:spPr>
+          <a:xfrm>
+            <a:off x="686439" y="3888926"/>
+            <a:ext cx="960386" cy="574403"/>
+          </a:xfrm>
+          <a:prstGeom prst="rect">
+            <a:avLst/>
+          </a:prstGeom>
+        </p:spPr>
+        <p:style>
+          <a:lnRef idx="1">
+            <a:schemeClr val="accent3"/>
+          </a:lnRef>
+          <a:fillRef idx="2">
+            <a:schemeClr val="accent3"/>
+          </a:fillRef>
+          <a:effectRef idx="1">
+            <a:schemeClr val="accent3"/>
+          </a:effectRef>
+          <a:fontRef idx="minor">
+            <a:schemeClr val="dk1"/>
+          </a:fontRef>
+        </p:style>
+        <p:txBody>
+          <a:bodyPr rtlCol="0" anchor="ctr"/>
+          <a:lstStyle/>
+          <a:p>
+            <a:pPr algn="ctr"/>
+            <a:endParaRPr lang="nl-BE" sz="1200" dirty="0">
+              <a:solidFill>
+                <a:prstClr val="black"/>
+              </a:solidFill>
+            </a:endParaRPr>
+          </a:p>
+        </p:txBody>
+      </p:sp>
+      <p:sp>
+        <p:nvSpPr>
+          <p:cNvPr id="38" name="Rectangle 37"/>
+          <p:cNvSpPr/>
+          <p:nvPr/>
+        </p:nvSpPr>
+        <p:spPr>
+          <a:xfrm>
+            <a:off x="588949" y="3798005"/>
+            <a:ext cx="960386" cy="574403"/>
+          </a:xfrm>
+          <a:prstGeom prst="rect">
+            <a:avLst/>
+          </a:prstGeom>
+        </p:spPr>
+        <p:style>
+          <a:lnRef idx="1">
+            <a:schemeClr val="accent3"/>
+          </a:lnRef>
+          <a:fillRef idx="2">
+            <a:schemeClr val="accent3"/>
+          </a:fillRef>
+          <a:effectRef idx="1">
+            <a:schemeClr val="accent3"/>
+          </a:effectRef>
+          <a:fontRef idx="minor">
+            <a:schemeClr val="dk1"/>
+          </a:fontRef>
+        </p:style>
+        <p:txBody>
+          <a:bodyPr rtlCol="0" anchor="ctr"/>
+          <a:lstStyle/>
+          <a:p>
+            <a:pPr algn="ctr"/>
+            <a:r>
+              <a:rPr lang="nl-BE" sz="1200" dirty="0">
+                <a:solidFill>
+                  <a:prstClr val="black"/>
+                </a:solidFill>
+              </a:rPr>
+              <a:t>Essence</a:t>
+            </a:r>
+          </a:p>
+        </p:txBody>
+      </p:sp>
+      <p:cxnSp>
+        <p:nvCxnSpPr>
+          <p:cNvPr id="42" name="Elbow Connector 41"/>
+          <p:cNvCxnSpPr>
+            <a:stCxn id="37" idx="3"/>
+            <a:endCxn id="15" idx="1"/>
+          </p:cNvCxnSpPr>
+          <p:nvPr/>
+        </p:nvCxnSpPr>
+        <p:spPr>
+          <a:xfrm>
+            <a:off x="1646825" y="4176128"/>
+            <a:ext cx="692927" cy="644"/>
+          </a:xfrm>
+          <a:prstGeom prst="bentConnector3">
+            <a:avLst>
+              <a:gd name="adj1" fmla="val 50000"/>
+            </a:avLst>
+          </a:prstGeom>
+          <a:ln w="25400">
+            <a:solidFill>
+              <a:schemeClr val="tx1"/>
+            </a:solidFill>
+            <a:headEnd type="arrow" w="med" len="med"/>
+            <a:tailEnd type="arrow" w="med" len="med"/>
+          </a:ln>
+        </p:spPr>
+        <p:style>
+          <a:lnRef idx="1">
+            <a:schemeClr val="accent1"/>
+          </a:lnRef>
+          <a:fillRef idx="0">
+            <a:schemeClr val="accent1"/>
+          </a:fillRef>
+          <a:effectRef idx="0">
+            <a:schemeClr val="accent1"/>
+          </a:effectRef>
+          <a:fontRef idx="minor">
+            <a:schemeClr val="tx1"/>
+          </a:fontRef>
+        </p:style>
+      </p:cxnSp>
+      <p:sp>
+        <p:nvSpPr>
+          <p:cNvPr id="55" name="Can 54"/>
+          <p:cNvSpPr/>
+          <p:nvPr/>
+        </p:nvSpPr>
+        <p:spPr>
+          <a:xfrm>
+            <a:off x="712601" y="4663434"/>
+            <a:ext cx="907071" cy="855470"/>
+          </a:xfrm>
+          <a:prstGeom prst="can">
+            <a:avLst/>
+          </a:prstGeom>
+        </p:spPr>
+        <p:style>
+          <a:lnRef idx="1">
+            <a:schemeClr val="accent3"/>
+          </a:lnRef>
+          <a:fillRef idx="2">
+            <a:schemeClr val="accent3"/>
+          </a:fillRef>
+          <a:effectRef idx="1">
+            <a:schemeClr val="accent3"/>
+          </a:effectRef>
+          <a:fontRef idx="minor">
+            <a:schemeClr val="dk1"/>
+          </a:fontRef>
+        </p:style>
+        <p:txBody>
+          <a:bodyPr rtlCol="0" anchor="ctr"/>
+          <a:lstStyle/>
+          <a:p>
+            <a:pPr algn="ctr"/>
+            <a:endParaRPr lang="en-GB">
+              <a:solidFill>
+                <a:prstClr val="black"/>
+              </a:solidFill>
+            </a:endParaRPr>
+          </a:p>
+        </p:txBody>
+      </p:sp>
+      <p:sp>
+        <p:nvSpPr>
+          <p:cNvPr id="56" name="Rectangle 55"/>
+          <p:cNvSpPr/>
+          <p:nvPr/>
+        </p:nvSpPr>
+        <p:spPr>
+          <a:xfrm>
+            <a:off x="821066" y="4756658"/>
+            <a:ext cx="691430" cy="690238"/>
+          </a:xfrm>
+          <a:prstGeom prst="rect">
+            <a:avLst/>
+          </a:prstGeom>
+        </p:spPr>
+        <p:style>
+          <a:lnRef idx="1">
+            <a:schemeClr val="accent3"/>
+          </a:lnRef>
+          <a:fillRef idx="2">
+            <a:schemeClr val="accent3"/>
+          </a:fillRef>
+          <a:effectRef idx="1">
+            <a:schemeClr val="accent3"/>
+          </a:effectRef>
+          <a:fontRef idx="minor">
+            <a:schemeClr val="dk1"/>
+          </a:fontRef>
+        </p:style>
+        <p:txBody>
+          <a:bodyPr rtlCol="0" anchor="ctr"/>
+          <a:lstStyle/>
+          <a:p>
+            <a:pPr algn="ctr"/>
+            <a:endParaRPr lang="nl-BE" sz="1600" dirty="0">
+              <a:solidFill>
+                <a:prstClr val="black"/>
+              </a:solidFill>
+            </a:endParaRPr>
+          </a:p>
+        </p:txBody>
+      </p:sp>
+      <p:sp>
+        <p:nvSpPr>
+          <p:cNvPr id="63" name="Rectangle 62"/>
+          <p:cNvSpPr/>
+          <p:nvPr/>
+        </p:nvSpPr>
+        <p:spPr>
+          <a:xfrm>
+            <a:off x="600576" y="2204864"/>
+            <a:ext cx="960386" cy="1407240"/>
+          </a:xfrm>
+          <a:prstGeom prst="rect">
+            <a:avLst/>
+          </a:prstGeom>
+        </p:spPr>
+        <p:style>
+          <a:lnRef idx="1">
+            <a:schemeClr val="accent3"/>
+          </a:lnRef>
+          <a:fillRef idx="2">
+            <a:schemeClr val="accent3"/>
+          </a:fillRef>
+          <a:effectRef idx="1">
+            <a:schemeClr val="accent3"/>
+          </a:effectRef>
+          <a:fontRef idx="minor">
+            <a:schemeClr val="dk1"/>
+          </a:fontRef>
+        </p:style>
+        <p:txBody>
+          <a:bodyPr rtlCol="0" anchor="b"/>
+          <a:lstStyle/>
+          <a:p>
+            <a:pPr algn="ctr"/>
+            <a:r>
+              <a:rPr lang="nl-BE" sz="1200" dirty="0">
+                <a:solidFill>
+                  <a:prstClr val="black"/>
+                </a:solidFill>
+              </a:rPr>
+              <a:t>EBUCore Document</a:t>
+            </a:r>
+          </a:p>
+        </p:txBody>
+      </p:sp>
+      <p:pic>
+        <p:nvPicPr>
+          <p:cNvPr id="6146" name="Picture 2" descr="C:\Users\dieter\Dropbox\LimecraftDocuments\presentaties\200px-XML.svg.png"/>
+          <p:cNvPicPr>
+            <a:picLocks noChangeAspect="1" noChangeArrowheads="1"/>
+          </p:cNvPicPr>
+          <p:nvPr/>
+        </p:nvPicPr>
+        <p:blipFill>
+          <a:blip r:embed="rId2" cstate="print">
+            <a:extLst>
+              <a:ext uri="{28A0092B-C50C-407E-A947-70E740481C1C}">
+                <a14:useLocalDpi xmlns:a14="http://schemas.microsoft.com/office/drawing/2010/main" val="0"/>
+              </a:ext>
+            </a:extLst>
+          </a:blip>
+          <a:srcRect/>
+          <a:stretch>
+            <a:fillRect/>
+          </a:stretch>
+        </p:blipFill>
+        <p:spPr bwMode="auto">
+          <a:xfrm>
+            <a:off x="686439" y="2333693"/>
+            <a:ext cx="788659" cy="899071"/>
+          </a:xfrm>
+          <a:prstGeom prst="rect">
+            <a:avLst/>
+          </a:prstGeom>
+          <a:noFill/>
+          <a:extLst>
+            <a:ext uri="{909E8E84-426E-40DD-AFC4-6F175D3DCCD1}">
+              <a14:hiddenFill xmlns:a14="http://schemas.microsoft.com/office/drawing/2010/main">
+                <a:solidFill>
+                  <a:srgbClr val="FFFFFF"/>
+                </a:solidFill>
+              </a14:hiddenFill>
+            </a:ext>
+          </a:extLst>
+        </p:spPr>
+      </p:pic>
+      <p:pic>
+        <p:nvPicPr>
+          <p:cNvPr id="64" name="Picture 7" descr="mxflogo"/>
+          <p:cNvPicPr>
+            <a:picLocks noChangeAspect="1" noChangeArrowheads="1"/>
+          </p:cNvPicPr>
+          <p:nvPr/>
+        </p:nvPicPr>
+        <p:blipFill>
+          <a:blip r:embed="rId3"/>
+          <a:srcRect/>
+          <a:stretch>
+            <a:fillRect/>
+          </a:stretch>
+        </p:blipFill>
+        <p:spPr bwMode="auto">
+          <a:xfrm>
+            <a:off x="813361" y="5014848"/>
+            <a:ext cx="705551" cy="163956"/>
+          </a:xfrm>
+          <a:prstGeom prst="rect">
+            <a:avLst/>
+          </a:prstGeom>
+          <a:noFill/>
+        </p:spPr>
+      </p:pic>
+      <p:sp>
+        <p:nvSpPr>
+          <p:cNvPr id="109" name="Rectangle 108"/>
+          <p:cNvSpPr/>
+          <p:nvPr/>
+        </p:nvSpPr>
+        <p:spPr>
+          <a:xfrm>
+            <a:off x="5774365" y="2780928"/>
+            <a:ext cx="1129437" cy="828065"/>
+          </a:xfrm>
+          <a:prstGeom prst="rect">
+            <a:avLst/>
+          </a:prstGeom>
+        </p:spPr>
+        <p:style>
+          <a:lnRef idx="1">
+            <a:schemeClr val="accent3"/>
+          </a:lnRef>
+          <a:fillRef idx="2">
+            <a:schemeClr val="accent3"/>
+          </a:fillRef>
+          <a:effectRef idx="1">
+            <a:schemeClr val="accent3"/>
+          </a:effectRef>
+          <a:fontRef idx="minor">
+            <a:schemeClr val="dk1"/>
+          </a:fontRef>
+        </p:style>
+        <p:txBody>
+          <a:bodyPr rtlCol="0" anchor="ctr"/>
+          <a:lstStyle/>
+          <a:p>
+            <a:pPr algn="ctr"/>
+            <a:r>
+              <a:rPr lang="nl-BE" sz="1200" dirty="0">
+                <a:solidFill>
+                  <a:prstClr val="black"/>
+                </a:solidFill>
+              </a:rPr>
+              <a:t>KLV-based</a:t>
+            </a:r>
+          </a:p>
+          <a:p>
+            <a:pPr algn="ctr"/>
+            <a:r>
+              <a:rPr lang="nl-BE" sz="1200" dirty="0">
+                <a:solidFill>
+                  <a:prstClr val="black"/>
+                </a:solidFill>
+              </a:rPr>
+              <a:t>EBUCore object model</a:t>
+            </a:r>
+          </a:p>
+        </p:txBody>
+      </p:sp>
+      <p:cxnSp>
+        <p:nvCxnSpPr>
+          <p:cNvPr id="118" name="Elbow Connector 117"/>
+          <p:cNvCxnSpPr/>
+          <p:nvPr/>
+        </p:nvCxnSpPr>
+        <p:spPr>
+          <a:xfrm flipV="1">
+            <a:off x="4477301" y="2998276"/>
+            <a:ext cx="1303529" cy="1"/>
+          </a:xfrm>
+          <a:prstGeom prst="bentConnector3">
+            <a:avLst>
+              <a:gd name="adj1" fmla="val 50000"/>
+            </a:avLst>
+          </a:prstGeom>
+          <a:ln w="25400">
+            <a:solidFill>
+              <a:schemeClr val="bg2">
+                <a:lumMod val="75000"/>
+              </a:schemeClr>
+            </a:solidFill>
+            <a:headEnd type="arrow" w="med" len="med"/>
+            <a:tailEnd type="arrow" w="med" len="med"/>
+          </a:ln>
+        </p:spPr>
+        <p:style>
+          <a:lnRef idx="1">
+            <a:schemeClr val="accent1"/>
+          </a:lnRef>
+          <a:fillRef idx="0">
+            <a:schemeClr val="accent1"/>
+          </a:fillRef>
+          <a:effectRef idx="0">
+            <a:schemeClr val="accent1"/>
+          </a:effectRef>
+          <a:fontRef idx="minor">
+            <a:schemeClr val="tx1"/>
+          </a:fontRef>
+        </p:style>
+      </p:cxnSp>
+      <p:cxnSp>
+        <p:nvCxnSpPr>
+          <p:cNvPr id="119" name="Elbow Connector 118"/>
+          <p:cNvCxnSpPr/>
+          <p:nvPr/>
+        </p:nvCxnSpPr>
+        <p:spPr>
+          <a:xfrm flipV="1">
+            <a:off x="4477300" y="3502332"/>
+            <a:ext cx="1297064" cy="1"/>
+          </a:xfrm>
+          <a:prstGeom prst="bentConnector3">
+            <a:avLst>
+              <a:gd name="adj1" fmla="val 50000"/>
+            </a:avLst>
+          </a:prstGeom>
+          <a:ln w="25400">
+            <a:solidFill>
+              <a:schemeClr val="tx1"/>
+            </a:solidFill>
+            <a:headEnd type="arrow" w="med" len="med"/>
+            <a:tailEnd type="arrow" w="med" len="med"/>
+          </a:ln>
+        </p:spPr>
+        <p:style>
+          <a:lnRef idx="1">
+            <a:schemeClr val="accent1"/>
+          </a:lnRef>
+          <a:fillRef idx="0">
+            <a:schemeClr val="accent1"/>
+          </a:fillRef>
+          <a:effectRef idx="0">
+            <a:schemeClr val="accent1"/>
+          </a:effectRef>
+          <a:fontRef idx="minor">
+            <a:schemeClr val="tx1"/>
+          </a:fontRef>
+        </p:style>
+      </p:cxnSp>
+      <p:sp>
+        <p:nvSpPr>
+          <p:cNvPr id="130" name="Rectangle 129"/>
+          <p:cNvSpPr/>
+          <p:nvPr/>
+        </p:nvSpPr>
+        <p:spPr>
+          <a:xfrm>
+            <a:off x="2339752" y="5301209"/>
+            <a:ext cx="748096" cy="756057"/>
+          </a:xfrm>
+          <a:prstGeom prst="rect">
+            <a:avLst/>
+          </a:prstGeom>
+        </p:spPr>
+        <p:style>
+          <a:lnRef idx="1">
+            <a:schemeClr val="accent3"/>
+          </a:lnRef>
+          <a:fillRef idx="2">
+            <a:schemeClr val="accent3"/>
+          </a:fillRef>
+          <a:effectRef idx="1">
+            <a:schemeClr val="accent3"/>
+          </a:effectRef>
+          <a:fontRef idx="minor">
+            <a:schemeClr val="dk1"/>
+          </a:fontRef>
+        </p:style>
+        <p:txBody>
+          <a:bodyPr rtlCol="0" anchor="ctr"/>
+          <a:lstStyle/>
+          <a:p>
+            <a:pPr algn="ctr"/>
+            <a:r>
+              <a:rPr lang="nl-BE" sz="1000" i="1" dirty="0">
+                <a:solidFill>
+                  <a:prstClr val="black"/>
+                </a:solidFill>
+              </a:rPr>
+              <a:t>&lt;&lt;Other metadata parsers&gt;&gt;</a:t>
+            </a:r>
+          </a:p>
+        </p:txBody>
+      </p:sp>
+      <p:sp>
+        <p:nvSpPr>
+          <p:cNvPr id="137" name="Rectangle 136"/>
+          <p:cNvSpPr/>
+          <p:nvPr/>
+        </p:nvSpPr>
+        <p:spPr>
+          <a:xfrm>
+            <a:off x="5780830" y="5301208"/>
+            <a:ext cx="1129436" cy="756058"/>
+          </a:xfrm>
+          <a:prstGeom prst="rect">
+            <a:avLst/>
+          </a:prstGeom>
+        </p:spPr>
+        <p:style>
+          <a:lnRef idx="1">
+            <a:schemeClr val="accent3"/>
+          </a:lnRef>
+          <a:fillRef idx="2">
+            <a:schemeClr val="accent3"/>
+          </a:fillRef>
+          <a:effectRef idx="1">
+            <a:schemeClr val="accent3"/>
+          </a:effectRef>
+          <a:fontRef idx="minor">
+            <a:schemeClr val="dk1"/>
+          </a:fontRef>
+        </p:style>
+        <p:txBody>
+          <a:bodyPr rtlCol="0" anchor="ctr"/>
+          <a:lstStyle/>
+          <a:p>
+            <a:pPr algn="ctr"/>
+            <a:r>
+              <a:rPr lang="nl-BE" sz="1200" dirty="0">
+                <a:solidFill>
+                  <a:prstClr val="black"/>
+                </a:solidFill>
+              </a:rPr>
+              <a:t>Other</a:t>
+            </a:r>
+          </a:p>
+          <a:p>
+            <a:pPr algn="ctr"/>
+            <a:r>
+              <a:rPr lang="nl-BE" sz="1200" dirty="0">
+                <a:solidFill>
+                  <a:prstClr val="black"/>
+                </a:solidFill>
+              </a:rPr>
+              <a:t>KLV-based</a:t>
+            </a:r>
+          </a:p>
+          <a:p>
+            <a:pPr algn="ctr"/>
+            <a:r>
+              <a:rPr lang="nl-BE" sz="1200" dirty="0">
+                <a:solidFill>
+                  <a:prstClr val="black"/>
+                </a:solidFill>
+              </a:rPr>
+              <a:t>metadata</a:t>
+            </a:r>
+          </a:p>
+          <a:p>
+            <a:pPr algn="ctr"/>
+            <a:r>
+              <a:rPr lang="nl-BE" sz="1200" dirty="0">
+                <a:solidFill>
+                  <a:prstClr val="black"/>
+                </a:solidFill>
+              </a:rPr>
+              <a:t>object models</a:t>
+            </a:r>
+          </a:p>
+        </p:txBody>
+      </p:sp>
+      <p:cxnSp>
+        <p:nvCxnSpPr>
+          <p:cNvPr id="147" name="Elbow Connector 146"/>
+          <p:cNvCxnSpPr>
+            <a:stCxn id="20" idx="3"/>
+          </p:cNvCxnSpPr>
+          <p:nvPr/>
+        </p:nvCxnSpPr>
+        <p:spPr>
+          <a:xfrm flipV="1">
+            <a:off x="6903801" y="4034656"/>
+            <a:ext cx="269028" cy="1532"/>
+          </a:xfrm>
+          <a:prstGeom prst="bentConnector3">
+            <a:avLst>
+              <a:gd name="adj1" fmla="val 50000"/>
+            </a:avLst>
+          </a:prstGeom>
+          <a:ln w="25400">
+            <a:solidFill>
+              <a:schemeClr val="tx1"/>
+            </a:solidFill>
+            <a:headEnd type="arrow" w="med" len="med"/>
+            <a:tailEnd type="arrow" w="med" len="med"/>
+          </a:ln>
+        </p:spPr>
+        <p:style>
+          <a:lnRef idx="1">
+            <a:schemeClr val="accent1"/>
+          </a:lnRef>
+          <a:fillRef idx="0">
+            <a:schemeClr val="accent1"/>
+          </a:fillRef>
+          <a:effectRef idx="0">
+            <a:schemeClr val="accent1"/>
+          </a:effectRef>
+          <a:fontRef idx="minor">
+            <a:schemeClr val="tx1"/>
+          </a:fontRef>
+        </p:style>
+      </p:cxnSp>
+      <p:cxnSp>
+        <p:nvCxnSpPr>
+          <p:cNvPr id="150" name="Elbow Connector 149"/>
+          <p:cNvCxnSpPr>
+            <a:stCxn id="137" idx="3"/>
+          </p:cNvCxnSpPr>
+          <p:nvPr/>
+        </p:nvCxnSpPr>
+        <p:spPr>
+          <a:xfrm flipV="1">
+            <a:off x="6910266" y="5677804"/>
+            <a:ext cx="262563" cy="1433"/>
+          </a:xfrm>
+          <a:prstGeom prst="bentConnector3">
+            <a:avLst>
+              <a:gd name="adj1" fmla="val 50000"/>
+            </a:avLst>
+          </a:prstGeom>
+          <a:ln w="25400">
+            <a:solidFill>
+              <a:schemeClr val="tx1"/>
+            </a:solidFill>
+            <a:headEnd type="arrow" w="med" len="med"/>
+            <a:tailEnd type="arrow" w="med" len="med"/>
+          </a:ln>
+        </p:spPr>
+        <p:style>
+          <a:lnRef idx="1">
+            <a:schemeClr val="accent1"/>
+          </a:lnRef>
+          <a:fillRef idx="0">
+            <a:schemeClr val="accent1"/>
+          </a:fillRef>
+          <a:effectRef idx="0">
+            <a:schemeClr val="accent1"/>
+          </a:effectRef>
+          <a:fontRef idx="minor">
+            <a:schemeClr val="tx1"/>
+          </a:fontRef>
+        </p:style>
+      </p:cxnSp>
+      <p:cxnSp>
+        <p:nvCxnSpPr>
+          <p:cNvPr id="156" name="Elbow Connector 155"/>
+          <p:cNvCxnSpPr>
+            <a:stCxn id="130" idx="3"/>
+            <a:endCxn id="137" idx="1"/>
+          </p:cNvCxnSpPr>
+          <p:nvPr/>
+        </p:nvCxnSpPr>
+        <p:spPr>
+          <a:xfrm flipV="1">
+            <a:off x="3087848" y="5679237"/>
+            <a:ext cx="2692982" cy="1"/>
+          </a:xfrm>
+          <a:prstGeom prst="bentConnector3">
+            <a:avLst>
+              <a:gd name="adj1" fmla="val 50000"/>
+            </a:avLst>
+          </a:prstGeom>
+          <a:ln w="25400">
+            <a:solidFill>
+              <a:schemeClr val="tx1"/>
+            </a:solidFill>
+            <a:headEnd type="arrow" w="med" len="med"/>
+            <a:tailEnd type="arrow" w="med" len="med"/>
+          </a:ln>
+        </p:spPr>
+        <p:style>
+          <a:lnRef idx="1">
+            <a:schemeClr val="accent1"/>
+          </a:lnRef>
+          <a:fillRef idx="0">
+            <a:schemeClr val="accent1"/>
+          </a:fillRef>
+          <a:effectRef idx="0">
+            <a:schemeClr val="accent1"/>
+          </a:effectRef>
+          <a:fontRef idx="minor">
+            <a:schemeClr val="tx1"/>
+          </a:fontRef>
+        </p:style>
+      </p:cxnSp>
+      <p:cxnSp>
+        <p:nvCxnSpPr>
+          <p:cNvPr id="161" name="Elbow Connector 160"/>
+          <p:cNvCxnSpPr>
+            <a:stCxn id="55" idx="4"/>
+          </p:cNvCxnSpPr>
+          <p:nvPr/>
+        </p:nvCxnSpPr>
+        <p:spPr>
+          <a:xfrm flipV="1">
+            <a:off x="1619672" y="5090831"/>
+            <a:ext cx="5538366" cy="338"/>
+          </a:xfrm>
+          <a:prstGeom prst="bentConnector3">
+            <a:avLst>
+              <a:gd name="adj1" fmla="val 50000"/>
+            </a:avLst>
+          </a:prstGeom>
+          <a:ln w="25400">
+            <a:solidFill>
+              <a:schemeClr val="tx1"/>
+            </a:solidFill>
+            <a:tailEnd type="arrow"/>
+          </a:ln>
+        </p:spPr>
+        <p:style>
+          <a:lnRef idx="1">
+            <a:schemeClr val="accent1"/>
+          </a:lnRef>
+          <a:fillRef idx="0">
+            <a:schemeClr val="accent1"/>
+          </a:fillRef>
+          <a:effectRef idx="0">
+            <a:schemeClr val="accent1"/>
+          </a:effectRef>
+          <a:fontRef idx="minor">
+            <a:schemeClr val="tx1"/>
+          </a:fontRef>
+        </p:style>
+      </p:cxnSp>
+      <p:sp>
+        <p:nvSpPr>
+          <p:cNvPr id="173" name="Can 172"/>
+          <p:cNvSpPr/>
+          <p:nvPr/>
+        </p:nvSpPr>
+        <p:spPr>
+          <a:xfrm>
+            <a:off x="8028384" y="3941682"/>
+            <a:ext cx="907071" cy="855470"/>
+          </a:xfrm>
+          <a:prstGeom prst="can">
+            <a:avLst/>
+          </a:prstGeom>
+        </p:spPr>
+        <p:style>
+          <a:lnRef idx="1">
+            <a:schemeClr val="accent3"/>
+          </a:lnRef>
+          <a:fillRef idx="2">
+            <a:schemeClr val="accent3"/>
+          </a:fillRef>
+          <a:effectRef idx="1">
+            <a:schemeClr val="accent3"/>
+          </a:effectRef>
+          <a:fontRef idx="minor">
+            <a:schemeClr val="dk1"/>
+          </a:fontRef>
+        </p:style>
+        <p:txBody>
+          <a:bodyPr rtlCol="0" anchor="ctr"/>
+          <a:lstStyle/>
+          <a:p>
+            <a:pPr algn="ctr"/>
+            <a:endParaRPr lang="en-GB">
+              <a:solidFill>
+                <a:prstClr val="black"/>
+              </a:solidFill>
+            </a:endParaRPr>
+          </a:p>
+        </p:txBody>
+      </p:sp>
+      <p:sp>
+        <p:nvSpPr>
+          <p:cNvPr id="174" name="Rectangle 173"/>
+          <p:cNvSpPr/>
+          <p:nvPr/>
+        </p:nvSpPr>
+        <p:spPr>
+          <a:xfrm>
+            <a:off x="8136205" y="4050146"/>
+            <a:ext cx="691430" cy="690238"/>
+          </a:xfrm>
+          <a:prstGeom prst="rect">
+            <a:avLst/>
+          </a:prstGeom>
+        </p:spPr>
+        <p:style>
+          <a:lnRef idx="1">
+            <a:schemeClr val="accent3"/>
+          </a:lnRef>
+          <a:fillRef idx="2">
+            <a:schemeClr val="accent3"/>
+          </a:fillRef>
+          <a:effectRef idx="1">
+            <a:schemeClr val="accent3"/>
+          </a:effectRef>
+          <a:fontRef idx="minor">
+            <a:schemeClr val="dk1"/>
+          </a:fontRef>
+        </p:style>
+        <p:txBody>
+          <a:bodyPr rtlCol="0" anchor="ctr"/>
+          <a:lstStyle/>
+          <a:p>
+            <a:pPr algn="ctr"/>
+            <a:endParaRPr lang="nl-BE" sz="1600" dirty="0">
+              <a:solidFill>
+                <a:prstClr val="black"/>
+              </a:solidFill>
+            </a:endParaRPr>
+          </a:p>
+        </p:txBody>
+      </p:sp>
+      <p:pic>
+        <p:nvPicPr>
+          <p:cNvPr id="175" name="Picture 7" descr="mxflogo"/>
+          <p:cNvPicPr>
+            <a:picLocks noChangeAspect="1" noChangeArrowheads="1"/>
+          </p:cNvPicPr>
+          <p:nvPr/>
+        </p:nvPicPr>
+        <p:blipFill>
+          <a:blip r:embed="rId3"/>
+          <a:srcRect/>
+          <a:stretch>
+            <a:fillRect/>
+          </a:stretch>
+        </p:blipFill>
+        <p:spPr bwMode="auto">
+          <a:xfrm>
+            <a:off x="8134300" y="4308336"/>
+            <a:ext cx="705551" cy="163956"/>
+          </a:xfrm>
+          <a:prstGeom prst="rect">
+            <a:avLst/>
+          </a:prstGeom>
+          <a:noFill/>
+        </p:spPr>
+      </p:pic>
+      <p:cxnSp>
+        <p:nvCxnSpPr>
+          <p:cNvPr id="180" name="Elbow Connector 179"/>
+          <p:cNvCxnSpPr>
+            <a:stCxn id="15" idx="3"/>
+          </p:cNvCxnSpPr>
+          <p:nvPr/>
+        </p:nvCxnSpPr>
+        <p:spPr>
+          <a:xfrm>
+            <a:off x="3087848" y="4176772"/>
+            <a:ext cx="4070190" cy="387730"/>
+          </a:xfrm>
+          <a:prstGeom prst="bentConnector3">
+            <a:avLst>
+              <a:gd name="adj1" fmla="val 50000"/>
+            </a:avLst>
+          </a:prstGeom>
+          <a:ln w="25400">
+            <a:solidFill>
+              <a:schemeClr val="tx1"/>
+            </a:solidFill>
+            <a:headEnd type="arrow" w="med" len="med"/>
+            <a:tailEnd type="arrow" w="med" len="med"/>
+          </a:ln>
+        </p:spPr>
+        <p:style>
+          <a:lnRef idx="1">
+            <a:schemeClr val="accent1"/>
+          </a:lnRef>
+          <a:fillRef idx="0">
+            <a:schemeClr val="accent1"/>
+          </a:fillRef>
+          <a:effectRef idx="0">
+            <a:schemeClr val="accent1"/>
+          </a:effectRef>
+          <a:fontRef idx="minor">
+            <a:schemeClr val="tx1"/>
+          </a:fontRef>
+        </p:style>
+      </p:cxnSp>
+      <p:sp>
+        <p:nvSpPr>
+          <p:cNvPr id="197" name="Rectangle 196"/>
+          <p:cNvSpPr/>
+          <p:nvPr/>
+        </p:nvSpPr>
+        <p:spPr>
+          <a:xfrm>
+            <a:off x="3347864" y="1284962"/>
+            <a:ext cx="1129437" cy="540032"/>
+          </a:xfrm>
+          <a:prstGeom prst="rect">
+            <a:avLst/>
+          </a:prstGeom>
+          <a:ln>
+            <a:solidFill>
+              <a:schemeClr val="bg2">
+                <a:lumMod val="75000"/>
+              </a:schemeClr>
+            </a:solidFill>
+          </a:ln>
+        </p:spPr>
+        <p:style>
+          <a:lnRef idx="1">
+            <a:schemeClr val="accent3"/>
+          </a:lnRef>
+          <a:fillRef idx="2">
+            <a:schemeClr val="accent3"/>
+          </a:fillRef>
+          <a:effectRef idx="1">
+            <a:schemeClr val="accent3"/>
+          </a:effectRef>
+          <a:fontRef idx="minor">
+            <a:schemeClr val="dk1"/>
+          </a:fontRef>
+        </p:style>
+        <p:txBody>
+          <a:bodyPr rtlCol="0" anchor="ctr"/>
+          <a:lstStyle/>
+          <a:p>
+            <a:pPr algn="ctr"/>
+            <a:r>
+              <a:rPr lang="nl-BE" sz="1200" dirty="0">
+                <a:solidFill>
+                  <a:schemeClr val="bg2">
+                    <a:lumMod val="50000"/>
+                  </a:schemeClr>
+                </a:solidFill>
+              </a:rPr>
+              <a:t>EBUCore</a:t>
+            </a:r>
+            <a:br>
+              <a:rPr lang="nl-BE" sz="1200" dirty="0">
+                <a:solidFill>
+                  <a:schemeClr val="bg2">
+                    <a:lumMod val="50000"/>
+                  </a:schemeClr>
+                </a:solidFill>
+              </a:rPr>
+            </a:br>
+            <a:r>
+              <a:rPr lang="nl-BE" sz="1200" dirty="0">
+                <a:solidFill>
+                  <a:schemeClr val="bg2">
+                    <a:lumMod val="50000"/>
+                  </a:schemeClr>
+                </a:solidFill>
+              </a:rPr>
+              <a:t>XML Schema</a:t>
+            </a:r>
+          </a:p>
+        </p:txBody>
+      </p:sp>
+      <p:sp>
+        <p:nvSpPr>
+          <p:cNvPr id="201" name="Rectangle 200"/>
+          <p:cNvSpPr/>
+          <p:nvPr/>
+        </p:nvSpPr>
+        <p:spPr>
+          <a:xfrm>
+            <a:off x="3347864" y="2080268"/>
+            <a:ext cx="1129436" cy="457430"/>
+          </a:xfrm>
+          <a:prstGeom prst="rect">
+            <a:avLst/>
+          </a:prstGeom>
+          <a:ln>
+            <a:solidFill>
+              <a:schemeClr val="bg2">
+                <a:lumMod val="75000"/>
+              </a:schemeClr>
+            </a:solidFill>
+          </a:ln>
+        </p:spPr>
+        <p:style>
+          <a:lnRef idx="1">
+            <a:schemeClr val="accent3"/>
+          </a:lnRef>
+          <a:fillRef idx="2">
+            <a:schemeClr val="accent3"/>
+          </a:fillRef>
+          <a:effectRef idx="1">
+            <a:schemeClr val="accent3"/>
+          </a:effectRef>
+          <a:fontRef idx="minor">
+            <a:schemeClr val="dk1"/>
+          </a:fontRef>
+        </p:style>
+        <p:txBody>
+          <a:bodyPr rtlCol="0" anchor="ctr"/>
+          <a:lstStyle/>
+          <a:p>
+            <a:pPr algn="ctr"/>
+            <a:r>
+              <a:rPr lang="nl-BE" sz="1000" i="1" dirty="0">
+                <a:solidFill>
+                  <a:schemeClr val="bg2">
+                    <a:lumMod val="50000"/>
+                  </a:schemeClr>
+                </a:solidFill>
+              </a:rPr>
+              <a:t>XSD Code Generator</a:t>
+            </a:r>
+          </a:p>
+        </p:txBody>
+      </p:sp>
+      <p:cxnSp>
+        <p:nvCxnSpPr>
+          <p:cNvPr id="202" name="Elbow Connector 201"/>
+          <p:cNvCxnSpPr>
+            <a:stCxn id="197" idx="2"/>
+            <a:endCxn id="201" idx="0"/>
+          </p:cNvCxnSpPr>
+          <p:nvPr/>
+        </p:nvCxnSpPr>
+        <p:spPr>
+          <a:xfrm rot="5400000">
+            <a:off x="3784946" y="1952631"/>
+            <a:ext cx="255274" cy="1"/>
+          </a:xfrm>
+          <a:prstGeom prst="bentConnector3">
+            <a:avLst>
+              <a:gd name="adj1" fmla="val 50000"/>
+            </a:avLst>
+          </a:prstGeom>
+          <a:ln w="25400">
+            <a:solidFill>
+              <a:schemeClr val="bg2">
+                <a:lumMod val="75000"/>
+              </a:schemeClr>
+            </a:solidFill>
+            <a:tailEnd type="arrow"/>
+          </a:ln>
+        </p:spPr>
+        <p:style>
+          <a:lnRef idx="1">
+            <a:schemeClr val="accent1"/>
+          </a:lnRef>
+          <a:fillRef idx="0">
+            <a:schemeClr val="accent1"/>
+          </a:fillRef>
+          <a:effectRef idx="0">
+            <a:schemeClr val="accent1"/>
+          </a:effectRef>
+          <a:fontRef idx="minor">
+            <a:schemeClr val="tx1"/>
+          </a:fontRef>
+        </p:style>
+      </p:cxnSp>
+      <p:cxnSp>
+        <p:nvCxnSpPr>
+          <p:cNvPr id="205" name="Elbow Connector 204"/>
+          <p:cNvCxnSpPr>
+            <a:stCxn id="201" idx="2"/>
+            <a:endCxn id="19" idx="0"/>
+          </p:cNvCxnSpPr>
+          <p:nvPr/>
+        </p:nvCxnSpPr>
+        <p:spPr>
+          <a:xfrm rot="16200000" flipH="1">
+            <a:off x="3789817" y="2660462"/>
+            <a:ext cx="245530" cy="1"/>
+          </a:xfrm>
+          <a:prstGeom prst="bentConnector3">
+            <a:avLst>
+              <a:gd name="adj1" fmla="val 50000"/>
+            </a:avLst>
+          </a:prstGeom>
+          <a:ln w="25400">
+            <a:solidFill>
+              <a:schemeClr val="bg2">
+                <a:lumMod val="75000"/>
+              </a:schemeClr>
+            </a:solidFill>
+            <a:tailEnd type="arrow"/>
+          </a:ln>
+        </p:spPr>
+        <p:style>
+          <a:lnRef idx="1">
+            <a:schemeClr val="accent1"/>
+          </a:lnRef>
+          <a:fillRef idx="0">
+            <a:schemeClr val="accent1"/>
+          </a:fillRef>
+          <a:effectRef idx="0">
+            <a:schemeClr val="accent1"/>
+          </a:effectRef>
+          <a:fontRef idx="minor">
+            <a:schemeClr val="tx1"/>
+          </a:fontRef>
+        </p:style>
+      </p:cxnSp>
+      <p:sp>
+        <p:nvSpPr>
+          <p:cNvPr id="212" name="Rectangle 211"/>
+          <p:cNvSpPr/>
+          <p:nvPr/>
+        </p:nvSpPr>
+        <p:spPr>
+          <a:xfrm>
+            <a:off x="5774364" y="1284962"/>
+            <a:ext cx="1129437" cy="540032"/>
+          </a:xfrm>
+          <a:prstGeom prst="rect">
+            <a:avLst/>
+          </a:prstGeom>
+          <a:ln>
+            <a:solidFill>
+              <a:schemeClr val="bg2">
+                <a:lumMod val="75000"/>
+              </a:schemeClr>
+            </a:solidFill>
+          </a:ln>
+        </p:spPr>
+        <p:style>
+          <a:lnRef idx="1">
+            <a:schemeClr val="accent3"/>
+          </a:lnRef>
+          <a:fillRef idx="2">
+            <a:schemeClr val="accent3"/>
+          </a:fillRef>
+          <a:effectRef idx="1">
+            <a:schemeClr val="accent3"/>
+          </a:effectRef>
+          <a:fontRef idx="minor">
+            <a:schemeClr val="dk1"/>
+          </a:fontRef>
+        </p:style>
+        <p:txBody>
+          <a:bodyPr rtlCol="0" anchor="ctr"/>
+          <a:lstStyle/>
+          <a:p>
+            <a:pPr algn="ctr"/>
+            <a:r>
+              <a:rPr lang="nl-BE" sz="1200" dirty="0">
+                <a:solidFill>
+                  <a:schemeClr val="bg2">
+                    <a:lumMod val="50000"/>
+                  </a:schemeClr>
+                </a:solidFill>
+              </a:rPr>
+              <a:t>EBUCore</a:t>
+            </a:r>
+            <a:br>
+              <a:rPr lang="nl-BE" sz="1200" dirty="0">
+                <a:solidFill>
+                  <a:schemeClr val="bg2">
+                    <a:lumMod val="50000"/>
+                  </a:schemeClr>
+                </a:solidFill>
+              </a:rPr>
+            </a:br>
+            <a:r>
+              <a:rPr lang="nl-BE" sz="1200" dirty="0">
+                <a:solidFill>
+                  <a:schemeClr val="bg2">
+                    <a:lumMod val="50000"/>
+                  </a:schemeClr>
+                </a:solidFill>
+              </a:rPr>
+              <a:t>KLV Dictionary</a:t>
+            </a:r>
+          </a:p>
+        </p:txBody>
+      </p:sp>
+      <p:sp>
+        <p:nvSpPr>
+          <p:cNvPr id="214" name="Rectangle 213"/>
+          <p:cNvSpPr/>
+          <p:nvPr/>
+        </p:nvSpPr>
+        <p:spPr>
+          <a:xfrm>
+            <a:off x="5774364" y="2080268"/>
+            <a:ext cx="1129436" cy="457430"/>
+          </a:xfrm>
+          <a:prstGeom prst="rect">
+            <a:avLst/>
+          </a:prstGeom>
+          <a:ln>
+            <a:solidFill>
+              <a:schemeClr val="bg2">
+                <a:lumMod val="75000"/>
+              </a:schemeClr>
+            </a:solidFill>
+          </a:ln>
+        </p:spPr>
+        <p:style>
+          <a:lnRef idx="1">
+            <a:schemeClr val="accent3"/>
+          </a:lnRef>
+          <a:fillRef idx="2">
+            <a:schemeClr val="accent3"/>
+          </a:fillRef>
+          <a:effectRef idx="1">
+            <a:schemeClr val="accent3"/>
+          </a:effectRef>
+          <a:fontRef idx="minor">
+            <a:schemeClr val="dk1"/>
+          </a:fontRef>
+        </p:style>
+        <p:txBody>
+          <a:bodyPr rtlCol="0" anchor="ctr"/>
+          <a:lstStyle/>
+          <a:p>
+            <a:pPr algn="ctr"/>
+            <a:r>
+              <a:rPr lang="nl-BE" sz="1000" i="1" dirty="0">
+                <a:solidFill>
+                  <a:schemeClr val="bg2">
+                    <a:lumMod val="50000"/>
+                  </a:schemeClr>
+                </a:solidFill>
+              </a:rPr>
+              <a:t>gen_classes</a:t>
+            </a:r>
+            <a:br>
+              <a:rPr lang="nl-BE" sz="1000" i="1" dirty="0">
+                <a:solidFill>
+                  <a:schemeClr val="bg2">
+                    <a:lumMod val="50000"/>
+                  </a:schemeClr>
+                </a:solidFill>
+              </a:rPr>
+            </a:br>
+            <a:r>
+              <a:rPr lang="nl-BE" sz="1000" i="1" dirty="0">
+                <a:solidFill>
+                  <a:schemeClr val="bg2">
+                    <a:lumMod val="50000"/>
+                  </a:schemeClr>
+                </a:solidFill>
+              </a:rPr>
+              <a:t>Code Generator</a:t>
+            </a:r>
+          </a:p>
+        </p:txBody>
+      </p:sp>
+      <p:cxnSp>
+        <p:nvCxnSpPr>
+          <p:cNvPr id="216" name="Elbow Connector 215"/>
+          <p:cNvCxnSpPr>
+            <a:stCxn id="214" idx="2"/>
+            <a:endCxn id="109" idx="0"/>
+          </p:cNvCxnSpPr>
+          <p:nvPr/>
+        </p:nvCxnSpPr>
+        <p:spPr>
+          <a:xfrm rot="16200000" flipH="1">
+            <a:off x="6217468" y="2659312"/>
+            <a:ext cx="243230" cy="2"/>
+          </a:xfrm>
+          <a:prstGeom prst="bentConnector3">
+            <a:avLst>
+              <a:gd name="adj1" fmla="val 50000"/>
+            </a:avLst>
+          </a:prstGeom>
+          <a:ln w="25400">
+            <a:solidFill>
+              <a:schemeClr val="bg2">
+                <a:lumMod val="75000"/>
+              </a:schemeClr>
+            </a:solidFill>
+            <a:tailEnd type="arrow"/>
+          </a:ln>
+        </p:spPr>
+        <p:style>
+          <a:lnRef idx="1">
+            <a:schemeClr val="accent1"/>
+          </a:lnRef>
+          <a:fillRef idx="0">
+            <a:schemeClr val="accent1"/>
+          </a:fillRef>
+          <a:effectRef idx="0">
+            <a:schemeClr val="accent1"/>
+          </a:effectRef>
+          <a:fontRef idx="minor">
+            <a:schemeClr val="tx1"/>
+          </a:fontRef>
+        </p:style>
+      </p:cxnSp>
+      <p:cxnSp>
+        <p:nvCxnSpPr>
+          <p:cNvPr id="219" name="Elbow Connector 218"/>
+          <p:cNvCxnSpPr>
+            <a:stCxn id="212" idx="2"/>
+            <a:endCxn id="214" idx="0"/>
+          </p:cNvCxnSpPr>
+          <p:nvPr/>
+        </p:nvCxnSpPr>
+        <p:spPr>
+          <a:xfrm rot="5400000">
+            <a:off x="6211446" y="1952631"/>
+            <a:ext cx="255274" cy="1"/>
+          </a:xfrm>
+          <a:prstGeom prst="bentConnector3">
+            <a:avLst>
+              <a:gd name="adj1" fmla="val 50000"/>
+            </a:avLst>
+          </a:prstGeom>
+          <a:ln w="25400">
+            <a:solidFill>
+              <a:schemeClr val="bg2">
+                <a:lumMod val="75000"/>
+              </a:schemeClr>
+            </a:solidFill>
+            <a:tailEnd type="arrow"/>
+          </a:ln>
+        </p:spPr>
+        <p:style>
+          <a:lnRef idx="1">
+            <a:schemeClr val="accent1"/>
+          </a:lnRef>
+          <a:fillRef idx="0">
+            <a:schemeClr val="accent1"/>
+          </a:fillRef>
+          <a:effectRef idx="0">
+            <a:schemeClr val="accent1"/>
+          </a:effectRef>
+          <a:fontRef idx="minor">
+            <a:schemeClr val="tx1"/>
+          </a:fontRef>
+        </p:style>
+      </p:cxnSp>
+      <p:sp>
+        <p:nvSpPr>
+          <p:cNvPr id="53" name="Rectangle 52"/>
+          <p:cNvSpPr/>
+          <p:nvPr/>
+        </p:nvSpPr>
+        <p:spPr>
+          <a:xfrm>
+            <a:off x="4716016" y="2780930"/>
+            <a:ext cx="834932" cy="838998"/>
+          </a:xfrm>
+          <a:prstGeom prst="rect">
+            <a:avLst/>
+          </a:prstGeom>
+        </p:spPr>
+        <p:style>
+          <a:lnRef idx="1">
+            <a:schemeClr val="accent3"/>
+          </a:lnRef>
+          <a:fillRef idx="2">
+            <a:schemeClr val="accent3"/>
+          </a:fillRef>
+          <a:effectRef idx="1">
+            <a:schemeClr val="accent3"/>
+          </a:effectRef>
+          <a:fontRef idx="minor">
+            <a:schemeClr val="dk1"/>
+          </a:fontRef>
+        </p:style>
+        <p:txBody>
+          <a:bodyPr rtlCol="0" anchor="ctr"/>
+          <a:lstStyle/>
+          <a:p>
+            <a:pPr algn="ctr"/>
+            <a:r>
+              <a:rPr lang="nl-BE" sz="1000" i="1" dirty="0">
+                <a:solidFill>
+                  <a:prstClr val="black"/>
+                </a:solidFill>
+              </a:rPr>
+              <a:t>Bi-directional mapping</a:t>
+            </a:r>
+          </a:p>
+        </p:txBody>
+      </p:sp>
+      <p:cxnSp>
+        <p:nvCxnSpPr>
+          <p:cNvPr id="16" name="Straight Connector 15"/>
+          <p:cNvCxnSpPr/>
+          <p:nvPr/>
+        </p:nvCxnSpPr>
+        <p:spPr>
+          <a:xfrm>
+            <a:off x="2048565" y="3707980"/>
+            <a:ext cx="5763795" cy="0"/>
+          </a:xfrm>
+          <a:prstGeom prst="line">
+            <a:avLst/>
+          </a:prstGeom>
+          <a:ln>
+            <a:solidFill>
+              <a:schemeClr val="tx1"/>
+            </a:solidFill>
+            <a:prstDash val="dash"/>
+          </a:ln>
+        </p:spPr>
+        <p:style>
+          <a:lnRef idx="1">
+            <a:schemeClr val="accent1"/>
+          </a:lnRef>
+          <a:fillRef idx="0">
+            <a:schemeClr val="accent1"/>
+          </a:fillRef>
+          <a:effectRef idx="0">
+            <a:schemeClr val="accent1"/>
+          </a:effectRef>
+          <a:fontRef idx="minor">
+            <a:schemeClr val="tx1"/>
+          </a:fontRef>
+        </p:style>
+      </p:cxnSp>
+      <p:cxnSp>
+        <p:nvCxnSpPr>
+          <p:cNvPr id="57" name="Straight Connector 56"/>
+          <p:cNvCxnSpPr/>
+          <p:nvPr/>
+        </p:nvCxnSpPr>
+        <p:spPr>
+          <a:xfrm>
+            <a:off x="2048565" y="4833412"/>
+            <a:ext cx="5763795" cy="0"/>
+          </a:xfrm>
+          <a:prstGeom prst="line">
+            <a:avLst/>
+          </a:prstGeom>
+          <a:ln>
+            <a:solidFill>
+              <a:schemeClr val="tx1"/>
+            </a:solidFill>
+            <a:prstDash val="dash"/>
+          </a:ln>
+        </p:spPr>
+        <p:style>
+          <a:lnRef idx="1">
+            <a:schemeClr val="accent1"/>
+          </a:lnRef>
+          <a:fillRef idx="0">
+            <a:schemeClr val="accent1"/>
+          </a:fillRef>
+          <a:effectRef idx="0">
+            <a:schemeClr val="accent1"/>
+          </a:effectRef>
+          <a:fontRef idx="minor">
+            <a:schemeClr val="tx1"/>
+          </a:fontRef>
+        </p:style>
+      </p:cxnSp>
+      <p:cxnSp>
+        <p:nvCxnSpPr>
+          <p:cNvPr id="58" name="Straight Connector 57"/>
+          <p:cNvCxnSpPr/>
+          <p:nvPr/>
+        </p:nvCxnSpPr>
+        <p:spPr>
+          <a:xfrm>
+            <a:off x="2048564" y="5246783"/>
+            <a:ext cx="5763795" cy="0"/>
+          </a:xfrm>
+          <a:prstGeom prst="line">
+            <a:avLst/>
+          </a:prstGeom>
+          <a:ln>
+            <a:solidFill>
+              <a:schemeClr val="tx1"/>
+            </a:solidFill>
+            <a:prstDash val="dash"/>
+          </a:ln>
+        </p:spPr>
+        <p:style>
+          <a:lnRef idx="1">
+            <a:schemeClr val="accent1"/>
+          </a:lnRef>
+          <a:fillRef idx="0">
+            <a:schemeClr val="accent1"/>
+          </a:fillRef>
+          <a:effectRef idx="0">
+            <a:schemeClr val="accent1"/>
+          </a:effectRef>
+          <a:fontRef idx="minor">
+            <a:schemeClr val="tx1"/>
+          </a:fontRef>
+        </p:style>
+      </p:cxnSp>
+      <p:sp>
+        <p:nvSpPr>
+          <p:cNvPr id="39" name="TextBox 38"/>
+          <p:cNvSpPr txBox="1"/>
+          <p:nvPr/>
+        </p:nvSpPr>
+        <p:spPr>
+          <a:xfrm>
+            <a:off x="2779420" y="2716540"/>
+            <a:ext cx="421064" cy="369332"/>
+          </a:xfrm>
+          <a:prstGeom prst="rect">
+            <a:avLst/>
+          </a:prstGeom>
+          <a:noFill/>
+        </p:spPr>
+        <p:txBody>
+          <a:bodyPr wrap="square" rtlCol="0">
+            <a:spAutoFit/>
+          </a:bodyPr>
+          <a:lstStyle/>
+          <a:p>
+            <a:r>
+              <a:rPr lang="en-GB" dirty="0" smtClean="0">
+                <a:sym typeface="Wingdings"/>
+              </a:rPr>
+              <a:t></a:t>
+            </a:r>
+            <a:endParaRPr lang="en-GB" dirty="0"/>
+          </a:p>
+        </p:txBody>
+      </p:sp>
+      <p:sp>
+        <p:nvSpPr>
+          <p:cNvPr id="70" name="TextBox 69"/>
+          <p:cNvSpPr txBox="1"/>
+          <p:nvPr/>
+        </p:nvSpPr>
+        <p:spPr>
+          <a:xfrm>
+            <a:off x="4167004" y="2710365"/>
+            <a:ext cx="421064" cy="335756"/>
+          </a:xfrm>
+          <a:prstGeom prst="rect">
+            <a:avLst/>
+          </a:prstGeom>
+          <a:noFill/>
+        </p:spPr>
+        <p:txBody>
+          <a:bodyPr wrap="square" rtlCol="0">
+            <a:spAutoFit/>
+          </a:bodyPr>
+          <a:lstStyle/>
+          <a:p>
+            <a:r>
+              <a:rPr lang="en-GB" dirty="0" smtClean="0">
+                <a:sym typeface="Wingdings"/>
+              </a:rPr>
+              <a:t></a:t>
+            </a:r>
+            <a:endParaRPr lang="en-GB" dirty="0"/>
+          </a:p>
+        </p:txBody>
+      </p:sp>
+      <p:sp>
+        <p:nvSpPr>
+          <p:cNvPr id="71" name="TextBox 70"/>
+          <p:cNvSpPr txBox="1"/>
+          <p:nvPr/>
+        </p:nvSpPr>
+        <p:spPr>
+          <a:xfrm>
+            <a:off x="5242932" y="2714537"/>
+            <a:ext cx="421064" cy="369332"/>
+          </a:xfrm>
+          <a:prstGeom prst="rect">
+            <a:avLst/>
+          </a:prstGeom>
+          <a:noFill/>
+        </p:spPr>
+        <p:txBody>
+          <a:bodyPr wrap="square" rtlCol="0">
+            <a:spAutoFit/>
+          </a:bodyPr>
+          <a:lstStyle/>
+          <a:p>
+            <a:r>
+              <a:rPr lang="en-GB" dirty="0" smtClean="0">
+                <a:sym typeface="Wingdings"/>
+              </a:rPr>
+              <a:t></a:t>
+            </a:r>
+            <a:endParaRPr lang="en-GB" dirty="0"/>
+          </a:p>
+        </p:txBody>
+      </p:sp>
+      <p:sp>
+        <p:nvSpPr>
+          <p:cNvPr id="40" name="Rectangle 39"/>
+          <p:cNvSpPr/>
+          <p:nvPr/>
+        </p:nvSpPr>
+        <p:spPr>
+          <a:xfrm>
+            <a:off x="6588292" y="2708920"/>
+            <a:ext cx="389850" cy="369332"/>
+          </a:xfrm>
+          <a:prstGeom prst="rect">
+            <a:avLst/>
+          </a:prstGeom>
+        </p:spPr>
+        <p:txBody>
+          <a:bodyPr wrap="none">
+            <a:spAutoFit/>
+          </a:bodyPr>
+          <a:lstStyle/>
+          <a:p>
+            <a:r>
+              <a:rPr lang="en-GB" dirty="0">
+                <a:sym typeface="Wingdings"/>
+              </a:rPr>
+              <a:t></a:t>
+            </a:r>
+            <a:endParaRPr lang="en-GB" dirty="0"/>
+          </a:p>
+        </p:txBody>
+      </p:sp>
+      <p:sp>
+        <p:nvSpPr>
+          <p:cNvPr id="14" name="Rectangle 13"/>
+          <p:cNvSpPr/>
+          <p:nvPr/>
+        </p:nvSpPr>
+        <p:spPr>
+          <a:xfrm>
+            <a:off x="7163101" y="2780930"/>
+            <a:ext cx="505243" cy="3096341"/>
+          </a:xfrm>
+          <a:prstGeom prst="rect">
+            <a:avLst/>
+          </a:prstGeom>
+        </p:spPr>
+        <p:style>
+          <a:lnRef idx="1">
+            <a:schemeClr val="accent3"/>
+          </a:lnRef>
+          <a:fillRef idx="2">
+            <a:schemeClr val="accent3"/>
+          </a:fillRef>
+          <a:effectRef idx="1">
+            <a:schemeClr val="accent3"/>
+          </a:effectRef>
+          <a:fontRef idx="minor">
+            <a:schemeClr val="dk1"/>
+          </a:fontRef>
+        </p:style>
+        <p:txBody>
+          <a:bodyPr rtlCol="0" anchor="ctr"/>
+          <a:lstStyle/>
+          <a:p>
+            <a:pPr algn="ctr"/>
+            <a:r>
+              <a:rPr lang="nl-BE" sz="1000" i="1" dirty="0" smtClean="0">
+                <a:solidFill>
+                  <a:prstClr val="black"/>
+                </a:solidFill>
+              </a:rPr>
+              <a:t>(DE)MUX</a:t>
+            </a:r>
+            <a:endParaRPr lang="nl-BE" sz="1000" i="1" dirty="0">
+              <a:solidFill>
+                <a:prstClr val="black"/>
+              </a:solidFill>
+            </a:endParaRPr>
+          </a:p>
+        </p:txBody>
+      </p:sp>
+      <p:sp>
+        <p:nvSpPr>
+          <p:cNvPr id="68" name="Rectangle 67"/>
+          <p:cNvSpPr/>
+          <p:nvPr/>
+        </p:nvSpPr>
+        <p:spPr>
+          <a:xfrm>
+            <a:off x="7339552" y="2730108"/>
+            <a:ext cx="389850" cy="369332"/>
+          </a:xfrm>
+          <a:prstGeom prst="rect">
+            <a:avLst/>
+          </a:prstGeom>
+        </p:spPr>
+        <p:txBody>
+          <a:bodyPr wrap="none">
+            <a:spAutoFit/>
+          </a:bodyPr>
+          <a:lstStyle/>
+          <a:p>
+            <a:r>
+              <a:rPr lang="en-GB" dirty="0" smtClean="0">
+                <a:sym typeface="Wingdings"/>
+              </a:rPr>
+              <a:t></a:t>
+            </a:r>
+            <a:endParaRPr lang="en-GB" dirty="0"/>
+          </a:p>
+        </p:txBody>
+      </p:sp>
+    </p:spTree>
+    <p:extLst>
+      <p:ext uri="{BB962C8B-B14F-4D97-AF65-F5344CB8AC3E}">
+        <p14:creationId xmlns:p14="http://schemas.microsoft.com/office/powerpoint/2010/main" val="3919821125"/>
       </p:ext>
     </p:extLst>
   </p:cSld>

</xml_diff>

<commit_message>
Updated high-level documentation with info about various serialization methods, breakdown of code files, and regeneration of code from XML Schema and MXF dictionary.
</commit_message>
<xml_diff>
--- a/doc/EBU MXF SDK - EBUCore - images.pptx
+++ b/doc/EBU MXF SDK - EBUCore - images.pptx
@@ -9,7 +9,8 @@
     <p:sldId id="256" r:id="rId3"/>
     <p:sldId id="257" r:id="rId4"/>
     <p:sldId id="258" r:id="rId5"/>
-    <p:sldId id="259" r:id="rId6"/>
+    <p:sldId id="260" r:id="rId6"/>
+    <p:sldId id="259" r:id="rId7"/>
   </p:sldIdLst>
   <p:sldSz cx="9144000" cy="6858000" type="screen4x3"/>
   <p:notesSz cx="6858000" cy="9144000"/>
@@ -292,7 +293,7 @@
           <a:p>
             <a:fld id="{F0AA596B-07FD-418F-9BC7-89A9D7D4BC61}" type="datetimeFigureOut">
               <a:rPr lang="en-GB" smtClean="0"/>
-              <a:t>03/09/2012</a:t>
+              <a:t>11/09/2012</a:t>
             </a:fld>
             <a:endParaRPr lang="en-GB"/>
           </a:p>
@@ -462,7 +463,7 @@
           <a:p>
             <a:fld id="{F0AA596B-07FD-418F-9BC7-89A9D7D4BC61}" type="datetimeFigureOut">
               <a:rPr lang="en-GB" smtClean="0"/>
-              <a:t>03/09/2012</a:t>
+              <a:t>11/09/2012</a:t>
             </a:fld>
             <a:endParaRPr lang="en-GB"/>
           </a:p>
@@ -642,7 +643,7 @@
           <a:p>
             <a:fld id="{F0AA596B-07FD-418F-9BC7-89A9D7D4BC61}" type="datetimeFigureOut">
               <a:rPr lang="en-GB" smtClean="0"/>
-              <a:t>03/09/2012</a:t>
+              <a:t>11/09/2012</a:t>
             </a:fld>
             <a:endParaRPr lang="en-GB"/>
           </a:p>
@@ -911,7 +912,7 @@
                 </a:solidFill>
               </a:rPr>
               <a:pPr/>
-              <a:t>3/09/2012</a:t>
+              <a:t>11/09/2012</a:t>
             </a:fld>
             <a:endParaRPr lang="nl-BE">
               <a:solidFill>
@@ -1209,7 +1210,7 @@
                 </a:solidFill>
               </a:rPr>
               <a:pPr/>
-              <a:t>3/09/2012</a:t>
+              <a:t>11/09/2012</a:t>
             </a:fld>
             <a:endParaRPr lang="nl-BE">
               <a:solidFill>
@@ -1487,7 +1488,7 @@
                 </a:solidFill>
               </a:rPr>
               <a:pPr/>
-              <a:t>3/09/2012</a:t>
+              <a:t>11/09/2012</a:t>
             </a:fld>
             <a:endParaRPr lang="nl-BE">
               <a:solidFill>
@@ -1807,7 +1808,7 @@
                 </a:solidFill>
               </a:rPr>
               <a:pPr/>
-              <a:t>3/09/2012</a:t>
+              <a:t>11/09/2012</a:t>
             </a:fld>
             <a:endParaRPr lang="nl-BE">
               <a:solidFill>
@@ -2261,7 +2262,7 @@
                 </a:solidFill>
               </a:rPr>
               <a:pPr/>
-              <a:t>3/09/2012</a:t>
+              <a:t>11/09/2012</a:t>
             </a:fld>
             <a:endParaRPr lang="nl-BE">
               <a:solidFill>
@@ -2411,7 +2412,7 @@
                 </a:solidFill>
               </a:rPr>
               <a:pPr/>
-              <a:t>3/09/2012</a:t>
+              <a:t>11/09/2012</a:t>
             </a:fld>
             <a:endParaRPr lang="nl-BE">
               <a:solidFill>
@@ -2538,7 +2539,7 @@
                 </a:solidFill>
               </a:rPr>
               <a:pPr/>
-              <a:t>3/09/2012</a:t>
+              <a:t>11/09/2012</a:t>
             </a:fld>
             <a:endParaRPr lang="nl-BE">
               <a:solidFill>
@@ -2847,7 +2848,7 @@
                 </a:solidFill>
               </a:rPr>
               <a:pPr/>
-              <a:t>3/09/2012</a:t>
+              <a:t>11/09/2012</a:t>
             </a:fld>
             <a:endParaRPr lang="nl-BE">
               <a:solidFill>
@@ -3042,7 +3043,7 @@
           <a:p>
             <a:fld id="{F0AA596B-07FD-418F-9BC7-89A9D7D4BC61}" type="datetimeFigureOut">
               <a:rPr lang="en-GB" smtClean="0"/>
-              <a:t>03/09/2012</a:t>
+              <a:t>11/09/2012</a:t>
             </a:fld>
             <a:endParaRPr lang="en-GB"/>
           </a:p>
@@ -3306,7 +3307,7 @@
                 </a:solidFill>
               </a:rPr>
               <a:pPr/>
-              <a:t>3/09/2012</a:t>
+              <a:t>11/09/2012</a:t>
             </a:fld>
             <a:endParaRPr lang="nl-BE">
               <a:solidFill>
@@ -3508,7 +3509,7 @@
                 </a:solidFill>
               </a:rPr>
               <a:pPr/>
-              <a:t>3/09/2012</a:t>
+              <a:t>11/09/2012</a:t>
             </a:fld>
             <a:endParaRPr lang="nl-BE">
               <a:solidFill>
@@ -3720,7 +3721,7 @@
                 </a:solidFill>
               </a:rPr>
               <a:pPr/>
-              <a:t>3/09/2012</a:t>
+              <a:t>11/09/2012</a:t>
             </a:fld>
             <a:endParaRPr lang="nl-BE">
               <a:solidFill>
@@ -3991,7 +3992,7 @@
           <a:p>
             <a:fld id="{F0AA596B-07FD-418F-9BC7-89A9D7D4BC61}" type="datetimeFigureOut">
               <a:rPr lang="en-GB" smtClean="0"/>
-              <a:t>03/09/2012</a:t>
+              <a:t>11/09/2012</a:t>
             </a:fld>
             <a:endParaRPr lang="en-GB"/>
           </a:p>
@@ -4279,7 +4280,7 @@
           <a:p>
             <a:fld id="{F0AA596B-07FD-418F-9BC7-89A9D7D4BC61}" type="datetimeFigureOut">
               <a:rPr lang="en-GB" smtClean="0"/>
-              <a:t>03/09/2012</a:t>
+              <a:t>11/09/2012</a:t>
             </a:fld>
             <a:endParaRPr lang="en-GB"/>
           </a:p>
@@ -4701,7 +4702,7 @@
           <a:p>
             <a:fld id="{F0AA596B-07FD-418F-9BC7-89A9D7D4BC61}" type="datetimeFigureOut">
               <a:rPr lang="en-GB" smtClean="0"/>
-              <a:t>03/09/2012</a:t>
+              <a:t>11/09/2012</a:t>
             </a:fld>
             <a:endParaRPr lang="en-GB"/>
           </a:p>
@@ -4819,7 +4820,7 @@
           <a:p>
             <a:fld id="{F0AA596B-07FD-418F-9BC7-89A9D7D4BC61}" type="datetimeFigureOut">
               <a:rPr lang="en-GB" smtClean="0"/>
-              <a:t>03/09/2012</a:t>
+              <a:t>11/09/2012</a:t>
             </a:fld>
             <a:endParaRPr lang="en-GB"/>
           </a:p>
@@ -4914,7 +4915,7 @@
           <a:p>
             <a:fld id="{F0AA596B-07FD-418F-9BC7-89A9D7D4BC61}" type="datetimeFigureOut">
               <a:rPr lang="en-GB" smtClean="0"/>
-              <a:t>03/09/2012</a:t>
+              <a:t>11/09/2012</a:t>
             </a:fld>
             <a:endParaRPr lang="en-GB"/>
           </a:p>
@@ -5191,7 +5192,7 @@
           <a:p>
             <a:fld id="{F0AA596B-07FD-418F-9BC7-89A9D7D4BC61}" type="datetimeFigureOut">
               <a:rPr lang="en-GB" smtClean="0"/>
-              <a:t>03/09/2012</a:t>
+              <a:t>11/09/2012</a:t>
             </a:fld>
             <a:endParaRPr lang="en-GB"/>
           </a:p>
@@ -5444,7 +5445,7 @@
           <a:p>
             <a:fld id="{F0AA596B-07FD-418F-9BC7-89A9D7D4BC61}" type="datetimeFigureOut">
               <a:rPr lang="en-GB" smtClean="0"/>
-              <a:t>03/09/2012</a:t>
+              <a:t>11/09/2012</a:t>
             </a:fld>
             <a:endParaRPr lang="en-GB"/>
           </a:p>
@@ -5657,7 +5658,7 @@
           <a:p>
             <a:fld id="{F0AA596B-07FD-418F-9BC7-89A9D7D4BC61}" type="datetimeFigureOut">
               <a:rPr lang="en-GB" smtClean="0"/>
-              <a:t>03/09/2012</a:t>
+              <a:t>11/09/2012</a:t>
             </a:fld>
             <a:endParaRPr lang="en-GB"/>
           </a:p>
@@ -6184,7 +6185,7 @@
                 </a:solidFill>
               </a:rPr>
               <a:pPr/>
-              <a:t>3/09/2012</a:t>
+              <a:t>11/09/2012</a:t>
             </a:fld>
             <a:endParaRPr lang="nl-BE">
               <a:solidFill>
@@ -8481,451 +8482,6 @@
       </p:cxnSp>
       <p:sp>
         <p:nvSpPr>
-          <p:cNvPr id="197" name="Rectangle 196"/>
-          <p:cNvSpPr/>
-          <p:nvPr/>
-        </p:nvSpPr>
-        <p:spPr>
-          <a:xfrm>
-            <a:off x="3347864" y="1284962"/>
-            <a:ext cx="1129437" cy="540032"/>
-          </a:xfrm>
-          <a:prstGeom prst="rect">
-            <a:avLst/>
-          </a:prstGeom>
-          <a:ln>
-            <a:solidFill>
-              <a:schemeClr val="bg2">
-                <a:lumMod val="75000"/>
-              </a:schemeClr>
-            </a:solidFill>
-          </a:ln>
-        </p:spPr>
-        <p:style>
-          <a:lnRef idx="1">
-            <a:schemeClr val="accent3"/>
-          </a:lnRef>
-          <a:fillRef idx="2">
-            <a:schemeClr val="accent3"/>
-          </a:fillRef>
-          <a:effectRef idx="1">
-            <a:schemeClr val="accent3"/>
-          </a:effectRef>
-          <a:fontRef idx="minor">
-            <a:schemeClr val="dk1"/>
-          </a:fontRef>
-        </p:style>
-        <p:txBody>
-          <a:bodyPr rtlCol="0" anchor="ctr"/>
-          <a:lstStyle/>
-          <a:p>
-            <a:pPr algn="ctr"/>
-            <a:r>
-              <a:rPr lang="nl-BE" sz="1200" dirty="0">
-                <a:solidFill>
-                  <a:schemeClr val="bg2">
-                    <a:lumMod val="50000"/>
-                  </a:schemeClr>
-                </a:solidFill>
-              </a:rPr>
-              <a:t>EBUCore</a:t>
-            </a:r>
-            <a:br>
-              <a:rPr lang="nl-BE" sz="1200" dirty="0">
-                <a:solidFill>
-                  <a:schemeClr val="bg2">
-                    <a:lumMod val="50000"/>
-                  </a:schemeClr>
-                </a:solidFill>
-              </a:rPr>
-            </a:br>
-            <a:r>
-              <a:rPr lang="nl-BE" sz="1200" dirty="0">
-                <a:solidFill>
-                  <a:schemeClr val="bg2">
-                    <a:lumMod val="50000"/>
-                  </a:schemeClr>
-                </a:solidFill>
-              </a:rPr>
-              <a:t>XML Schema</a:t>
-            </a:r>
-          </a:p>
-        </p:txBody>
-      </p:sp>
-      <p:sp>
-        <p:nvSpPr>
-          <p:cNvPr id="201" name="Rectangle 200"/>
-          <p:cNvSpPr/>
-          <p:nvPr/>
-        </p:nvSpPr>
-        <p:spPr>
-          <a:xfrm>
-            <a:off x="3347864" y="2080268"/>
-            <a:ext cx="1129436" cy="457430"/>
-          </a:xfrm>
-          <a:prstGeom prst="rect">
-            <a:avLst/>
-          </a:prstGeom>
-          <a:ln>
-            <a:solidFill>
-              <a:schemeClr val="bg2">
-                <a:lumMod val="75000"/>
-              </a:schemeClr>
-            </a:solidFill>
-          </a:ln>
-        </p:spPr>
-        <p:style>
-          <a:lnRef idx="1">
-            <a:schemeClr val="accent3"/>
-          </a:lnRef>
-          <a:fillRef idx="2">
-            <a:schemeClr val="accent3"/>
-          </a:fillRef>
-          <a:effectRef idx="1">
-            <a:schemeClr val="accent3"/>
-          </a:effectRef>
-          <a:fontRef idx="minor">
-            <a:schemeClr val="dk1"/>
-          </a:fontRef>
-        </p:style>
-        <p:txBody>
-          <a:bodyPr rtlCol="0" anchor="ctr"/>
-          <a:lstStyle/>
-          <a:p>
-            <a:pPr algn="ctr"/>
-            <a:r>
-              <a:rPr lang="nl-BE" sz="1000" i="1" dirty="0">
-                <a:solidFill>
-                  <a:schemeClr val="bg2">
-                    <a:lumMod val="50000"/>
-                  </a:schemeClr>
-                </a:solidFill>
-              </a:rPr>
-              <a:t>XSD Code Generator</a:t>
-            </a:r>
-          </a:p>
-        </p:txBody>
-      </p:sp>
-      <p:cxnSp>
-        <p:nvCxnSpPr>
-          <p:cNvPr id="202" name="Elbow Connector 201"/>
-          <p:cNvCxnSpPr>
-            <a:stCxn id="197" idx="2"/>
-            <a:endCxn id="201" idx="0"/>
-          </p:cNvCxnSpPr>
-          <p:nvPr/>
-        </p:nvCxnSpPr>
-        <p:spPr>
-          <a:xfrm rot="5400000">
-            <a:off x="3784946" y="1952631"/>
-            <a:ext cx="255274" cy="1"/>
-          </a:xfrm>
-          <a:prstGeom prst="bentConnector3">
-            <a:avLst>
-              <a:gd name="adj1" fmla="val 50000"/>
-            </a:avLst>
-          </a:prstGeom>
-          <a:ln w="25400">
-            <a:solidFill>
-              <a:schemeClr val="bg2">
-                <a:lumMod val="75000"/>
-              </a:schemeClr>
-            </a:solidFill>
-            <a:tailEnd type="arrow"/>
-          </a:ln>
-        </p:spPr>
-        <p:style>
-          <a:lnRef idx="1">
-            <a:schemeClr val="accent1"/>
-          </a:lnRef>
-          <a:fillRef idx="0">
-            <a:schemeClr val="accent1"/>
-          </a:fillRef>
-          <a:effectRef idx="0">
-            <a:schemeClr val="accent1"/>
-          </a:effectRef>
-          <a:fontRef idx="minor">
-            <a:schemeClr val="tx1"/>
-          </a:fontRef>
-        </p:style>
-      </p:cxnSp>
-      <p:cxnSp>
-        <p:nvCxnSpPr>
-          <p:cNvPr id="205" name="Elbow Connector 204"/>
-          <p:cNvCxnSpPr>
-            <a:stCxn id="201" idx="2"/>
-            <a:endCxn id="19" idx="0"/>
-          </p:cNvCxnSpPr>
-          <p:nvPr/>
-        </p:nvCxnSpPr>
-        <p:spPr>
-          <a:xfrm rot="16200000" flipH="1">
-            <a:off x="3754963" y="2695316"/>
-            <a:ext cx="315238" cy="1"/>
-          </a:xfrm>
-          <a:prstGeom prst="bentConnector3">
-            <a:avLst>
-              <a:gd name="adj1" fmla="val 50000"/>
-            </a:avLst>
-          </a:prstGeom>
-          <a:ln w="25400">
-            <a:solidFill>
-              <a:schemeClr val="bg2">
-                <a:lumMod val="75000"/>
-              </a:schemeClr>
-            </a:solidFill>
-            <a:tailEnd type="arrow"/>
-          </a:ln>
-        </p:spPr>
-        <p:style>
-          <a:lnRef idx="1">
-            <a:schemeClr val="accent1"/>
-          </a:lnRef>
-          <a:fillRef idx="0">
-            <a:schemeClr val="accent1"/>
-          </a:fillRef>
-          <a:effectRef idx="0">
-            <a:schemeClr val="accent1"/>
-          </a:effectRef>
-          <a:fontRef idx="minor">
-            <a:schemeClr val="tx1"/>
-          </a:fontRef>
-        </p:style>
-      </p:cxnSp>
-      <p:sp>
-        <p:nvSpPr>
-          <p:cNvPr id="212" name="Rectangle 211"/>
-          <p:cNvSpPr/>
-          <p:nvPr/>
-        </p:nvSpPr>
-        <p:spPr>
-          <a:xfrm>
-            <a:off x="5774364" y="1284962"/>
-            <a:ext cx="1129437" cy="540032"/>
-          </a:xfrm>
-          <a:prstGeom prst="rect">
-            <a:avLst/>
-          </a:prstGeom>
-          <a:ln>
-            <a:solidFill>
-              <a:schemeClr val="bg2">
-                <a:lumMod val="75000"/>
-              </a:schemeClr>
-            </a:solidFill>
-          </a:ln>
-        </p:spPr>
-        <p:style>
-          <a:lnRef idx="1">
-            <a:schemeClr val="accent3"/>
-          </a:lnRef>
-          <a:fillRef idx="2">
-            <a:schemeClr val="accent3"/>
-          </a:fillRef>
-          <a:effectRef idx="1">
-            <a:schemeClr val="accent3"/>
-          </a:effectRef>
-          <a:fontRef idx="minor">
-            <a:schemeClr val="dk1"/>
-          </a:fontRef>
-        </p:style>
-        <p:txBody>
-          <a:bodyPr rtlCol="0" anchor="ctr"/>
-          <a:lstStyle/>
-          <a:p>
-            <a:pPr algn="ctr"/>
-            <a:r>
-              <a:rPr lang="nl-BE" sz="1200" dirty="0">
-                <a:solidFill>
-                  <a:schemeClr val="bg2">
-                    <a:lumMod val="50000"/>
-                  </a:schemeClr>
-                </a:solidFill>
-              </a:rPr>
-              <a:t>EBUCore</a:t>
-            </a:r>
-            <a:br>
-              <a:rPr lang="nl-BE" sz="1200" dirty="0">
-                <a:solidFill>
-                  <a:schemeClr val="bg2">
-                    <a:lumMod val="50000"/>
-                  </a:schemeClr>
-                </a:solidFill>
-              </a:rPr>
-            </a:br>
-            <a:r>
-              <a:rPr lang="nl-BE" sz="1200" dirty="0">
-                <a:solidFill>
-                  <a:schemeClr val="bg2">
-                    <a:lumMod val="50000"/>
-                  </a:schemeClr>
-                </a:solidFill>
-              </a:rPr>
-              <a:t>KLV Dictionary</a:t>
-            </a:r>
-          </a:p>
-        </p:txBody>
-      </p:sp>
-      <p:sp>
-        <p:nvSpPr>
-          <p:cNvPr id="214" name="Rectangle 213"/>
-          <p:cNvSpPr/>
-          <p:nvPr/>
-        </p:nvSpPr>
-        <p:spPr>
-          <a:xfrm>
-            <a:off x="5774364" y="2080268"/>
-            <a:ext cx="1129436" cy="457430"/>
-          </a:xfrm>
-          <a:prstGeom prst="rect">
-            <a:avLst/>
-          </a:prstGeom>
-          <a:ln>
-            <a:solidFill>
-              <a:schemeClr val="bg2">
-                <a:lumMod val="75000"/>
-              </a:schemeClr>
-            </a:solidFill>
-          </a:ln>
-        </p:spPr>
-        <p:style>
-          <a:lnRef idx="1">
-            <a:schemeClr val="accent3"/>
-          </a:lnRef>
-          <a:fillRef idx="2">
-            <a:schemeClr val="accent3"/>
-          </a:fillRef>
-          <a:effectRef idx="1">
-            <a:schemeClr val="accent3"/>
-          </a:effectRef>
-          <a:fontRef idx="minor">
-            <a:schemeClr val="dk1"/>
-          </a:fontRef>
-        </p:style>
-        <p:txBody>
-          <a:bodyPr rtlCol="0" anchor="ctr"/>
-          <a:lstStyle/>
-          <a:p>
-            <a:pPr algn="ctr"/>
-            <a:r>
-              <a:rPr lang="nl-BE" sz="1000" i="1" dirty="0">
-                <a:solidFill>
-                  <a:schemeClr val="bg2">
-                    <a:lumMod val="50000"/>
-                  </a:schemeClr>
-                </a:solidFill>
-              </a:rPr>
-              <a:t>gen_classes</a:t>
-            </a:r>
-            <a:br>
-              <a:rPr lang="nl-BE" sz="1000" i="1" dirty="0">
-                <a:solidFill>
-                  <a:schemeClr val="bg2">
-                    <a:lumMod val="50000"/>
-                  </a:schemeClr>
-                </a:solidFill>
-              </a:rPr>
-            </a:br>
-            <a:r>
-              <a:rPr lang="nl-BE" sz="1000" i="1" dirty="0">
-                <a:solidFill>
-                  <a:schemeClr val="bg2">
-                    <a:lumMod val="50000"/>
-                  </a:schemeClr>
-                </a:solidFill>
-              </a:rPr>
-              <a:t>Code Generator</a:t>
-            </a:r>
-          </a:p>
-        </p:txBody>
-      </p:sp>
-      <p:cxnSp>
-        <p:nvCxnSpPr>
-          <p:cNvPr id="216" name="Elbow Connector 215"/>
-          <p:cNvCxnSpPr>
-            <a:stCxn id="214" idx="2"/>
-            <a:endCxn id="109" idx="0"/>
-          </p:cNvCxnSpPr>
-          <p:nvPr/>
-        </p:nvCxnSpPr>
-        <p:spPr>
-          <a:xfrm rot="16200000" flipH="1">
-            <a:off x="6181464" y="2695316"/>
-            <a:ext cx="315239" cy="2"/>
-          </a:xfrm>
-          <a:prstGeom prst="bentConnector3">
-            <a:avLst>
-              <a:gd name="adj1" fmla="val 50000"/>
-            </a:avLst>
-          </a:prstGeom>
-          <a:ln w="25400">
-            <a:solidFill>
-              <a:schemeClr val="bg2">
-                <a:lumMod val="75000"/>
-              </a:schemeClr>
-            </a:solidFill>
-            <a:tailEnd type="arrow"/>
-          </a:ln>
-        </p:spPr>
-        <p:style>
-          <a:lnRef idx="1">
-            <a:schemeClr val="accent1"/>
-          </a:lnRef>
-          <a:fillRef idx="0">
-            <a:schemeClr val="accent1"/>
-          </a:fillRef>
-          <a:effectRef idx="0">
-            <a:schemeClr val="accent1"/>
-          </a:effectRef>
-          <a:fontRef idx="minor">
-            <a:schemeClr val="tx1"/>
-          </a:fontRef>
-        </p:style>
-      </p:cxnSp>
-      <p:cxnSp>
-        <p:nvCxnSpPr>
-          <p:cNvPr id="219" name="Elbow Connector 218"/>
-          <p:cNvCxnSpPr>
-            <a:stCxn id="212" idx="2"/>
-            <a:endCxn id="214" idx="0"/>
-          </p:cNvCxnSpPr>
-          <p:nvPr/>
-        </p:nvCxnSpPr>
-        <p:spPr>
-          <a:xfrm rot="5400000">
-            <a:off x="6211446" y="1952631"/>
-            <a:ext cx="255274" cy="1"/>
-          </a:xfrm>
-          <a:prstGeom prst="bentConnector3">
-            <a:avLst>
-              <a:gd name="adj1" fmla="val 50000"/>
-            </a:avLst>
-          </a:prstGeom>
-          <a:ln w="25400">
-            <a:solidFill>
-              <a:schemeClr val="bg2">
-                <a:lumMod val="75000"/>
-              </a:schemeClr>
-            </a:solidFill>
-            <a:tailEnd type="arrow"/>
-          </a:ln>
-        </p:spPr>
-        <p:style>
-          <a:lnRef idx="1">
-            <a:schemeClr val="accent1"/>
-          </a:lnRef>
-          <a:fillRef idx="0">
-            <a:schemeClr val="accent1"/>
-          </a:fillRef>
-          <a:effectRef idx="0">
-            <a:schemeClr val="accent1"/>
-          </a:effectRef>
-          <a:fontRef idx="minor">
-            <a:schemeClr val="tx1"/>
-          </a:fontRef>
-        </p:style>
-      </p:cxnSp>
-      <p:sp>
-        <p:nvSpPr>
           <p:cNvPr id="53" name="Rectangle 52"/>
           <p:cNvSpPr/>
           <p:nvPr/>
@@ -10201,6 +9757,744 @@
 </file>
 
 <file path=ppt/slides/slide4.xml><?xml version="1.0" encoding="utf-8"?>
+<p:sld xmlns:a="http://schemas.openxmlformats.org/drawingml/2006/main" xmlns:r="http://schemas.openxmlformats.org/officeDocument/2006/relationships" xmlns:p="http://schemas.openxmlformats.org/presentationml/2006/main">
+  <p:cSld>
+    <p:spTree>
+      <p:nvGrpSpPr>
+        <p:cNvPr id="1" name=""/>
+        <p:cNvGrpSpPr/>
+        <p:nvPr/>
+      </p:nvGrpSpPr>
+      <p:grpSpPr>
+        <a:xfrm>
+          <a:off x="0" y="0"/>
+          <a:ext cx="0" cy="0"/>
+          <a:chOff x="0" y="0"/>
+          <a:chExt cx="0" cy="0"/>
+        </a:xfrm>
+      </p:grpSpPr>
+      <p:sp>
+        <p:nvSpPr>
+          <p:cNvPr id="3" name="Content Placeholder 2"/>
+          <p:cNvSpPr>
+            <a:spLocks noGrp="1"/>
+          </p:cNvSpPr>
+          <p:nvPr>
+            <p:ph idx="1"/>
+          </p:nvPr>
+        </p:nvSpPr>
+        <p:spPr>
+          <a:xfrm>
+            <a:off x="467544" y="1500534"/>
+            <a:ext cx="8229600" cy="4525963"/>
+          </a:xfrm>
+        </p:spPr>
+        <p:txBody>
+          <a:bodyPr/>
+          <a:lstStyle/>
+          <a:p>
+            <a:endParaRPr lang="en-US" dirty="0" smtClean="0"/>
+          </a:p>
+        </p:txBody>
+      </p:sp>
+      <p:sp>
+        <p:nvSpPr>
+          <p:cNvPr id="2" name="Title 1"/>
+          <p:cNvSpPr>
+            <a:spLocks noGrp="1"/>
+          </p:cNvSpPr>
+          <p:nvPr>
+            <p:ph type="title"/>
+          </p:nvPr>
+        </p:nvSpPr>
+        <p:spPr>
+          <a:xfrm>
+            <a:off x="238207" y="49188"/>
+            <a:ext cx="8229600" cy="1143000"/>
+          </a:xfrm>
+        </p:spPr>
+        <p:txBody>
+          <a:bodyPr>
+            <a:normAutofit/>
+          </a:bodyPr>
+          <a:lstStyle/>
+          <a:p>
+            <a:endParaRPr lang="en-GB" dirty="0"/>
+          </a:p>
+        </p:txBody>
+      </p:sp>
+      <p:sp>
+        <p:nvSpPr>
+          <p:cNvPr id="83" name="Rectangle 82"/>
+          <p:cNvSpPr/>
+          <p:nvPr/>
+        </p:nvSpPr>
+        <p:spPr>
+          <a:xfrm>
+            <a:off x="1467392" y="2351747"/>
+            <a:ext cx="1941254" cy="571751"/>
+          </a:xfrm>
+          <a:prstGeom prst="rect">
+            <a:avLst/>
+          </a:prstGeom>
+        </p:spPr>
+        <p:style>
+          <a:lnRef idx="1">
+            <a:schemeClr val="accent3"/>
+          </a:lnRef>
+          <a:fillRef idx="2">
+            <a:schemeClr val="accent3"/>
+          </a:fillRef>
+          <a:effectRef idx="1">
+            <a:schemeClr val="accent3"/>
+          </a:effectRef>
+          <a:fontRef idx="minor">
+            <a:schemeClr val="dk1"/>
+          </a:fontRef>
+        </p:style>
+        <p:txBody>
+          <a:bodyPr rtlCol="0" anchor="ctr"/>
+          <a:lstStyle/>
+          <a:p>
+            <a:pPr algn="ctr"/>
+            <a:r>
+              <a:rPr lang="nl-BE" sz="1200" dirty="0" smtClean="0">
+                <a:solidFill>
+                  <a:prstClr val="black"/>
+                </a:solidFill>
+              </a:rPr>
+              <a:t>EBUCore Dictionary</a:t>
+            </a:r>
+          </a:p>
+          <a:p>
+            <a:pPr algn="ctr"/>
+            <a:r>
+              <a:rPr lang="nl-BE" sz="1200" i="1" dirty="0" smtClean="0">
+                <a:solidFill>
+                  <a:prstClr val="black"/>
+                </a:solidFill>
+              </a:rPr>
+              <a:t>(ebucore_mxflib_dict.xml)</a:t>
+            </a:r>
+            <a:endParaRPr lang="nl-BE" sz="1200" i="1" dirty="0">
+              <a:solidFill>
+                <a:prstClr val="black"/>
+              </a:solidFill>
+            </a:endParaRPr>
+          </a:p>
+        </p:txBody>
+      </p:sp>
+      <p:cxnSp>
+        <p:nvCxnSpPr>
+          <p:cNvPr id="86" name="Elbow Connector 85"/>
+          <p:cNvCxnSpPr>
+            <a:stCxn id="83" idx="2"/>
+            <a:endCxn id="32" idx="0"/>
+          </p:cNvCxnSpPr>
+          <p:nvPr/>
+        </p:nvCxnSpPr>
+        <p:spPr>
+          <a:xfrm rot="16200000" flipH="1">
+            <a:off x="2288133" y="3073383"/>
+            <a:ext cx="299775" cy="3"/>
+          </a:xfrm>
+          <a:prstGeom prst="bentConnector3">
+            <a:avLst>
+              <a:gd name="adj1" fmla="val 50000"/>
+            </a:avLst>
+          </a:prstGeom>
+          <a:ln w="25400">
+            <a:solidFill>
+              <a:schemeClr val="tx1"/>
+            </a:solidFill>
+            <a:tailEnd type="arrow"/>
+          </a:ln>
+        </p:spPr>
+        <p:style>
+          <a:lnRef idx="1">
+            <a:schemeClr val="accent1"/>
+          </a:lnRef>
+          <a:fillRef idx="0">
+            <a:schemeClr val="accent1"/>
+          </a:fillRef>
+          <a:effectRef idx="0">
+            <a:schemeClr val="accent1"/>
+          </a:effectRef>
+          <a:fontRef idx="minor">
+            <a:schemeClr val="tx1"/>
+          </a:fontRef>
+        </p:style>
+      </p:cxnSp>
+      <p:sp>
+        <p:nvSpPr>
+          <p:cNvPr id="60" name="Rectangle 59"/>
+          <p:cNvSpPr/>
+          <p:nvPr/>
+        </p:nvSpPr>
+        <p:spPr>
+          <a:xfrm>
+            <a:off x="5202435" y="2351747"/>
+            <a:ext cx="1959759" cy="1518917"/>
+          </a:xfrm>
+          <a:prstGeom prst="rect">
+            <a:avLst/>
+          </a:prstGeom>
+        </p:spPr>
+        <p:style>
+          <a:lnRef idx="1">
+            <a:schemeClr val="accent3"/>
+          </a:lnRef>
+          <a:fillRef idx="2">
+            <a:schemeClr val="accent3"/>
+          </a:fillRef>
+          <a:effectRef idx="1">
+            <a:schemeClr val="accent3"/>
+          </a:effectRef>
+          <a:fontRef idx="minor">
+            <a:schemeClr val="dk1"/>
+          </a:fontRef>
+        </p:style>
+        <p:txBody>
+          <a:bodyPr rtlCol="0" anchor="ctr"/>
+          <a:lstStyle/>
+          <a:p>
+            <a:pPr algn="r"/>
+            <a:r>
+              <a:rPr lang="nl-BE" sz="1200" dirty="0" smtClean="0">
+                <a:solidFill>
+                  <a:prstClr val="black"/>
+                </a:solidFill>
+              </a:rPr>
+              <a:t>gen_ebucore_classes</a:t>
+            </a:r>
+            <a:endParaRPr lang="nl-BE" sz="1200" dirty="0">
+              <a:solidFill>
+                <a:prstClr val="black"/>
+              </a:solidFill>
+            </a:endParaRPr>
+          </a:p>
+        </p:txBody>
+      </p:sp>
+      <p:sp>
+        <p:nvSpPr>
+          <p:cNvPr id="32" name="Rectangle 31"/>
+          <p:cNvSpPr/>
+          <p:nvPr/>
+        </p:nvSpPr>
+        <p:spPr>
+          <a:xfrm>
+            <a:off x="1467397" y="3223273"/>
+            <a:ext cx="1941249" cy="684076"/>
+          </a:xfrm>
+          <a:prstGeom prst="rect">
+            <a:avLst/>
+          </a:prstGeom>
+        </p:spPr>
+        <p:style>
+          <a:lnRef idx="1">
+            <a:schemeClr val="accent3"/>
+          </a:lnRef>
+          <a:fillRef idx="2">
+            <a:schemeClr val="accent3"/>
+          </a:fillRef>
+          <a:effectRef idx="1">
+            <a:schemeClr val="accent3"/>
+          </a:effectRef>
+          <a:fontRef idx="minor">
+            <a:schemeClr val="dk1"/>
+          </a:fontRef>
+        </p:style>
+        <p:txBody>
+          <a:bodyPr rtlCol="0" anchor="ctr"/>
+          <a:lstStyle/>
+          <a:p>
+            <a:pPr algn="ctr"/>
+            <a:r>
+              <a:rPr lang="nl-BE" sz="1200" dirty="0">
+                <a:solidFill>
+                  <a:prstClr val="black"/>
+                </a:solidFill>
+              </a:rPr>
+              <a:t>d</a:t>
+            </a:r>
+            <a:r>
+              <a:rPr lang="nl-BE" sz="1200" dirty="0" smtClean="0">
+                <a:solidFill>
+                  <a:prstClr val="black"/>
+                </a:solidFill>
+              </a:rPr>
+              <a:t>ictconvert</a:t>
+            </a:r>
+          </a:p>
+          <a:p>
+            <a:pPr algn="ctr"/>
+            <a:r>
+              <a:rPr lang="nl-BE" sz="1200" i="1" dirty="0" smtClean="0">
+                <a:solidFill>
+                  <a:prstClr val="black"/>
+                </a:solidFill>
+              </a:rPr>
+              <a:t>(dictconvert.groovy &amp; declarereferences.groovy)</a:t>
+            </a:r>
+            <a:endParaRPr lang="nl-BE" sz="1200" i="1" dirty="0">
+              <a:solidFill>
+                <a:prstClr val="black"/>
+              </a:solidFill>
+            </a:endParaRPr>
+          </a:p>
+        </p:txBody>
+      </p:sp>
+      <p:sp>
+        <p:nvSpPr>
+          <p:cNvPr id="53" name="Rectangle 52"/>
+          <p:cNvSpPr/>
+          <p:nvPr/>
+        </p:nvSpPr>
+        <p:spPr>
+          <a:xfrm>
+            <a:off x="3905573" y="3318585"/>
+            <a:ext cx="2432867" cy="468052"/>
+          </a:xfrm>
+          <a:prstGeom prst="rect">
+            <a:avLst/>
+          </a:prstGeom>
+        </p:spPr>
+        <p:style>
+          <a:lnRef idx="1">
+            <a:schemeClr val="accent3"/>
+          </a:lnRef>
+          <a:fillRef idx="2">
+            <a:schemeClr val="accent3"/>
+          </a:fillRef>
+          <a:effectRef idx="1">
+            <a:schemeClr val="accent3"/>
+          </a:effectRef>
+          <a:fontRef idx="minor">
+            <a:schemeClr val="dk1"/>
+          </a:fontRef>
+        </p:style>
+        <p:txBody>
+          <a:bodyPr rtlCol="0" anchor="ctr"/>
+          <a:lstStyle/>
+          <a:p>
+            <a:pPr algn="ctr"/>
+            <a:r>
+              <a:rPr lang="nl-BE" sz="1200" i="1" dirty="0">
+                <a:solidFill>
+                  <a:prstClr val="black"/>
+                </a:solidFill>
+              </a:rPr>
+              <a:t>ebucore_extensions_data_model.</a:t>
+            </a:r>
+            <a:r>
+              <a:rPr lang="nl-BE" sz="1200" dirty="0">
+                <a:solidFill>
+                  <a:prstClr val="black"/>
+                </a:solidFill>
+              </a:rPr>
+              <a:t>h</a:t>
+            </a:r>
+            <a:endParaRPr lang="nl-BE" sz="1200" dirty="0">
+              <a:solidFill>
+                <a:prstClr val="black"/>
+              </a:solidFill>
+            </a:endParaRPr>
+          </a:p>
+        </p:txBody>
+      </p:sp>
+      <p:sp>
+        <p:nvSpPr>
+          <p:cNvPr id="55" name="Rectangle 54"/>
+          <p:cNvSpPr/>
+          <p:nvPr/>
+        </p:nvSpPr>
+        <p:spPr>
+          <a:xfrm>
+            <a:off x="3905573" y="2414172"/>
+            <a:ext cx="2421170" cy="468052"/>
+          </a:xfrm>
+          <a:prstGeom prst="rect">
+            <a:avLst/>
+          </a:prstGeom>
+        </p:spPr>
+        <p:style>
+          <a:lnRef idx="1">
+            <a:schemeClr val="accent3"/>
+          </a:lnRef>
+          <a:fillRef idx="2">
+            <a:schemeClr val="accent3"/>
+          </a:fillRef>
+          <a:effectRef idx="1">
+            <a:schemeClr val="accent3"/>
+          </a:effectRef>
+          <a:fontRef idx="minor">
+            <a:schemeClr val="dk1"/>
+          </a:fontRef>
+        </p:style>
+        <p:txBody>
+          <a:bodyPr rtlCol="0" anchor="ctr"/>
+          <a:lstStyle/>
+          <a:p>
+            <a:pPr algn="ctr"/>
+            <a:r>
+              <a:rPr lang="nl-BE" sz="1200" i="1" dirty="0">
+                <a:solidFill>
+                  <a:prstClr val="black"/>
+                </a:solidFill>
+              </a:rPr>
+              <a:t>ebucore_declare_references.inc</a:t>
+            </a:r>
+            <a:endParaRPr lang="nl-BE" sz="1200" dirty="0">
+              <a:solidFill>
+                <a:prstClr val="black"/>
+              </a:solidFill>
+            </a:endParaRPr>
+          </a:p>
+        </p:txBody>
+      </p:sp>
+      <p:cxnSp>
+        <p:nvCxnSpPr>
+          <p:cNvPr id="62" name="Elbow Connector 61"/>
+          <p:cNvCxnSpPr>
+            <a:stCxn id="32" idx="3"/>
+            <a:endCxn id="53" idx="1"/>
+          </p:cNvCxnSpPr>
+          <p:nvPr/>
+        </p:nvCxnSpPr>
+        <p:spPr>
+          <a:xfrm flipV="1">
+            <a:off x="3408646" y="3552611"/>
+            <a:ext cx="496927" cy="12700"/>
+          </a:xfrm>
+          <a:prstGeom prst="bentConnector3">
+            <a:avLst>
+              <a:gd name="adj1" fmla="val 50000"/>
+            </a:avLst>
+          </a:prstGeom>
+          <a:ln w="25400">
+            <a:solidFill>
+              <a:schemeClr val="tx1"/>
+            </a:solidFill>
+            <a:tailEnd type="arrow"/>
+          </a:ln>
+        </p:spPr>
+        <p:style>
+          <a:lnRef idx="1">
+            <a:schemeClr val="accent1"/>
+          </a:lnRef>
+          <a:fillRef idx="0">
+            <a:schemeClr val="accent1"/>
+          </a:fillRef>
+          <a:effectRef idx="0">
+            <a:schemeClr val="accent1"/>
+          </a:effectRef>
+          <a:fontRef idx="minor">
+            <a:schemeClr val="tx1"/>
+          </a:fontRef>
+        </p:style>
+      </p:cxnSp>
+      <p:cxnSp>
+        <p:nvCxnSpPr>
+          <p:cNvPr id="70" name="Elbow Connector 69"/>
+          <p:cNvCxnSpPr>
+            <a:stCxn id="32" idx="3"/>
+            <a:endCxn id="55" idx="1"/>
+          </p:cNvCxnSpPr>
+          <p:nvPr/>
+        </p:nvCxnSpPr>
+        <p:spPr>
+          <a:xfrm flipV="1">
+            <a:off x="3408646" y="2648198"/>
+            <a:ext cx="496927" cy="917113"/>
+          </a:xfrm>
+          <a:prstGeom prst="bentConnector3">
+            <a:avLst>
+              <a:gd name="adj1" fmla="val 50000"/>
+            </a:avLst>
+          </a:prstGeom>
+          <a:ln w="25400">
+            <a:solidFill>
+              <a:schemeClr val="tx1"/>
+            </a:solidFill>
+            <a:tailEnd type="arrow"/>
+          </a:ln>
+        </p:spPr>
+        <p:style>
+          <a:lnRef idx="1">
+            <a:schemeClr val="accent1"/>
+          </a:lnRef>
+          <a:fillRef idx="0">
+            <a:schemeClr val="accent1"/>
+          </a:fillRef>
+          <a:effectRef idx="0">
+            <a:schemeClr val="accent1"/>
+          </a:effectRef>
+          <a:fontRef idx="minor">
+            <a:schemeClr val="tx1"/>
+          </a:fontRef>
+        </p:style>
+      </p:cxnSp>
+      <p:sp>
+        <p:nvSpPr>
+          <p:cNvPr id="75" name="Rectangle 74"/>
+          <p:cNvSpPr/>
+          <p:nvPr/>
+        </p:nvSpPr>
+        <p:spPr>
+          <a:xfrm>
+            <a:off x="1467392" y="4254689"/>
+            <a:ext cx="5694801" cy="1152128"/>
+          </a:xfrm>
+          <a:prstGeom prst="rect">
+            <a:avLst/>
+          </a:prstGeom>
+        </p:spPr>
+        <p:style>
+          <a:lnRef idx="1">
+            <a:schemeClr val="accent3"/>
+          </a:lnRef>
+          <a:fillRef idx="2">
+            <a:schemeClr val="accent3"/>
+          </a:fillRef>
+          <a:effectRef idx="1">
+            <a:schemeClr val="accent3"/>
+          </a:effectRef>
+          <a:fontRef idx="minor">
+            <a:schemeClr val="dk1"/>
+          </a:fontRef>
+        </p:style>
+        <p:txBody>
+          <a:bodyPr rtlCol="0" anchor="b"/>
+          <a:lstStyle/>
+          <a:p>
+            <a:pPr algn="ctr"/>
+            <a:r>
+              <a:rPr lang="nl-BE" sz="1200" dirty="0" smtClean="0">
+                <a:solidFill>
+                  <a:prstClr val="black"/>
+                </a:solidFill>
+              </a:rPr>
+              <a:t>EBU SDK</a:t>
+            </a:r>
+            <a:endParaRPr lang="nl-BE" sz="1200" dirty="0">
+              <a:solidFill>
+                <a:prstClr val="black"/>
+              </a:solidFill>
+            </a:endParaRPr>
+          </a:p>
+        </p:txBody>
+      </p:sp>
+      <p:sp>
+        <p:nvSpPr>
+          <p:cNvPr id="87" name="Rectangle 86"/>
+          <p:cNvSpPr/>
+          <p:nvPr/>
+        </p:nvSpPr>
+        <p:spPr>
+          <a:xfrm>
+            <a:off x="1674550" y="4398704"/>
+            <a:ext cx="5256076" cy="670968"/>
+          </a:xfrm>
+          <a:prstGeom prst="rect">
+            <a:avLst/>
+          </a:prstGeom>
+        </p:spPr>
+        <p:style>
+          <a:lnRef idx="1">
+            <a:schemeClr val="accent3"/>
+          </a:lnRef>
+          <a:fillRef idx="2">
+            <a:schemeClr val="accent3"/>
+          </a:fillRef>
+          <a:effectRef idx="1">
+            <a:schemeClr val="accent3"/>
+          </a:effectRef>
+          <a:fontRef idx="minor">
+            <a:schemeClr val="dk1"/>
+          </a:fontRef>
+        </p:style>
+        <p:txBody>
+          <a:bodyPr rtlCol="0" anchor="ctr"/>
+          <a:lstStyle/>
+          <a:p>
+            <a:pPr algn="ctr"/>
+            <a:r>
+              <a:rPr lang="nl-BE" sz="1200" b="1" dirty="0" smtClean="0">
+                <a:solidFill>
+                  <a:prstClr val="black"/>
+                </a:solidFill>
+              </a:rPr>
+              <a:t>EBUCoreProcessor\include\metadata\</a:t>
+            </a:r>
+            <a:endParaRPr lang="nl-BE" sz="1200" b="1" dirty="0" smtClean="0">
+              <a:solidFill>
+                <a:prstClr val="black"/>
+              </a:solidFill>
+            </a:endParaRPr>
+          </a:p>
+          <a:p>
+            <a:pPr algn="ctr"/>
+            <a:r>
+              <a:rPr lang="nl-BE" sz="1200" b="1" dirty="0" smtClean="0">
+                <a:solidFill>
+                  <a:prstClr val="black"/>
+                </a:solidFill>
+              </a:rPr>
+              <a:t>EBUCoreProcessor\src\metadata\</a:t>
+            </a:r>
+            <a:endParaRPr lang="nl-BE" sz="1200" b="1" dirty="0">
+              <a:solidFill>
+                <a:prstClr val="black"/>
+              </a:solidFill>
+            </a:endParaRPr>
+          </a:p>
+        </p:txBody>
+      </p:sp>
+      <p:cxnSp>
+        <p:nvCxnSpPr>
+          <p:cNvPr id="103" name="Elbow Connector 102"/>
+          <p:cNvCxnSpPr>
+            <a:stCxn id="53" idx="2"/>
+            <a:endCxn id="87" idx="0"/>
+          </p:cNvCxnSpPr>
+          <p:nvPr/>
+        </p:nvCxnSpPr>
+        <p:spPr>
+          <a:xfrm rot="5400000">
+            <a:off x="4406265" y="3682961"/>
+            <a:ext cx="612067" cy="819419"/>
+          </a:xfrm>
+          <a:prstGeom prst="bentConnector3">
+            <a:avLst>
+              <a:gd name="adj1" fmla="val 50000"/>
+            </a:avLst>
+          </a:prstGeom>
+          <a:ln w="25400">
+            <a:solidFill>
+              <a:schemeClr val="tx1"/>
+            </a:solidFill>
+            <a:tailEnd type="arrow"/>
+          </a:ln>
+        </p:spPr>
+        <p:style>
+          <a:lnRef idx="1">
+            <a:schemeClr val="accent1"/>
+          </a:lnRef>
+          <a:fillRef idx="0">
+            <a:schemeClr val="accent1"/>
+          </a:fillRef>
+          <a:effectRef idx="0">
+            <a:schemeClr val="accent1"/>
+          </a:effectRef>
+          <a:fontRef idx="minor">
+            <a:schemeClr val="tx1"/>
+          </a:fontRef>
+        </p:style>
+      </p:cxnSp>
+      <p:cxnSp>
+        <p:nvCxnSpPr>
+          <p:cNvPr id="93" name="Elbow Connector 92"/>
+          <p:cNvCxnSpPr>
+            <a:stCxn id="60" idx="3"/>
+            <a:endCxn id="87" idx="3"/>
+          </p:cNvCxnSpPr>
+          <p:nvPr/>
+        </p:nvCxnSpPr>
+        <p:spPr>
+          <a:xfrm flipH="1">
+            <a:off x="6930626" y="3111206"/>
+            <a:ext cx="231568" cy="1622982"/>
+          </a:xfrm>
+          <a:prstGeom prst="bentConnector3">
+            <a:avLst>
+              <a:gd name="adj1" fmla="val -185096"/>
+            </a:avLst>
+          </a:prstGeom>
+          <a:ln w="25400">
+            <a:solidFill>
+              <a:schemeClr val="tx1"/>
+            </a:solidFill>
+            <a:tailEnd type="arrow"/>
+          </a:ln>
+        </p:spPr>
+        <p:style>
+          <a:lnRef idx="1">
+            <a:schemeClr val="accent1"/>
+          </a:lnRef>
+          <a:fillRef idx="0">
+            <a:schemeClr val="accent1"/>
+          </a:fillRef>
+          <a:effectRef idx="0">
+            <a:schemeClr val="accent1"/>
+          </a:effectRef>
+          <a:fontRef idx="minor">
+            <a:schemeClr val="tx1"/>
+          </a:fontRef>
+        </p:style>
+      </p:cxnSp>
+      <p:sp>
+        <p:nvSpPr>
+          <p:cNvPr id="115" name="TextBox 114"/>
+          <p:cNvSpPr txBox="1"/>
+          <p:nvPr/>
+        </p:nvSpPr>
+        <p:spPr>
+          <a:xfrm>
+            <a:off x="6876256" y="3789040"/>
+            <a:ext cx="720080" cy="461665"/>
+          </a:xfrm>
+          <a:prstGeom prst="rect">
+            <a:avLst/>
+          </a:prstGeom>
+          <a:noFill/>
+        </p:spPr>
+        <p:txBody>
+          <a:bodyPr wrap="square" rtlCol="0">
+            <a:spAutoFit/>
+          </a:bodyPr>
+          <a:lstStyle/>
+          <a:p>
+            <a:pPr algn="r"/>
+            <a:r>
+              <a:rPr lang="en-US" sz="1200" dirty="0" smtClean="0"/>
+              <a:t>*.h</a:t>
+            </a:r>
+          </a:p>
+          <a:p>
+            <a:pPr algn="r"/>
+            <a:r>
+              <a:rPr lang="en-US" sz="1200" dirty="0" smtClean="0"/>
+              <a:t>*.</a:t>
+            </a:r>
+            <a:r>
+              <a:rPr lang="en-US" sz="1200" dirty="0" err="1" smtClean="0"/>
+              <a:t>cpp</a:t>
+            </a:r>
+            <a:endParaRPr lang="en-GB" sz="1200" dirty="0"/>
+          </a:p>
+        </p:txBody>
+      </p:sp>
+    </p:spTree>
+    <p:extLst>
+      <p:ext uri="{BB962C8B-B14F-4D97-AF65-F5344CB8AC3E}">
+        <p14:creationId xmlns:p14="http://schemas.microsoft.com/office/powerpoint/2010/main" val="1710452085"/>
+      </p:ext>
+    </p:extLst>
+  </p:cSld>
+  <p:clrMapOvr>
+    <a:masterClrMapping/>
+  </p:clrMapOvr>
+  <p:timing>
+    <p:tnLst>
+      <p:par>
+        <p:cTn id="1" dur="indefinite" restart="never" nodeType="tmRoot"/>
+      </p:par>
+    </p:tnLst>
+  </p:timing>
+</p:sld>
+</file>
+
+<file path=ppt/slides/slide5.xml><?xml version="1.0" encoding="utf-8"?>
 <p:sld xmlns:a="http://schemas.openxmlformats.org/drawingml/2006/main" xmlns:r="http://schemas.openxmlformats.org/officeDocument/2006/relationships" xmlns:p="http://schemas.openxmlformats.org/presentationml/2006/main">
   <p:cSld>
     <p:spTree>

</xml_diff>

<commit_message>
Updated SDK component diagram.
</commit_message>
<xml_diff>
--- a/doc/EBU MXF SDK - EBUCore - images.pptx
+++ b/doc/EBU MXF SDK - EBUCore - images.pptx
@@ -293,7 +293,7 @@
           <a:p>
             <a:fld id="{F0AA596B-07FD-418F-9BC7-89A9D7D4BC61}" type="datetimeFigureOut">
               <a:rPr lang="en-GB" smtClean="0"/>
-              <a:t>11/09/2012</a:t>
+              <a:t>04/10/2012</a:t>
             </a:fld>
             <a:endParaRPr lang="en-GB"/>
           </a:p>
@@ -463,7 +463,7 @@
           <a:p>
             <a:fld id="{F0AA596B-07FD-418F-9BC7-89A9D7D4BC61}" type="datetimeFigureOut">
               <a:rPr lang="en-GB" smtClean="0"/>
-              <a:t>11/09/2012</a:t>
+              <a:t>04/10/2012</a:t>
             </a:fld>
             <a:endParaRPr lang="en-GB"/>
           </a:p>
@@ -643,7 +643,7 @@
           <a:p>
             <a:fld id="{F0AA596B-07FD-418F-9BC7-89A9D7D4BC61}" type="datetimeFigureOut">
               <a:rPr lang="en-GB" smtClean="0"/>
-              <a:t>11/09/2012</a:t>
+              <a:t>04/10/2012</a:t>
             </a:fld>
             <a:endParaRPr lang="en-GB"/>
           </a:p>
@@ -912,7 +912,7 @@
                 </a:solidFill>
               </a:rPr>
               <a:pPr/>
-              <a:t>11/09/2012</a:t>
+              <a:t>4/10/2012</a:t>
             </a:fld>
             <a:endParaRPr lang="nl-BE">
               <a:solidFill>
@@ -1210,7 +1210,7 @@
                 </a:solidFill>
               </a:rPr>
               <a:pPr/>
-              <a:t>11/09/2012</a:t>
+              <a:t>4/10/2012</a:t>
             </a:fld>
             <a:endParaRPr lang="nl-BE">
               <a:solidFill>
@@ -1488,7 +1488,7 @@
                 </a:solidFill>
               </a:rPr>
               <a:pPr/>
-              <a:t>11/09/2012</a:t>
+              <a:t>4/10/2012</a:t>
             </a:fld>
             <a:endParaRPr lang="nl-BE">
               <a:solidFill>
@@ -1808,7 +1808,7 @@
                 </a:solidFill>
               </a:rPr>
               <a:pPr/>
-              <a:t>11/09/2012</a:t>
+              <a:t>4/10/2012</a:t>
             </a:fld>
             <a:endParaRPr lang="nl-BE">
               <a:solidFill>
@@ -2262,7 +2262,7 @@
                 </a:solidFill>
               </a:rPr>
               <a:pPr/>
-              <a:t>11/09/2012</a:t>
+              <a:t>4/10/2012</a:t>
             </a:fld>
             <a:endParaRPr lang="nl-BE">
               <a:solidFill>
@@ -2412,7 +2412,7 @@
                 </a:solidFill>
               </a:rPr>
               <a:pPr/>
-              <a:t>11/09/2012</a:t>
+              <a:t>4/10/2012</a:t>
             </a:fld>
             <a:endParaRPr lang="nl-BE">
               <a:solidFill>
@@ -2539,7 +2539,7 @@
                 </a:solidFill>
               </a:rPr>
               <a:pPr/>
-              <a:t>11/09/2012</a:t>
+              <a:t>4/10/2012</a:t>
             </a:fld>
             <a:endParaRPr lang="nl-BE">
               <a:solidFill>
@@ -2848,7 +2848,7 @@
                 </a:solidFill>
               </a:rPr>
               <a:pPr/>
-              <a:t>11/09/2012</a:t>
+              <a:t>4/10/2012</a:t>
             </a:fld>
             <a:endParaRPr lang="nl-BE">
               <a:solidFill>
@@ -3043,7 +3043,7 @@
           <a:p>
             <a:fld id="{F0AA596B-07FD-418F-9BC7-89A9D7D4BC61}" type="datetimeFigureOut">
               <a:rPr lang="en-GB" smtClean="0"/>
-              <a:t>11/09/2012</a:t>
+              <a:t>04/10/2012</a:t>
             </a:fld>
             <a:endParaRPr lang="en-GB"/>
           </a:p>
@@ -3307,7 +3307,7 @@
                 </a:solidFill>
               </a:rPr>
               <a:pPr/>
-              <a:t>11/09/2012</a:t>
+              <a:t>4/10/2012</a:t>
             </a:fld>
             <a:endParaRPr lang="nl-BE">
               <a:solidFill>
@@ -3509,7 +3509,7 @@
                 </a:solidFill>
               </a:rPr>
               <a:pPr/>
-              <a:t>11/09/2012</a:t>
+              <a:t>4/10/2012</a:t>
             </a:fld>
             <a:endParaRPr lang="nl-BE">
               <a:solidFill>
@@ -3721,7 +3721,7 @@
                 </a:solidFill>
               </a:rPr>
               <a:pPr/>
-              <a:t>11/09/2012</a:t>
+              <a:t>4/10/2012</a:t>
             </a:fld>
             <a:endParaRPr lang="nl-BE">
               <a:solidFill>
@@ -3992,7 +3992,7 @@
           <a:p>
             <a:fld id="{F0AA596B-07FD-418F-9BC7-89A9D7D4BC61}" type="datetimeFigureOut">
               <a:rPr lang="en-GB" smtClean="0"/>
-              <a:t>11/09/2012</a:t>
+              <a:t>04/10/2012</a:t>
             </a:fld>
             <a:endParaRPr lang="en-GB"/>
           </a:p>
@@ -4280,7 +4280,7 @@
           <a:p>
             <a:fld id="{F0AA596B-07FD-418F-9BC7-89A9D7D4BC61}" type="datetimeFigureOut">
               <a:rPr lang="en-GB" smtClean="0"/>
-              <a:t>11/09/2012</a:t>
+              <a:t>04/10/2012</a:t>
             </a:fld>
             <a:endParaRPr lang="en-GB"/>
           </a:p>
@@ -4702,7 +4702,7 @@
           <a:p>
             <a:fld id="{F0AA596B-07FD-418F-9BC7-89A9D7D4BC61}" type="datetimeFigureOut">
               <a:rPr lang="en-GB" smtClean="0"/>
-              <a:t>11/09/2012</a:t>
+              <a:t>04/10/2012</a:t>
             </a:fld>
             <a:endParaRPr lang="en-GB"/>
           </a:p>
@@ -4820,7 +4820,7 @@
           <a:p>
             <a:fld id="{F0AA596B-07FD-418F-9BC7-89A9D7D4BC61}" type="datetimeFigureOut">
               <a:rPr lang="en-GB" smtClean="0"/>
-              <a:t>11/09/2012</a:t>
+              <a:t>04/10/2012</a:t>
             </a:fld>
             <a:endParaRPr lang="en-GB"/>
           </a:p>
@@ -4915,7 +4915,7 @@
           <a:p>
             <a:fld id="{F0AA596B-07FD-418F-9BC7-89A9D7D4BC61}" type="datetimeFigureOut">
               <a:rPr lang="en-GB" smtClean="0"/>
-              <a:t>11/09/2012</a:t>
+              <a:t>04/10/2012</a:t>
             </a:fld>
             <a:endParaRPr lang="en-GB"/>
           </a:p>
@@ -5192,7 +5192,7 @@
           <a:p>
             <a:fld id="{F0AA596B-07FD-418F-9BC7-89A9D7D4BC61}" type="datetimeFigureOut">
               <a:rPr lang="en-GB" smtClean="0"/>
-              <a:t>11/09/2012</a:t>
+              <a:t>04/10/2012</a:t>
             </a:fld>
             <a:endParaRPr lang="en-GB"/>
           </a:p>
@@ -5445,7 +5445,7 @@
           <a:p>
             <a:fld id="{F0AA596B-07FD-418F-9BC7-89A9D7D4BC61}" type="datetimeFigureOut">
               <a:rPr lang="en-GB" smtClean="0"/>
-              <a:t>11/09/2012</a:t>
+              <a:t>04/10/2012</a:t>
             </a:fld>
             <a:endParaRPr lang="en-GB"/>
           </a:p>
@@ -5658,7 +5658,7 @@
           <a:p>
             <a:fld id="{F0AA596B-07FD-418F-9BC7-89A9D7D4BC61}" type="datetimeFigureOut">
               <a:rPr lang="en-GB" smtClean="0"/>
-              <a:t>11/09/2012</a:t>
+              <a:t>04/10/2012</a:t>
             </a:fld>
             <a:endParaRPr lang="en-GB"/>
           </a:p>
@@ -6185,7 +6185,7 @@
                 </a:solidFill>
               </a:rPr>
               <a:pPr/>
-              <a:t>11/09/2012</a:t>
+              <a:t>4/10/2012</a:t>
             </a:fld>
             <a:endParaRPr lang="nl-BE">
               <a:solidFill>
@@ -10094,11 +10094,6 @@
               </a:rPr>
               <a:t>h</a:t>
             </a:r>
-            <a:endParaRPr lang="nl-BE" sz="1200" dirty="0">
-              <a:solidFill>
-                <a:prstClr val="black"/>
-              </a:solidFill>
-            </a:endParaRPr>
           </a:p>
         </p:txBody>
       </p:sp>
@@ -10326,11 +10321,6 @@
               </a:rPr>
               <a:t>EBUCoreProcessor\include\metadata\</a:t>
             </a:r>
-            <a:endParaRPr lang="nl-BE" sz="1200" b="1" dirty="0" smtClean="0">
-              <a:solidFill>
-                <a:prstClr val="black"/>
-              </a:solidFill>
-            </a:endParaRPr>
           </a:p>
           <a:p>
             <a:pPr algn="ctr"/>
@@ -12556,7 +12546,7 @@
         </p:nvSpPr>
         <p:spPr>
           <a:xfrm>
-            <a:off x="5774364" y="1284962"/>
+            <a:off x="5774364" y="836712"/>
             <a:ext cx="1129437" cy="540032"/>
           </a:xfrm>
           <a:prstGeom prst="rect">
@@ -12629,8 +12619,8 @@
         </p:nvSpPr>
         <p:spPr>
           <a:xfrm>
-            <a:off x="5774364" y="2080268"/>
-            <a:ext cx="1129436" cy="457430"/>
+            <a:off x="5663995" y="2080268"/>
+            <a:ext cx="1373715" cy="457430"/>
           </a:xfrm>
           <a:prstGeom prst="rect">
             <a:avLst/>
@@ -12663,14 +12653,24 @@
           <a:p>
             <a:pPr algn="ctr"/>
             <a:r>
-              <a:rPr lang="nl-BE" sz="1000" i="1" dirty="0">
+              <a:rPr lang="nl-BE" sz="1000" i="1" dirty="0" smtClean="0">
                 <a:solidFill>
                   <a:schemeClr val="bg2">
                     <a:lumMod val="50000"/>
                   </a:schemeClr>
                 </a:solidFill>
               </a:rPr>
-              <a:t>gen_classes</a:t>
+              <a:t>gen_ebucore_classes</a:t>
+            </a:r>
+            <a:r>
+              <a:rPr lang="nl-BE" sz="1000" i="1" dirty="0">
+                <a:solidFill>
+                  <a:schemeClr val="bg2">
+                    <a:lumMod val="50000"/>
+                  </a:schemeClr>
+                </a:solidFill>
+              </a:rPr>
+              <a:t/>
             </a:r>
             <a:br>
               <a:rPr lang="nl-BE" sz="1000" i="1" dirty="0">
@@ -12704,9 +12704,9 @@
           <p:nvPr/>
         </p:nvCxnSpPr>
         <p:spPr>
-          <a:xfrm rot="16200000" flipH="1">
-            <a:off x="6217468" y="2659312"/>
-            <a:ext cx="243230" cy="2"/>
+          <a:xfrm rot="5400000">
+            <a:off x="6223354" y="2653429"/>
+            <a:ext cx="243230" cy="11769"/>
           </a:xfrm>
           <a:prstGeom prst="bentConnector3">
             <a:avLst>
@@ -12742,14 +12742,14 @@
           <p:cNvPr id="219" name="Elbow Connector 218"/>
           <p:cNvCxnSpPr>
             <a:stCxn id="212" idx="2"/>
-            <a:endCxn id="214" idx="0"/>
+            <a:endCxn id="65" idx="0"/>
           </p:cNvCxnSpPr>
           <p:nvPr/>
         </p:nvCxnSpPr>
         <p:spPr>
-          <a:xfrm rot="5400000">
-            <a:off x="6211446" y="1952631"/>
-            <a:ext cx="255274" cy="1"/>
+          <a:xfrm rot="16200000" flipH="1">
+            <a:off x="6252291" y="1463535"/>
+            <a:ext cx="180048" cy="6465"/>
           </a:xfrm>
           <a:prstGeom prst="bentConnector3">
             <a:avLst>
@@ -13141,6 +13141,110 @@
           </a:p>
         </p:txBody>
       </p:sp>
+      <p:sp>
+        <p:nvSpPr>
+          <p:cNvPr id="65" name="Rectangle 64"/>
+          <p:cNvSpPr/>
+          <p:nvPr/>
+        </p:nvSpPr>
+        <p:spPr>
+          <a:xfrm>
+            <a:off x="5780830" y="1556792"/>
+            <a:ext cx="1129436" cy="339968"/>
+          </a:xfrm>
+          <a:prstGeom prst="rect">
+            <a:avLst/>
+          </a:prstGeom>
+          <a:ln>
+            <a:solidFill>
+              <a:schemeClr val="bg2">
+                <a:lumMod val="75000"/>
+              </a:schemeClr>
+            </a:solidFill>
+          </a:ln>
+        </p:spPr>
+        <p:style>
+          <a:lnRef idx="1">
+            <a:schemeClr val="accent3"/>
+          </a:lnRef>
+          <a:fillRef idx="2">
+            <a:schemeClr val="accent3"/>
+          </a:fillRef>
+          <a:effectRef idx="1">
+            <a:schemeClr val="accent3"/>
+          </a:effectRef>
+          <a:fontRef idx="minor">
+            <a:schemeClr val="dk1"/>
+          </a:fontRef>
+        </p:style>
+        <p:txBody>
+          <a:bodyPr rtlCol="0" anchor="ctr"/>
+          <a:lstStyle/>
+          <a:p>
+            <a:pPr algn="ctr"/>
+            <a:r>
+              <a:rPr lang="nl-BE" sz="1000" i="1" dirty="0" smtClean="0">
+                <a:solidFill>
+                  <a:schemeClr val="bg2">
+                    <a:lumMod val="50000"/>
+                  </a:schemeClr>
+                </a:solidFill>
+              </a:rPr>
+              <a:t>dict_convert</a:t>
+            </a:r>
+            <a:endParaRPr lang="nl-BE" sz="1000" i="1" dirty="0">
+              <a:solidFill>
+                <a:schemeClr val="bg2">
+                  <a:lumMod val="50000"/>
+                </a:schemeClr>
+              </a:solidFill>
+            </a:endParaRPr>
+          </a:p>
+        </p:txBody>
+      </p:sp>
+      <p:cxnSp>
+        <p:nvCxnSpPr>
+          <p:cNvPr id="67" name="Elbow Connector 66"/>
+          <p:cNvCxnSpPr>
+            <a:stCxn id="65" idx="2"/>
+            <a:endCxn id="214" idx="0"/>
+          </p:cNvCxnSpPr>
+          <p:nvPr/>
+        </p:nvCxnSpPr>
+        <p:spPr>
+          <a:xfrm rot="16200000" flipH="1">
+            <a:off x="6256446" y="1985861"/>
+            <a:ext cx="183508" cy="5305"/>
+          </a:xfrm>
+          <a:prstGeom prst="bentConnector3">
+            <a:avLst>
+              <a:gd name="adj1" fmla="val 50000"/>
+            </a:avLst>
+          </a:prstGeom>
+          <a:ln w="25400">
+            <a:solidFill>
+              <a:schemeClr val="bg2">
+                <a:lumMod val="75000"/>
+              </a:schemeClr>
+            </a:solidFill>
+            <a:tailEnd type="arrow"/>
+          </a:ln>
+        </p:spPr>
+        <p:style>
+          <a:lnRef idx="1">
+            <a:schemeClr val="accent1"/>
+          </a:lnRef>
+          <a:fillRef idx="0">
+            <a:schemeClr val="accent1"/>
+          </a:fillRef>
+          <a:effectRef idx="0">
+            <a:schemeClr val="accent1"/>
+          </a:effectRef>
+          <a:fontRef idx="minor">
+            <a:schemeClr val="tx1"/>
+          </a:fontRef>
+        </p:style>
+      </p:cxnSp>
     </p:spTree>
     <p:extLst>
       <p:ext uri="{BB962C8B-B14F-4D97-AF65-F5344CB8AC3E}">

</xml_diff>

<commit_message>
Updated figures to more closely match changes in the SDK.
</commit_message>
<xml_diff>
--- a/doc/EBU MXF SDK - EBUCore - images.pptx
+++ b/doc/EBU MXF SDK - EBUCore - images.pptx
@@ -8,9 +8,10 @@
   <p:sldIdLst>
     <p:sldId id="256" r:id="rId3"/>
     <p:sldId id="257" r:id="rId4"/>
-    <p:sldId id="258" r:id="rId5"/>
-    <p:sldId id="260" r:id="rId6"/>
-    <p:sldId id="259" r:id="rId7"/>
+    <p:sldId id="261" r:id="rId5"/>
+    <p:sldId id="258" r:id="rId6"/>
+    <p:sldId id="260" r:id="rId7"/>
+    <p:sldId id="259" r:id="rId8"/>
   </p:sldIdLst>
   <p:sldSz cx="9144000" cy="6858000" type="screen4x3"/>
   <p:notesSz cx="6858000" cy="9144000"/>
@@ -293,7 +294,7 @@
           <a:p>
             <a:fld id="{F0AA596B-07FD-418F-9BC7-89A9D7D4BC61}" type="datetimeFigureOut">
               <a:rPr lang="en-GB" smtClean="0"/>
-              <a:t>04/10/2012</a:t>
+              <a:t>16/12/2012</a:t>
             </a:fld>
             <a:endParaRPr lang="en-GB"/>
           </a:p>
@@ -463,7 +464,7 @@
           <a:p>
             <a:fld id="{F0AA596B-07FD-418F-9BC7-89A9D7D4BC61}" type="datetimeFigureOut">
               <a:rPr lang="en-GB" smtClean="0"/>
-              <a:t>04/10/2012</a:t>
+              <a:t>16/12/2012</a:t>
             </a:fld>
             <a:endParaRPr lang="en-GB"/>
           </a:p>
@@ -643,7 +644,7 @@
           <a:p>
             <a:fld id="{F0AA596B-07FD-418F-9BC7-89A9D7D4BC61}" type="datetimeFigureOut">
               <a:rPr lang="en-GB" smtClean="0"/>
-              <a:t>04/10/2012</a:t>
+              <a:t>16/12/2012</a:t>
             </a:fld>
             <a:endParaRPr lang="en-GB"/>
           </a:p>
@@ -912,7 +913,7 @@
                 </a:solidFill>
               </a:rPr>
               <a:pPr/>
-              <a:t>4/10/2012</a:t>
+              <a:t>16/12/2012</a:t>
             </a:fld>
             <a:endParaRPr lang="nl-BE">
               <a:solidFill>
@@ -1210,7 +1211,7 @@
                 </a:solidFill>
               </a:rPr>
               <a:pPr/>
-              <a:t>4/10/2012</a:t>
+              <a:t>16/12/2012</a:t>
             </a:fld>
             <a:endParaRPr lang="nl-BE">
               <a:solidFill>
@@ -1488,7 +1489,7 @@
                 </a:solidFill>
               </a:rPr>
               <a:pPr/>
-              <a:t>4/10/2012</a:t>
+              <a:t>16/12/2012</a:t>
             </a:fld>
             <a:endParaRPr lang="nl-BE">
               <a:solidFill>
@@ -1808,7 +1809,7 @@
                 </a:solidFill>
               </a:rPr>
               <a:pPr/>
-              <a:t>4/10/2012</a:t>
+              <a:t>16/12/2012</a:t>
             </a:fld>
             <a:endParaRPr lang="nl-BE">
               <a:solidFill>
@@ -2262,7 +2263,7 @@
                 </a:solidFill>
               </a:rPr>
               <a:pPr/>
-              <a:t>4/10/2012</a:t>
+              <a:t>16/12/2012</a:t>
             </a:fld>
             <a:endParaRPr lang="nl-BE">
               <a:solidFill>
@@ -2412,7 +2413,7 @@
                 </a:solidFill>
               </a:rPr>
               <a:pPr/>
-              <a:t>4/10/2012</a:t>
+              <a:t>16/12/2012</a:t>
             </a:fld>
             <a:endParaRPr lang="nl-BE">
               <a:solidFill>
@@ -2539,7 +2540,7 @@
                 </a:solidFill>
               </a:rPr>
               <a:pPr/>
-              <a:t>4/10/2012</a:t>
+              <a:t>16/12/2012</a:t>
             </a:fld>
             <a:endParaRPr lang="nl-BE">
               <a:solidFill>
@@ -2848,7 +2849,7 @@
                 </a:solidFill>
               </a:rPr>
               <a:pPr/>
-              <a:t>4/10/2012</a:t>
+              <a:t>16/12/2012</a:t>
             </a:fld>
             <a:endParaRPr lang="nl-BE">
               <a:solidFill>
@@ -3043,7 +3044,7 @@
           <a:p>
             <a:fld id="{F0AA596B-07FD-418F-9BC7-89A9D7D4BC61}" type="datetimeFigureOut">
               <a:rPr lang="en-GB" smtClean="0"/>
-              <a:t>04/10/2012</a:t>
+              <a:t>16/12/2012</a:t>
             </a:fld>
             <a:endParaRPr lang="en-GB"/>
           </a:p>
@@ -3307,7 +3308,7 @@
                 </a:solidFill>
               </a:rPr>
               <a:pPr/>
-              <a:t>4/10/2012</a:t>
+              <a:t>16/12/2012</a:t>
             </a:fld>
             <a:endParaRPr lang="nl-BE">
               <a:solidFill>
@@ -3509,7 +3510,7 @@
                 </a:solidFill>
               </a:rPr>
               <a:pPr/>
-              <a:t>4/10/2012</a:t>
+              <a:t>16/12/2012</a:t>
             </a:fld>
             <a:endParaRPr lang="nl-BE">
               <a:solidFill>
@@ -3721,7 +3722,7 @@
                 </a:solidFill>
               </a:rPr>
               <a:pPr/>
-              <a:t>4/10/2012</a:t>
+              <a:t>16/12/2012</a:t>
             </a:fld>
             <a:endParaRPr lang="nl-BE">
               <a:solidFill>
@@ -3992,7 +3993,7 @@
           <a:p>
             <a:fld id="{F0AA596B-07FD-418F-9BC7-89A9D7D4BC61}" type="datetimeFigureOut">
               <a:rPr lang="en-GB" smtClean="0"/>
-              <a:t>04/10/2012</a:t>
+              <a:t>16/12/2012</a:t>
             </a:fld>
             <a:endParaRPr lang="en-GB"/>
           </a:p>
@@ -4280,7 +4281,7 @@
           <a:p>
             <a:fld id="{F0AA596B-07FD-418F-9BC7-89A9D7D4BC61}" type="datetimeFigureOut">
               <a:rPr lang="en-GB" smtClean="0"/>
-              <a:t>04/10/2012</a:t>
+              <a:t>16/12/2012</a:t>
             </a:fld>
             <a:endParaRPr lang="en-GB"/>
           </a:p>
@@ -4702,7 +4703,7 @@
           <a:p>
             <a:fld id="{F0AA596B-07FD-418F-9BC7-89A9D7D4BC61}" type="datetimeFigureOut">
               <a:rPr lang="en-GB" smtClean="0"/>
-              <a:t>04/10/2012</a:t>
+              <a:t>16/12/2012</a:t>
             </a:fld>
             <a:endParaRPr lang="en-GB"/>
           </a:p>
@@ -4820,7 +4821,7 @@
           <a:p>
             <a:fld id="{F0AA596B-07FD-418F-9BC7-89A9D7D4BC61}" type="datetimeFigureOut">
               <a:rPr lang="en-GB" smtClean="0"/>
-              <a:t>04/10/2012</a:t>
+              <a:t>16/12/2012</a:t>
             </a:fld>
             <a:endParaRPr lang="en-GB"/>
           </a:p>
@@ -4915,7 +4916,7 @@
           <a:p>
             <a:fld id="{F0AA596B-07FD-418F-9BC7-89A9D7D4BC61}" type="datetimeFigureOut">
               <a:rPr lang="en-GB" smtClean="0"/>
-              <a:t>04/10/2012</a:t>
+              <a:t>16/12/2012</a:t>
             </a:fld>
             <a:endParaRPr lang="en-GB"/>
           </a:p>
@@ -5192,7 +5193,7 @@
           <a:p>
             <a:fld id="{F0AA596B-07FD-418F-9BC7-89A9D7D4BC61}" type="datetimeFigureOut">
               <a:rPr lang="en-GB" smtClean="0"/>
-              <a:t>04/10/2012</a:t>
+              <a:t>16/12/2012</a:t>
             </a:fld>
             <a:endParaRPr lang="en-GB"/>
           </a:p>
@@ -5445,7 +5446,7 @@
           <a:p>
             <a:fld id="{F0AA596B-07FD-418F-9BC7-89A9D7D4BC61}" type="datetimeFigureOut">
               <a:rPr lang="en-GB" smtClean="0"/>
-              <a:t>04/10/2012</a:t>
+              <a:t>16/12/2012</a:t>
             </a:fld>
             <a:endParaRPr lang="en-GB"/>
           </a:p>
@@ -5658,7 +5659,7 @@
           <a:p>
             <a:fld id="{F0AA596B-07FD-418F-9BC7-89A9D7D4BC61}" type="datetimeFigureOut">
               <a:rPr lang="en-GB" smtClean="0"/>
-              <a:t>04/10/2012</a:t>
+              <a:t>16/12/2012</a:t>
             </a:fld>
             <a:endParaRPr lang="en-GB"/>
           </a:p>
@@ -6185,7 +6186,7 @@
                 </a:solidFill>
               </a:rPr>
               <a:pPr/>
-              <a:t>4/10/2012</a:t>
+              <a:t>16/12/2012</a:t>
             </a:fld>
             <a:endParaRPr lang="nl-BE">
               <a:solidFill>
@@ -8849,6 +8850,31 @@
       </p:grpSpPr>
       <p:sp>
         <p:nvSpPr>
+          <p:cNvPr id="2" name="Title 1"/>
+          <p:cNvSpPr>
+            <a:spLocks noGrp="1"/>
+          </p:cNvSpPr>
+          <p:nvPr>
+            <p:ph type="title"/>
+          </p:nvPr>
+        </p:nvSpPr>
+        <p:spPr/>
+        <p:txBody>
+          <a:bodyPr>
+            <a:normAutofit/>
+          </a:bodyPr>
+          <a:lstStyle/>
+          <a:p>
+            <a:r>
+              <a:rPr lang="en-US" dirty="0" smtClean="0"/>
+              <a:t>Analyzer</a:t>
+            </a:r>
+            <a:endParaRPr lang="en-GB" dirty="0"/>
+          </a:p>
+        </p:txBody>
+      </p:sp>
+      <p:sp>
+        <p:nvSpPr>
           <p:cNvPr id="3" name="Content Placeholder 2"/>
           <p:cNvSpPr>
             <a:spLocks noGrp="1"/>
@@ -8859,7 +8885,7 @@
         </p:nvSpPr>
         <p:spPr>
           <a:xfrm>
-            <a:off x="467544" y="1500534"/>
+            <a:off x="457200" y="1556792"/>
             <a:ext cx="8229600" cy="4525963"/>
           </a:xfrm>
         </p:spPr>
@@ -8873,14 +8899,14 @@
       </p:sp>
       <p:sp>
         <p:nvSpPr>
-          <p:cNvPr id="54" name="Rectangle 53"/>
+          <p:cNvPr id="5" name="Rectangle 4"/>
           <p:cNvSpPr/>
           <p:nvPr/>
         </p:nvSpPr>
         <p:spPr>
           <a:xfrm>
-            <a:off x="467544" y="2557378"/>
-            <a:ext cx="1368152" cy="1548172"/>
+            <a:off x="5884759" y="4037471"/>
+            <a:ext cx="960386" cy="581993"/>
           </a:xfrm>
           <a:prstGeom prst="rect">
             <a:avLst/>
@@ -8901,57 +8927,57 @@
           </a:fontRef>
         </p:style>
         <p:txBody>
-          <a:bodyPr rtlCol="0" anchor="b"/>
+          <a:bodyPr rtlCol="0" anchor="ctr"/>
           <a:lstStyle/>
           <a:p>
             <a:pPr algn="ctr"/>
             <a:r>
-              <a:rPr lang="nl-BE" sz="1200" dirty="0" smtClean="0">
+              <a:rPr lang="nl-BE" sz="1200" dirty="0">
                 <a:solidFill>
                   <a:prstClr val="black"/>
                 </a:solidFill>
               </a:rPr>
-              <a:t>libMXF++</a:t>
-            </a:r>
-            <a:endParaRPr lang="nl-BE" sz="1200" dirty="0">
-              <a:solidFill>
-                <a:prstClr val="black"/>
-              </a:solidFill>
-            </a:endParaRPr>
-          </a:p>
-        </p:txBody>
-      </p:sp>
-      <p:sp>
-        <p:nvSpPr>
-          <p:cNvPr id="2" name="Title 1"/>
-          <p:cNvSpPr>
-            <a:spLocks noGrp="1"/>
-          </p:cNvSpPr>
-          <p:nvPr>
-            <p:ph type="title"/>
-          </p:nvPr>
-        </p:nvSpPr>
-        <p:spPr/>
-        <p:txBody>
-          <a:bodyPr>
-            <a:normAutofit/>
-          </a:bodyPr>
-          <a:lstStyle/>
-          <a:p>
-            <a:endParaRPr lang="en-GB" dirty="0"/>
-          </a:p>
-        </p:txBody>
-      </p:sp>
-      <p:sp>
-        <p:nvSpPr>
-          <p:cNvPr id="197" name="Rectangle 196"/>
+              <a:t>Compressed</a:t>
+            </a:r>
+            <a:br>
+              <a:rPr lang="nl-BE" sz="1200" dirty="0">
+                <a:solidFill>
+                  <a:prstClr val="black"/>
+                </a:solidFill>
+              </a:rPr>
+            </a:br>
+            <a:r>
+              <a:rPr lang="nl-BE" sz="1200" dirty="0">
+                <a:solidFill>
+                  <a:prstClr val="black"/>
+                </a:solidFill>
+              </a:rPr>
+              <a:t>Video</a:t>
+            </a:r>
+          </a:p>
+          <a:p>
+            <a:pPr algn="ctr"/>
+            <a:r>
+              <a:rPr lang="nl-BE" sz="1200" dirty="0">
+                <a:solidFill>
+                  <a:prstClr val="black"/>
+                </a:solidFill>
+              </a:rPr>
+              <a:t>Frames</a:t>
+            </a:r>
+          </a:p>
+        </p:txBody>
+      </p:sp>
+      <p:sp>
+        <p:nvSpPr>
+          <p:cNvPr id="6" name="Rectangle 5"/>
           <p:cNvSpPr/>
           <p:nvPr/>
         </p:nvSpPr>
         <p:spPr>
           <a:xfrm>
-            <a:off x="586902" y="2701394"/>
-            <a:ext cx="1129437" cy="630070"/>
+            <a:off x="6093956" y="3935907"/>
+            <a:ext cx="960386" cy="581993"/>
           </a:xfrm>
           <a:prstGeom prst="rect">
             <a:avLst/>
@@ -8977,31 +9003,52 @@
           <a:p>
             <a:pPr algn="ctr"/>
             <a:r>
-              <a:rPr lang="nl-BE" sz="1200" dirty="0" smtClean="0">
+              <a:rPr lang="nl-BE" sz="1200" dirty="0">
                 <a:solidFill>
                   <a:prstClr val="black"/>
                 </a:solidFill>
               </a:rPr>
-              <a:t>libMXF</a:t>
-            </a:r>
-            <a:endParaRPr lang="nl-BE" sz="1200" dirty="0">
-              <a:solidFill>
-                <a:prstClr val="black"/>
-              </a:solidFill>
-            </a:endParaRPr>
-          </a:p>
-        </p:txBody>
-      </p:sp>
-      <p:sp>
-        <p:nvSpPr>
-          <p:cNvPr id="58" name="Rectangle 57"/>
+              <a:t>Compressed</a:t>
+            </a:r>
+            <a:br>
+              <a:rPr lang="nl-BE" sz="1200" dirty="0">
+                <a:solidFill>
+                  <a:prstClr val="black"/>
+                </a:solidFill>
+              </a:rPr>
+            </a:br>
+            <a:r>
+              <a:rPr lang="nl-BE" sz="1200" dirty="0">
+                <a:solidFill>
+                  <a:prstClr val="black"/>
+                </a:solidFill>
+              </a:rPr>
+              <a:t>Video</a:t>
+            </a:r>
+          </a:p>
+          <a:p>
+            <a:pPr algn="ctr"/>
+            <a:r>
+              <a:rPr lang="nl-BE" sz="1200" dirty="0">
+                <a:solidFill>
+                  <a:prstClr val="black"/>
+                </a:solidFill>
+              </a:rPr>
+              <a:t>Frames</a:t>
+            </a:r>
+          </a:p>
+        </p:txBody>
+      </p:sp>
+      <p:sp>
+        <p:nvSpPr>
+          <p:cNvPr id="7" name="Rectangle 6"/>
           <p:cNvSpPr/>
           <p:nvPr/>
         </p:nvSpPr>
         <p:spPr>
           <a:xfrm>
-            <a:off x="2840886" y="2557378"/>
-            <a:ext cx="1367739" cy="684076"/>
+            <a:off x="5884759" y="3182727"/>
+            <a:ext cx="960386" cy="574403"/>
           </a:xfrm>
           <a:prstGeom prst="rect">
             <a:avLst/>
@@ -9027,31 +9074,56 @@
           <a:p>
             <a:pPr algn="ctr"/>
             <a:r>
-              <a:rPr lang="nl-BE" sz="1200" dirty="0" smtClean="0">
+              <a:rPr lang="nl-BE" sz="1200" dirty="0">
                 <a:solidFill>
                   <a:prstClr val="black"/>
                 </a:solidFill>
               </a:rPr>
-              <a:t>BMX</a:t>
-            </a:r>
-            <a:endParaRPr lang="nl-BE" sz="1200" dirty="0">
-              <a:solidFill>
-                <a:prstClr val="black"/>
-              </a:solidFill>
-            </a:endParaRPr>
-          </a:p>
-        </p:txBody>
-      </p:sp>
-      <p:sp>
-        <p:nvSpPr>
-          <p:cNvPr id="57" name="Rectangle 56"/>
+              <a:t>Compressed</a:t>
+            </a:r>
+            <a:br>
+              <a:rPr lang="nl-BE" sz="1200" dirty="0">
+                <a:solidFill>
+                  <a:prstClr val="black"/>
+                </a:solidFill>
+              </a:rPr>
+            </a:br>
+            <a:r>
+              <a:rPr lang="nl-BE" sz="1200" dirty="0">
+                <a:solidFill>
+                  <a:prstClr val="black"/>
+                </a:solidFill>
+              </a:rPr>
+              <a:t>Audio</a:t>
+            </a:r>
+            <a:br>
+              <a:rPr lang="nl-BE" sz="1200" dirty="0">
+                <a:solidFill>
+                  <a:prstClr val="black"/>
+                </a:solidFill>
+              </a:rPr>
+            </a:br>
+            <a:r>
+              <a:rPr lang="nl-BE" sz="1200" dirty="0">
+                <a:solidFill>
+                  <a:prstClr val="black"/>
+                </a:solidFill>
+              </a:rPr>
+              <a:t>Samples</a:t>
+            </a:r>
+          </a:p>
+        </p:txBody>
+      </p:sp>
+      <p:sp>
+        <p:nvSpPr>
+          <p:cNvPr id="8" name="Rectangle 7"/>
           <p:cNvSpPr/>
           <p:nvPr/>
         </p:nvSpPr>
         <p:spPr>
           <a:xfrm>
-            <a:off x="2848691" y="3421474"/>
-            <a:ext cx="1368152" cy="684076"/>
+            <a:off x="6093956" y="3106750"/>
+            <a:ext cx="960386" cy="574403"/>
           </a:xfrm>
           <a:prstGeom prst="rect">
             <a:avLst/>
@@ -9077,45 +9149,163 @@
           <a:p>
             <a:pPr algn="ctr"/>
             <a:r>
-              <a:rPr lang="nl-BE" sz="1200" dirty="0" smtClean="0">
+              <a:rPr lang="nl-BE" sz="1200" dirty="0">
                 <a:solidFill>
                   <a:prstClr val="black"/>
                 </a:solidFill>
               </a:rPr>
-              <a:t>EBU SDK</a:t>
-            </a:r>
-            <a:endParaRPr lang="nl-BE" sz="1200" dirty="0">
-              <a:solidFill>
-                <a:prstClr val="black"/>
-              </a:solidFill>
-            </a:endParaRPr>
+              <a:t>Compressed</a:t>
+            </a:r>
+            <a:br>
+              <a:rPr lang="nl-BE" sz="1200" dirty="0">
+                <a:solidFill>
+                  <a:prstClr val="black"/>
+                </a:solidFill>
+              </a:rPr>
+            </a:br>
+            <a:r>
+              <a:rPr lang="nl-BE" sz="1200" dirty="0">
+                <a:solidFill>
+                  <a:prstClr val="black"/>
+                </a:solidFill>
+              </a:rPr>
+              <a:t>Audio</a:t>
+            </a:r>
+            <a:br>
+              <a:rPr lang="nl-BE" sz="1200" dirty="0">
+                <a:solidFill>
+                  <a:prstClr val="black"/>
+                </a:solidFill>
+              </a:rPr>
+            </a:br>
+            <a:r>
+              <a:rPr lang="nl-BE" sz="1200" dirty="0">
+                <a:solidFill>
+                  <a:prstClr val="black"/>
+                </a:solidFill>
+              </a:rPr>
+              <a:t>Samples</a:t>
+            </a:r>
+          </a:p>
+        </p:txBody>
+      </p:sp>
+      <p:sp>
+        <p:nvSpPr>
+          <p:cNvPr id="10" name="Rectangle 9"/>
+          <p:cNvSpPr/>
+          <p:nvPr/>
+        </p:nvSpPr>
+        <p:spPr>
+          <a:xfrm>
+            <a:off x="2048565" y="2435441"/>
+            <a:ext cx="5763795" cy="3801871"/>
+          </a:xfrm>
+          <a:prstGeom prst="rect">
+            <a:avLst/>
+          </a:prstGeom>
+          <a:ln>
+            <a:prstDash val="dash"/>
+          </a:ln>
+        </p:spPr>
+        <p:style>
+          <a:lnRef idx="1">
+            <a:schemeClr val="accent3"/>
+          </a:lnRef>
+          <a:fillRef idx="2">
+            <a:schemeClr val="accent3"/>
+          </a:fillRef>
+          <a:effectRef idx="1">
+            <a:schemeClr val="accent3"/>
+          </a:effectRef>
+          <a:fontRef idx="minor">
+            <a:schemeClr val="dk1"/>
+          </a:fontRef>
+        </p:style>
+        <p:txBody>
+          <a:bodyPr rtlCol="0" anchor="t"/>
+          <a:lstStyle/>
+          <a:p>
+            <a:pPr algn="ctr"/>
+            <a:r>
+              <a:rPr lang="nl-BE" sz="1600" dirty="0">
+                <a:solidFill>
+                  <a:prstClr val="black"/>
+                </a:solidFill>
+              </a:rPr>
+              <a:t>MXF SDK</a:t>
+            </a:r>
+          </a:p>
+        </p:txBody>
+      </p:sp>
+      <p:sp>
+        <p:nvSpPr>
+          <p:cNvPr id="20" name="Rectangle 19"/>
+          <p:cNvSpPr/>
+          <p:nvPr/>
+        </p:nvSpPr>
+        <p:spPr>
+          <a:xfrm>
+            <a:off x="5774365" y="3763405"/>
+            <a:ext cx="1129436" cy="545566"/>
+          </a:xfrm>
+          <a:prstGeom prst="rect">
+            <a:avLst/>
+          </a:prstGeom>
+        </p:spPr>
+        <p:style>
+          <a:lnRef idx="1">
+            <a:schemeClr val="accent3"/>
+          </a:lnRef>
+          <a:fillRef idx="2">
+            <a:schemeClr val="accent3"/>
+          </a:fillRef>
+          <a:effectRef idx="1">
+            <a:schemeClr val="accent3"/>
+          </a:effectRef>
+          <a:fontRef idx="minor">
+            <a:schemeClr val="dk1"/>
+          </a:fontRef>
+        </p:style>
+        <p:txBody>
+          <a:bodyPr rtlCol="0" anchor="ctr"/>
+          <a:lstStyle/>
+          <a:p>
+            <a:pPr algn="ctr"/>
+            <a:r>
+              <a:rPr lang="nl-BE" sz="1200" dirty="0">
+                <a:solidFill>
+                  <a:prstClr val="black"/>
+                </a:solidFill>
+              </a:rPr>
+              <a:t>Structural Metadata</a:t>
+            </a:r>
           </a:p>
         </p:txBody>
       </p:sp>
       <p:cxnSp>
         <p:nvCxnSpPr>
-          <p:cNvPr id="59" name="Elbow Connector 58"/>
+          <p:cNvPr id="25" name="Elbow Connector 24"/>
           <p:cNvCxnSpPr>
-            <a:stCxn id="58" idx="1"/>
-            <a:endCxn id="54" idx="3"/>
+            <a:stCxn id="109" idx="3"/>
           </p:cNvCxnSpPr>
           <p:nvPr/>
         </p:nvCxnSpPr>
         <p:spPr>
-          <a:xfrm rot="10800000" flipV="1">
-            <a:off x="1835696" y="2899416"/>
-            <a:ext cx="1005190" cy="432048"/>
+          <a:xfrm>
+            <a:off x="6903802" y="3230965"/>
+            <a:ext cx="267819" cy="1323"/>
           </a:xfrm>
           <a:prstGeom prst="bentConnector3">
             <a:avLst>
-              <a:gd name="adj1" fmla="val 67215"/>
+              <a:gd name="adj1" fmla="val 50000"/>
             </a:avLst>
           </a:prstGeom>
           <a:ln w="25400">
             <a:solidFill>
               <a:schemeClr val="tx1"/>
             </a:solidFill>
-            <a:tailEnd type="arrow"/>
+            <a:headEnd type="arrow" w="med" len="med"/>
+            <a:tailEnd type="arrow" w="med" len="med"/>
           </a:ln>
         </p:spPr>
         <p:style>
@@ -9135,28 +9325,29 @@
       </p:cxnSp>
       <p:cxnSp>
         <p:nvCxnSpPr>
-          <p:cNvPr id="61" name="Elbow Connector 60"/>
+          <p:cNvPr id="27" name="Elbow Connector 26"/>
           <p:cNvCxnSpPr>
-            <a:stCxn id="57" idx="1"/>
-            <a:endCxn id="54" idx="3"/>
+            <a:stCxn id="15" idx="3"/>
+            <a:endCxn id="20" idx="1"/>
           </p:cNvCxnSpPr>
           <p:nvPr/>
         </p:nvCxnSpPr>
         <p:spPr>
-          <a:xfrm rot="10800000">
-            <a:off x="1835697" y="3331464"/>
-            <a:ext cx="1012995" cy="432048"/>
+          <a:xfrm flipV="1">
+            <a:off x="5392104" y="4036188"/>
+            <a:ext cx="382261" cy="418914"/>
           </a:xfrm>
           <a:prstGeom prst="bentConnector3">
             <a:avLst>
-              <a:gd name="adj1" fmla="val 67552"/>
+              <a:gd name="adj1" fmla="val 50000"/>
             </a:avLst>
           </a:prstGeom>
           <a:ln w="25400">
             <a:solidFill>
               <a:schemeClr val="tx1"/>
             </a:solidFill>
-            <a:tailEnd type="arrow"/>
+            <a:headEnd type="arrow" w="med" len="med"/>
+            <a:tailEnd type="arrow" w="med" len="med"/>
           </a:ln>
         </p:spPr>
         <p:style>
@@ -9174,90 +9365,31 @@
           </a:fontRef>
         </p:style>
       </p:cxnSp>
-      <p:sp>
-        <p:nvSpPr>
-          <p:cNvPr id="22" name="TextBox 21"/>
-          <p:cNvSpPr txBox="1"/>
-          <p:nvPr/>
-        </p:nvSpPr>
-        <p:spPr>
-          <a:xfrm>
-            <a:off x="2069722" y="2629386"/>
-            <a:ext cx="702078" cy="276999"/>
-          </a:xfrm>
-          <a:prstGeom prst="rect">
-            <a:avLst/>
-          </a:prstGeom>
-          <a:noFill/>
-        </p:spPr>
-        <p:txBody>
-          <a:bodyPr wrap="square" rtlCol="0">
-            <a:spAutoFit/>
-          </a:bodyPr>
-          <a:lstStyle/>
-          <a:p>
-            <a:r>
-              <a:rPr lang="en-US" sz="1200" dirty="0" smtClean="0"/>
-              <a:t>«uses»</a:t>
-            </a:r>
-            <a:endParaRPr lang="en-GB" sz="1200" dirty="0"/>
-          </a:p>
-        </p:txBody>
-      </p:sp>
-      <p:sp>
-        <p:nvSpPr>
-          <p:cNvPr id="68" name="TextBox 67"/>
-          <p:cNvSpPr txBox="1"/>
-          <p:nvPr/>
-        </p:nvSpPr>
-        <p:spPr>
-          <a:xfrm>
-            <a:off x="2064786" y="3745940"/>
-            <a:ext cx="702078" cy="276999"/>
-          </a:xfrm>
-          <a:prstGeom prst="rect">
-            <a:avLst/>
-          </a:prstGeom>
-          <a:noFill/>
-        </p:spPr>
-        <p:txBody>
-          <a:bodyPr wrap="square" rtlCol="0">
-            <a:spAutoFit/>
-          </a:bodyPr>
-          <a:lstStyle/>
-          <a:p>
-            <a:r>
-              <a:rPr lang="en-US" sz="1200" dirty="0" smtClean="0"/>
-              <a:t>«uses»</a:t>
-            </a:r>
-            <a:endParaRPr lang="en-GB" sz="1200" dirty="0"/>
-          </a:p>
-        </p:txBody>
-      </p:sp>
       <p:cxnSp>
         <p:nvCxnSpPr>
-          <p:cNvPr id="69" name="Elbow Connector 68"/>
+          <p:cNvPr id="31" name="Elbow Connector 30"/>
           <p:cNvCxnSpPr>
-            <a:stCxn id="57" idx="3"/>
-            <a:endCxn id="58" idx="3"/>
+            <a:stCxn id="14" idx="3"/>
+            <a:endCxn id="173" idx="2"/>
           </p:cNvCxnSpPr>
           <p:nvPr/>
         </p:nvCxnSpPr>
         <p:spPr>
-          <a:xfrm flipH="1" flipV="1">
-            <a:off x="4208625" y="2899416"/>
-            <a:ext cx="8218" cy="864096"/>
+          <a:xfrm>
+            <a:off x="7668344" y="4365104"/>
+            <a:ext cx="360040" cy="4313"/>
           </a:xfrm>
           <a:prstGeom prst="bentConnector3">
             <a:avLst>
-              <a:gd name="adj1" fmla="val -2781699"/>
+              <a:gd name="adj1" fmla="val 50000"/>
             </a:avLst>
           </a:prstGeom>
           <a:ln w="25400">
             <a:solidFill>
               <a:schemeClr val="tx1"/>
             </a:solidFill>
-            <a:tailEnd type="arrow"/>
+            <a:headEnd type="arrow" w="med" len="med"/>
+            <a:tailEnd type="arrow" w="med" len="med"/>
           </a:ln>
         </p:spPr>
         <p:style>
@@ -9275,46 +9407,19 @@
           </a:fontRef>
         </p:style>
       </p:cxnSp>
-      <p:sp>
-        <p:nvSpPr>
-          <p:cNvPr id="72" name="TextBox 71"/>
-          <p:cNvSpPr txBox="1"/>
-          <p:nvPr/>
-        </p:nvSpPr>
-        <p:spPr>
-          <a:xfrm>
-            <a:off x="4445986" y="3147929"/>
-            <a:ext cx="702078" cy="276999"/>
-          </a:xfrm>
-          <a:prstGeom prst="rect">
-            <a:avLst/>
-          </a:prstGeom>
-          <a:noFill/>
-        </p:spPr>
-        <p:txBody>
-          <a:bodyPr wrap="square" rtlCol="0">
-            <a:spAutoFit/>
-          </a:bodyPr>
-          <a:lstStyle/>
-          <a:p>
-            <a:r>
-              <a:rPr lang="en-US" sz="1200" dirty="0" smtClean="0"/>
-              <a:t>«uses»</a:t>
-            </a:r>
-            <a:endParaRPr lang="en-GB" sz="1200" dirty="0"/>
-          </a:p>
-        </p:txBody>
-      </p:sp>
       <p:cxnSp>
         <p:nvCxnSpPr>
-          <p:cNvPr id="73" name="Elbow Connector 72"/>
-          <p:cNvCxnSpPr/>
+          <p:cNvPr id="32" name="Elbow Connector 31"/>
+          <p:cNvCxnSpPr>
+            <a:stCxn id="63" idx="3"/>
+            <a:endCxn id="15" idx="1"/>
+          </p:cNvCxnSpPr>
           <p:nvPr/>
         </p:nvCxnSpPr>
         <p:spPr>
-          <a:xfrm rot="5400000" flipH="1" flipV="1">
-            <a:off x="683567" y="3547490"/>
-            <a:ext cx="432051" cy="1"/>
+          <a:xfrm>
+            <a:off x="1560962" y="4453572"/>
+            <a:ext cx="3011038" cy="1530"/>
           </a:xfrm>
           <a:prstGeom prst="bentConnector3">
             <a:avLst>
@@ -9325,7 +9430,8 @@
             <a:solidFill>
               <a:schemeClr val="tx1"/>
             </a:solidFill>
-            <a:tailEnd type="arrow"/>
+            <a:headEnd type="arrow" w="med" len="med"/>
+            <a:tailEnd type="arrow" w="med" len="med"/>
           </a:ln>
         </p:spPr>
         <p:style>
@@ -9345,44 +9451,14 @@
       </p:cxnSp>
       <p:sp>
         <p:nvSpPr>
-          <p:cNvPr id="76" name="TextBox 75"/>
-          <p:cNvSpPr txBox="1"/>
-          <p:nvPr/>
-        </p:nvSpPr>
-        <p:spPr>
-          <a:xfrm>
-            <a:off x="899592" y="3468941"/>
-            <a:ext cx="936105" cy="276999"/>
-          </a:xfrm>
-          <a:prstGeom prst="rect">
-            <a:avLst/>
-          </a:prstGeom>
-          <a:noFill/>
-        </p:spPr>
-        <p:txBody>
-          <a:bodyPr wrap="square" rtlCol="0">
-            <a:spAutoFit/>
-          </a:bodyPr>
-          <a:lstStyle/>
-          <a:p>
-            <a:r>
-              <a:rPr lang="en-US" sz="1200" dirty="0" smtClean="0"/>
-              <a:t>«extends»</a:t>
-            </a:r>
-            <a:endParaRPr lang="en-GB" sz="1200" dirty="0"/>
-          </a:p>
-        </p:txBody>
-      </p:sp>
-      <p:sp>
-        <p:nvSpPr>
-          <p:cNvPr id="83" name="Rectangle 82"/>
+          <p:cNvPr id="63" name="Rectangle 62"/>
           <p:cNvSpPr/>
           <p:nvPr/>
         </p:nvSpPr>
         <p:spPr>
           <a:xfrm>
-            <a:off x="5868144" y="2556663"/>
-            <a:ext cx="1367739" cy="349722"/>
+            <a:off x="600576" y="3749952"/>
+            <a:ext cx="960386" cy="1407240"/>
           </a:xfrm>
           <a:prstGeom prst="rect">
             <a:avLst/>
@@ -9403,7 +9479,7 @@
           </a:fontRef>
         </p:style>
         <p:txBody>
-          <a:bodyPr rtlCol="0" anchor="ctr"/>
+          <a:bodyPr rtlCol="0" anchor="b"/>
           <a:lstStyle/>
           <a:p>
             <a:pPr algn="ctr"/>
@@ -9413,26 +9489,70 @@
                   <a:prstClr val="black"/>
                 </a:solidFill>
               </a:rPr>
-              <a:t>uriparser</a:t>
-            </a:r>
-            <a:endParaRPr lang="nl-BE" sz="1200" dirty="0">
-              <a:solidFill>
-                <a:prstClr val="black"/>
-              </a:solidFill>
-            </a:endParaRPr>
-          </a:p>
-        </p:txBody>
-      </p:sp>
-      <p:sp>
-        <p:nvSpPr>
-          <p:cNvPr id="84" name="Rectangle 83"/>
+              <a:t>ST-434 </a:t>
+            </a:r>
+            <a:r>
+              <a:rPr lang="nl-BE" sz="1200" dirty="0">
+                <a:solidFill>
+                  <a:prstClr val="black"/>
+                </a:solidFill>
+              </a:rPr>
+              <a:t>Document</a:t>
+            </a:r>
+          </a:p>
+        </p:txBody>
+      </p:sp>
+      <p:pic>
+        <p:nvPicPr>
+          <p:cNvPr id="6146" name="Picture 2" descr="C:\Users\dieter\Dropbox\LimecraftDocuments\presentaties\200px-XML.svg.png"/>
+          <p:cNvPicPr>
+            <a:picLocks noChangeAspect="1" noChangeArrowheads="1"/>
+          </p:cNvPicPr>
+          <p:nvPr/>
+        </p:nvPicPr>
+        <p:blipFill>
+          <a:blip r:embed="rId2" cstate="print">
+            <a:extLst>
+              <a:ext uri="{28A0092B-C50C-407E-A947-70E740481C1C}">
+                <a14:useLocalDpi xmlns:a14="http://schemas.microsoft.com/office/drawing/2010/main" val="0"/>
+              </a:ext>
+            </a:extLst>
+          </a:blip>
+          <a:srcRect/>
+          <a:stretch>
+            <a:fillRect/>
+          </a:stretch>
+        </p:blipFill>
+        <p:spPr bwMode="auto">
+          <a:xfrm>
+            <a:off x="686439" y="3878781"/>
+            <a:ext cx="788659" cy="899071"/>
+          </a:xfrm>
+          <a:prstGeom prst="rect">
+            <a:avLst/>
+          </a:prstGeom>
+          <a:noFill/>
+          <a:extLst>
+            <a:ext uri="{909E8E84-426E-40DD-AFC4-6F175D3DCCD1}">
+              <a14:hiddenFill xmlns:a14="http://schemas.microsoft.com/office/drawing/2010/main">
+                <a:solidFill>
+                  <a:srgbClr val="FFFFFF"/>
+                </a:solidFill>
+              </a14:hiddenFill>
+            </a:ext>
+          </a:extLst>
+        </p:spPr>
+      </p:pic>
+      <p:sp>
+        <p:nvSpPr>
+          <p:cNvPr id="109" name="Rectangle 108"/>
           <p:cNvSpPr/>
           <p:nvPr/>
         </p:nvSpPr>
         <p:spPr>
           <a:xfrm>
-            <a:off x="5868144" y="3421474"/>
-            <a:ext cx="1367739" cy="342038"/>
+            <a:off x="5774365" y="2852937"/>
+            <a:ext cx="1129437" cy="756056"/>
           </a:xfrm>
           <a:prstGeom prst="rect">
             <a:avLst/>
@@ -9458,31 +9578,37 @@
           <a:p>
             <a:pPr algn="ctr"/>
             <a:r>
-              <a:rPr lang="nl-BE" sz="1200" dirty="0" smtClean="0">
+              <a:rPr lang="nl-BE" sz="1200" dirty="0">
                 <a:solidFill>
                   <a:prstClr val="black"/>
                 </a:solidFill>
               </a:rPr>
-              <a:t>Apache Xerces-C++</a:t>
-            </a:r>
-            <a:endParaRPr lang="nl-BE" sz="1200" dirty="0">
-              <a:solidFill>
-                <a:prstClr val="black"/>
-              </a:solidFill>
-            </a:endParaRPr>
-          </a:p>
-        </p:txBody>
-      </p:sp>
-      <p:sp>
-        <p:nvSpPr>
-          <p:cNvPr id="85" name="Rectangle 84"/>
+              <a:t>KLV-based</a:t>
+            </a:r>
+          </a:p>
+          <a:p>
+            <a:pPr algn="ctr"/>
+            <a:r>
+              <a:rPr lang="nl-BE" sz="1200" dirty="0">
+                <a:solidFill>
+                  <a:prstClr val="black"/>
+                </a:solidFill>
+              </a:rPr>
+              <a:t>EBUCore object model</a:t>
+            </a:r>
+          </a:p>
+        </p:txBody>
+      </p:sp>
+      <p:sp>
+        <p:nvSpPr>
+          <p:cNvPr id="137" name="Rectangle 136"/>
           <p:cNvSpPr/>
           <p:nvPr/>
         </p:nvSpPr>
         <p:spPr>
           <a:xfrm>
-            <a:off x="5868144" y="3851920"/>
-            <a:ext cx="1367739" cy="342038"/>
+            <a:off x="5780830" y="5301208"/>
+            <a:ext cx="1129436" cy="756058"/>
           </a:xfrm>
           <a:prstGeom prst="rect">
             <a:avLst/>
@@ -9508,34 +9634,61 @@
           <a:p>
             <a:pPr algn="ctr"/>
             <a:r>
-              <a:rPr lang="nl-BE" sz="1200" dirty="0" smtClean="0">
+              <a:rPr lang="nl-BE" sz="1200" dirty="0">
                 <a:solidFill>
                   <a:prstClr val="black"/>
                 </a:solidFill>
               </a:rPr>
-              <a:t>Codesynthesis XSD</a:t>
-            </a:r>
-            <a:endParaRPr lang="nl-BE" sz="1200" dirty="0">
-              <a:solidFill>
-                <a:prstClr val="black"/>
-              </a:solidFill>
-            </a:endParaRPr>
+              <a:t>Other</a:t>
+            </a:r>
+          </a:p>
+          <a:p>
+            <a:pPr algn="ctr"/>
+            <a:r>
+              <a:rPr lang="nl-BE" sz="1200" dirty="0">
+                <a:solidFill>
+                  <a:prstClr val="black"/>
+                </a:solidFill>
+              </a:rPr>
+              <a:t>KLV-based</a:t>
+            </a:r>
+          </a:p>
+          <a:p>
+            <a:pPr algn="ctr"/>
+            <a:r>
+              <a:rPr lang="nl-BE" sz="1200" dirty="0">
+                <a:solidFill>
+                  <a:prstClr val="black"/>
+                </a:solidFill>
+              </a:rPr>
+              <a:t>metadata</a:t>
+            </a:r>
+          </a:p>
+          <a:p>
+            <a:pPr algn="ctr"/>
+            <a:r>
+              <a:rPr lang="nl-BE" sz="1200" dirty="0">
+                <a:solidFill>
+                  <a:prstClr val="black"/>
+                </a:solidFill>
+              </a:rPr>
+              <a:t>object models</a:t>
+            </a:r>
           </a:p>
         </p:txBody>
       </p:sp>
       <p:cxnSp>
         <p:nvCxnSpPr>
-          <p:cNvPr id="86" name="Elbow Connector 85"/>
+          <p:cNvPr id="147" name="Elbow Connector 146"/>
           <p:cNvCxnSpPr>
-            <a:stCxn id="58" idx="3"/>
-            <a:endCxn id="83" idx="1"/>
+            <a:stCxn id="20" idx="3"/>
           </p:cNvCxnSpPr>
           <p:nvPr/>
         </p:nvCxnSpPr>
         <p:spPr>
           <a:xfrm flipV="1">
-            <a:off x="4208625" y="2731524"/>
-            <a:ext cx="1659519" cy="167892"/>
+            <a:off x="6903801" y="4034656"/>
+            <a:ext cx="269028" cy="1532"/>
           </a:xfrm>
           <a:prstGeom prst="bentConnector3">
             <a:avLst>
@@ -9546,7 +9699,8 @@
             <a:solidFill>
               <a:schemeClr val="tx1"/>
             </a:solidFill>
-            <a:tailEnd type="arrow"/>
+            <a:headEnd type="arrow" w="med" len="med"/>
+            <a:tailEnd type="arrow" w="med" len="med"/>
           </a:ln>
         </p:spPr>
         <p:style>
@@ -9564,79 +9718,18 @@
           </a:fontRef>
         </p:style>
       </p:cxnSp>
-      <p:sp>
-        <p:nvSpPr>
-          <p:cNvPr id="95" name="TextBox 94"/>
-          <p:cNvSpPr txBox="1"/>
-          <p:nvPr/>
-        </p:nvSpPr>
-        <p:spPr>
-          <a:xfrm>
-            <a:off x="4967507" y="3340058"/>
-            <a:ext cx="892170" cy="276999"/>
-          </a:xfrm>
-          <a:prstGeom prst="rect">
-            <a:avLst/>
-          </a:prstGeom>
-          <a:noFill/>
-        </p:spPr>
-        <p:txBody>
-          <a:bodyPr wrap="square" rtlCol="0">
-            <a:spAutoFit/>
-          </a:bodyPr>
-          <a:lstStyle/>
-          <a:p>
-            <a:r>
-              <a:rPr lang="en-US" sz="1200" dirty="0" smtClean="0"/>
-              <a:t>«depends»</a:t>
-            </a:r>
-            <a:endParaRPr lang="en-GB" sz="1200" dirty="0"/>
-          </a:p>
-        </p:txBody>
-      </p:sp>
-      <p:sp>
-        <p:nvSpPr>
-          <p:cNvPr id="102" name="TextBox 101"/>
-          <p:cNvSpPr txBox="1"/>
-          <p:nvPr/>
-        </p:nvSpPr>
-        <p:spPr>
-          <a:xfrm>
-            <a:off x="4950573" y="2486995"/>
-            <a:ext cx="892170" cy="276999"/>
-          </a:xfrm>
-          <a:prstGeom prst="rect">
-            <a:avLst/>
-          </a:prstGeom>
-          <a:noFill/>
-        </p:spPr>
-        <p:txBody>
-          <a:bodyPr wrap="square" rtlCol="0">
-            <a:spAutoFit/>
-          </a:bodyPr>
-          <a:lstStyle/>
-          <a:p>
-            <a:r>
-              <a:rPr lang="en-US" sz="1200" dirty="0" smtClean="0"/>
-              <a:t>«depends»</a:t>
-            </a:r>
-            <a:endParaRPr lang="en-GB" sz="1200" dirty="0"/>
-          </a:p>
-        </p:txBody>
-      </p:sp>
       <p:cxnSp>
         <p:nvCxnSpPr>
-          <p:cNvPr id="103" name="Elbow Connector 102"/>
+          <p:cNvPr id="150" name="Elbow Connector 149"/>
           <p:cNvCxnSpPr>
-            <a:stCxn id="57" idx="3"/>
-            <a:endCxn id="84" idx="1"/>
+            <a:stCxn id="137" idx="3"/>
           </p:cNvCxnSpPr>
           <p:nvPr/>
         </p:nvCxnSpPr>
         <p:spPr>
           <a:xfrm flipV="1">
-            <a:off x="4216843" y="3592493"/>
-            <a:ext cx="1651301" cy="171019"/>
+            <a:off x="6910266" y="5677804"/>
+            <a:ext cx="262563" cy="1433"/>
           </a:xfrm>
           <a:prstGeom prst="bentConnector3">
             <a:avLst>
@@ -9647,7 +9740,8 @@
             <a:solidFill>
               <a:schemeClr val="tx1"/>
             </a:solidFill>
-            <a:tailEnd type="arrow"/>
+            <a:headEnd type="arrow" w="med" len="med"/>
+            <a:tailEnd type="arrow" w="med" len="med"/>
           </a:ln>
         </p:spPr>
         <p:style>
@@ -9665,49 +9759,19 @@
           </a:fontRef>
         </p:style>
       </p:cxnSp>
-      <p:sp>
-        <p:nvSpPr>
-          <p:cNvPr id="104" name="TextBox 103"/>
-          <p:cNvSpPr txBox="1"/>
-          <p:nvPr/>
-        </p:nvSpPr>
-        <p:spPr>
-          <a:xfrm>
-            <a:off x="4980413" y="3996189"/>
-            <a:ext cx="892170" cy="276999"/>
-          </a:xfrm>
-          <a:prstGeom prst="rect">
-            <a:avLst/>
-          </a:prstGeom>
-          <a:noFill/>
-        </p:spPr>
-        <p:txBody>
-          <a:bodyPr wrap="square" rtlCol="0">
-            <a:spAutoFit/>
-          </a:bodyPr>
-          <a:lstStyle/>
-          <a:p>
-            <a:r>
-              <a:rPr lang="en-US" sz="1200" dirty="0" smtClean="0"/>
-              <a:t>«depends»</a:t>
-            </a:r>
-            <a:endParaRPr lang="en-GB" sz="1200" dirty="0"/>
-          </a:p>
-        </p:txBody>
-      </p:sp>
       <p:cxnSp>
         <p:nvCxnSpPr>
-          <p:cNvPr id="110" name="Elbow Connector 109"/>
+          <p:cNvPr id="156" name="Elbow Connector 155"/>
           <p:cNvCxnSpPr>
-            <a:stCxn id="57" idx="3"/>
-            <a:endCxn id="85" idx="1"/>
+            <a:stCxn id="15" idx="3"/>
+            <a:endCxn id="137" idx="1"/>
           </p:cNvCxnSpPr>
           <p:nvPr/>
         </p:nvCxnSpPr>
         <p:spPr>
           <a:xfrm>
-            <a:off x="4216843" y="3763512"/>
-            <a:ext cx="1651301" cy="259427"/>
+            <a:off x="5392104" y="4455102"/>
+            <a:ext cx="388726" cy="1224135"/>
           </a:xfrm>
           <a:prstGeom prst="bentConnector3">
             <a:avLst>
@@ -9718,7 +9782,536 @@
             <a:solidFill>
               <a:schemeClr val="tx1"/>
             </a:solidFill>
-            <a:tailEnd type="arrow"/>
+            <a:headEnd type="arrow" w="med" len="med"/>
+            <a:tailEnd type="arrow" w="med" len="med"/>
+          </a:ln>
+        </p:spPr>
+        <p:style>
+          <a:lnRef idx="1">
+            <a:schemeClr val="accent1"/>
+          </a:lnRef>
+          <a:fillRef idx="0">
+            <a:schemeClr val="accent1"/>
+          </a:fillRef>
+          <a:effectRef idx="0">
+            <a:schemeClr val="accent1"/>
+          </a:effectRef>
+          <a:fontRef idx="minor">
+            <a:schemeClr val="tx1"/>
+          </a:fontRef>
+        </p:style>
+      </p:cxnSp>
+      <p:sp>
+        <p:nvSpPr>
+          <p:cNvPr id="173" name="Can 172"/>
+          <p:cNvSpPr/>
+          <p:nvPr/>
+        </p:nvSpPr>
+        <p:spPr>
+          <a:xfrm>
+            <a:off x="8028384" y="3941682"/>
+            <a:ext cx="907071" cy="855470"/>
+          </a:xfrm>
+          <a:prstGeom prst="can">
+            <a:avLst/>
+          </a:prstGeom>
+        </p:spPr>
+        <p:style>
+          <a:lnRef idx="1">
+            <a:schemeClr val="accent3"/>
+          </a:lnRef>
+          <a:fillRef idx="2">
+            <a:schemeClr val="accent3"/>
+          </a:fillRef>
+          <a:effectRef idx="1">
+            <a:schemeClr val="accent3"/>
+          </a:effectRef>
+          <a:fontRef idx="minor">
+            <a:schemeClr val="dk1"/>
+          </a:fontRef>
+        </p:style>
+        <p:txBody>
+          <a:bodyPr rtlCol="0" anchor="ctr"/>
+          <a:lstStyle/>
+          <a:p>
+            <a:pPr algn="ctr"/>
+            <a:endParaRPr lang="en-GB">
+              <a:solidFill>
+                <a:prstClr val="black"/>
+              </a:solidFill>
+            </a:endParaRPr>
+          </a:p>
+        </p:txBody>
+      </p:sp>
+      <p:sp>
+        <p:nvSpPr>
+          <p:cNvPr id="174" name="Rectangle 173"/>
+          <p:cNvSpPr/>
+          <p:nvPr/>
+        </p:nvSpPr>
+        <p:spPr>
+          <a:xfrm>
+            <a:off x="8136205" y="4050146"/>
+            <a:ext cx="691430" cy="690238"/>
+          </a:xfrm>
+          <a:prstGeom prst="rect">
+            <a:avLst/>
+          </a:prstGeom>
+        </p:spPr>
+        <p:style>
+          <a:lnRef idx="1">
+            <a:schemeClr val="accent3"/>
+          </a:lnRef>
+          <a:fillRef idx="2">
+            <a:schemeClr val="accent3"/>
+          </a:fillRef>
+          <a:effectRef idx="1">
+            <a:schemeClr val="accent3"/>
+          </a:effectRef>
+          <a:fontRef idx="minor">
+            <a:schemeClr val="dk1"/>
+          </a:fontRef>
+        </p:style>
+        <p:txBody>
+          <a:bodyPr rtlCol="0" anchor="ctr"/>
+          <a:lstStyle/>
+          <a:p>
+            <a:pPr algn="ctr"/>
+            <a:endParaRPr lang="nl-BE" sz="1600" dirty="0">
+              <a:solidFill>
+                <a:prstClr val="black"/>
+              </a:solidFill>
+            </a:endParaRPr>
+          </a:p>
+        </p:txBody>
+      </p:sp>
+      <p:pic>
+        <p:nvPicPr>
+          <p:cNvPr id="175" name="Picture 7" descr="mxflogo"/>
+          <p:cNvPicPr>
+            <a:picLocks noChangeAspect="1" noChangeArrowheads="1"/>
+          </p:cNvPicPr>
+          <p:nvPr/>
+        </p:nvPicPr>
+        <p:blipFill>
+          <a:blip r:embed="rId3"/>
+          <a:srcRect/>
+          <a:stretch>
+            <a:fillRect/>
+          </a:stretch>
+        </p:blipFill>
+        <p:spPr bwMode="auto">
+          <a:xfrm>
+            <a:off x="8134300" y="4308336"/>
+            <a:ext cx="705551" cy="163956"/>
+          </a:xfrm>
+          <a:prstGeom prst="rect">
+            <a:avLst/>
+          </a:prstGeom>
+          <a:noFill/>
+        </p:spPr>
+      </p:pic>
+      <p:cxnSp>
+        <p:nvCxnSpPr>
+          <p:cNvPr id="180" name="Elbow Connector 179"/>
+          <p:cNvCxnSpPr>
+            <a:stCxn id="15" idx="3"/>
+            <a:endCxn id="109" idx="1"/>
+          </p:cNvCxnSpPr>
+          <p:nvPr/>
+        </p:nvCxnSpPr>
+        <p:spPr>
+          <a:xfrm flipV="1">
+            <a:off x="5392104" y="3230965"/>
+            <a:ext cx="382261" cy="1224137"/>
+          </a:xfrm>
+          <a:prstGeom prst="bentConnector3">
+            <a:avLst>
+              <a:gd name="adj1" fmla="val 50000"/>
+            </a:avLst>
+          </a:prstGeom>
+          <a:ln w="25400">
+            <a:solidFill>
+              <a:schemeClr val="tx1"/>
+            </a:solidFill>
+            <a:headEnd type="arrow" w="med" len="med"/>
+            <a:tailEnd type="arrow" w="med" len="med"/>
+          </a:ln>
+        </p:spPr>
+        <p:style>
+          <a:lnRef idx="1">
+            <a:schemeClr val="accent1"/>
+          </a:lnRef>
+          <a:fillRef idx="0">
+            <a:schemeClr val="accent1"/>
+          </a:fillRef>
+          <a:effectRef idx="0">
+            <a:schemeClr val="accent1"/>
+          </a:effectRef>
+          <a:fontRef idx="minor">
+            <a:schemeClr val="tx1"/>
+          </a:fontRef>
+        </p:style>
+      </p:cxnSp>
+      <p:cxnSp>
+        <p:nvCxnSpPr>
+          <p:cNvPr id="16" name="Straight Connector 15"/>
+          <p:cNvCxnSpPr/>
+          <p:nvPr/>
+        </p:nvCxnSpPr>
+        <p:spPr>
+          <a:xfrm>
+            <a:off x="2048565" y="3707980"/>
+            <a:ext cx="5763795" cy="0"/>
+          </a:xfrm>
+          <a:prstGeom prst="line">
+            <a:avLst/>
+          </a:prstGeom>
+          <a:ln>
+            <a:solidFill>
+              <a:schemeClr val="tx1"/>
+            </a:solidFill>
+            <a:prstDash val="dash"/>
+          </a:ln>
+        </p:spPr>
+        <p:style>
+          <a:lnRef idx="1">
+            <a:schemeClr val="accent1"/>
+          </a:lnRef>
+          <a:fillRef idx="0">
+            <a:schemeClr val="accent1"/>
+          </a:fillRef>
+          <a:effectRef idx="0">
+            <a:schemeClr val="accent1"/>
+          </a:effectRef>
+          <a:fontRef idx="minor">
+            <a:schemeClr val="tx1"/>
+          </a:fontRef>
+        </p:style>
+      </p:cxnSp>
+      <p:cxnSp>
+        <p:nvCxnSpPr>
+          <p:cNvPr id="57" name="Straight Connector 56"/>
+          <p:cNvCxnSpPr/>
+          <p:nvPr/>
+        </p:nvCxnSpPr>
+        <p:spPr>
+          <a:xfrm>
+            <a:off x="2048565" y="4833412"/>
+            <a:ext cx="5763795" cy="0"/>
+          </a:xfrm>
+          <a:prstGeom prst="line">
+            <a:avLst/>
+          </a:prstGeom>
+          <a:ln>
+            <a:solidFill>
+              <a:schemeClr val="tx1"/>
+            </a:solidFill>
+            <a:prstDash val="dash"/>
+          </a:ln>
+        </p:spPr>
+        <p:style>
+          <a:lnRef idx="1">
+            <a:schemeClr val="accent1"/>
+          </a:lnRef>
+          <a:fillRef idx="0">
+            <a:schemeClr val="accent1"/>
+          </a:fillRef>
+          <a:effectRef idx="0">
+            <a:schemeClr val="accent1"/>
+          </a:effectRef>
+          <a:fontRef idx="minor">
+            <a:schemeClr val="tx1"/>
+          </a:fontRef>
+        </p:style>
+      </p:cxnSp>
+      <p:cxnSp>
+        <p:nvCxnSpPr>
+          <p:cNvPr id="58" name="Straight Connector 57"/>
+          <p:cNvCxnSpPr/>
+          <p:nvPr/>
+        </p:nvCxnSpPr>
+        <p:spPr>
+          <a:xfrm>
+            <a:off x="2048564" y="5246783"/>
+            <a:ext cx="5763795" cy="0"/>
+          </a:xfrm>
+          <a:prstGeom prst="line">
+            <a:avLst/>
+          </a:prstGeom>
+          <a:ln>
+            <a:solidFill>
+              <a:schemeClr val="tx1"/>
+            </a:solidFill>
+            <a:prstDash val="dash"/>
+          </a:ln>
+        </p:spPr>
+        <p:style>
+          <a:lnRef idx="1">
+            <a:schemeClr val="accent1"/>
+          </a:lnRef>
+          <a:fillRef idx="0">
+            <a:schemeClr val="accent1"/>
+          </a:fillRef>
+          <a:effectRef idx="0">
+            <a:schemeClr val="accent1"/>
+          </a:effectRef>
+          <a:fontRef idx="minor">
+            <a:schemeClr val="tx1"/>
+          </a:fontRef>
+        </p:style>
+      </p:cxnSp>
+      <p:sp>
+        <p:nvSpPr>
+          <p:cNvPr id="39" name="TextBox 38"/>
+          <p:cNvSpPr txBox="1"/>
+          <p:nvPr/>
+        </p:nvSpPr>
+        <p:spPr>
+          <a:xfrm>
+            <a:off x="1988504" y="2378100"/>
+            <a:ext cx="421064" cy="369332"/>
+          </a:xfrm>
+          <a:prstGeom prst="rect">
+            <a:avLst/>
+          </a:prstGeom>
+          <a:noFill/>
+        </p:spPr>
+        <p:txBody>
+          <a:bodyPr wrap="square" rtlCol="0">
+            <a:spAutoFit/>
+          </a:bodyPr>
+          <a:lstStyle/>
+          <a:p>
+            <a:r>
+              <a:rPr lang="en-GB" dirty="0" smtClean="0">
+                <a:sym typeface="Wingdings"/>
+              </a:rPr>
+              <a:t></a:t>
+            </a:r>
+            <a:endParaRPr lang="en-GB" dirty="0"/>
+          </a:p>
+        </p:txBody>
+      </p:sp>
+      <p:sp>
+        <p:nvSpPr>
+          <p:cNvPr id="70" name="TextBox 69"/>
+          <p:cNvSpPr txBox="1"/>
+          <p:nvPr/>
+        </p:nvSpPr>
+        <p:spPr>
+          <a:xfrm>
+            <a:off x="1988504" y="3662608"/>
+            <a:ext cx="421064" cy="369332"/>
+          </a:xfrm>
+          <a:prstGeom prst="rect">
+            <a:avLst/>
+          </a:prstGeom>
+          <a:noFill/>
+        </p:spPr>
+        <p:txBody>
+          <a:bodyPr wrap="square" rtlCol="0">
+            <a:spAutoFit/>
+          </a:bodyPr>
+          <a:lstStyle/>
+          <a:p>
+            <a:r>
+              <a:rPr lang="en-GB" dirty="0" smtClean="0">
+                <a:sym typeface="Wingdings"/>
+              </a:rPr>
+              <a:t></a:t>
+            </a:r>
+            <a:endParaRPr lang="en-GB" dirty="0"/>
+          </a:p>
+        </p:txBody>
+      </p:sp>
+      <p:sp>
+        <p:nvSpPr>
+          <p:cNvPr id="71" name="TextBox 70"/>
+          <p:cNvSpPr txBox="1"/>
+          <p:nvPr/>
+        </p:nvSpPr>
+        <p:spPr>
+          <a:xfrm>
+            <a:off x="1990696" y="4770276"/>
+            <a:ext cx="421064" cy="369332"/>
+          </a:xfrm>
+          <a:prstGeom prst="rect">
+            <a:avLst/>
+          </a:prstGeom>
+          <a:noFill/>
+        </p:spPr>
+        <p:txBody>
+          <a:bodyPr wrap="square" rtlCol="0">
+            <a:spAutoFit/>
+          </a:bodyPr>
+          <a:lstStyle/>
+          <a:p>
+            <a:r>
+              <a:rPr lang="en-GB" dirty="0" smtClean="0">
+                <a:sym typeface="Wingdings"/>
+              </a:rPr>
+              <a:t></a:t>
+            </a:r>
+            <a:endParaRPr lang="en-GB" dirty="0"/>
+          </a:p>
+        </p:txBody>
+      </p:sp>
+      <p:sp>
+        <p:nvSpPr>
+          <p:cNvPr id="40" name="Rectangle 39"/>
+          <p:cNvSpPr/>
+          <p:nvPr/>
+        </p:nvSpPr>
+        <p:spPr>
+          <a:xfrm>
+            <a:off x="1995534" y="5193532"/>
+            <a:ext cx="389850" cy="369332"/>
+          </a:xfrm>
+          <a:prstGeom prst="rect">
+            <a:avLst/>
+          </a:prstGeom>
+        </p:spPr>
+        <p:txBody>
+          <a:bodyPr wrap="none">
+            <a:spAutoFit/>
+          </a:bodyPr>
+          <a:lstStyle/>
+          <a:p>
+            <a:r>
+              <a:rPr lang="en-GB" dirty="0">
+                <a:sym typeface="Wingdings"/>
+              </a:rPr>
+              <a:t></a:t>
+            </a:r>
+            <a:endParaRPr lang="en-GB" dirty="0"/>
+          </a:p>
+        </p:txBody>
+      </p:sp>
+      <p:sp>
+        <p:nvSpPr>
+          <p:cNvPr id="14" name="Rectangle 13"/>
+          <p:cNvSpPr/>
+          <p:nvPr/>
+        </p:nvSpPr>
+        <p:spPr>
+          <a:xfrm>
+            <a:off x="7163101" y="2852936"/>
+            <a:ext cx="505243" cy="3024335"/>
+          </a:xfrm>
+          <a:prstGeom prst="rect">
+            <a:avLst/>
+          </a:prstGeom>
+        </p:spPr>
+        <p:style>
+          <a:lnRef idx="1">
+            <a:schemeClr val="accent3"/>
+          </a:lnRef>
+          <a:fillRef idx="2">
+            <a:schemeClr val="accent3"/>
+          </a:fillRef>
+          <a:effectRef idx="1">
+            <a:schemeClr val="accent3"/>
+          </a:effectRef>
+          <a:fontRef idx="minor">
+            <a:schemeClr val="dk1"/>
+          </a:fontRef>
+        </p:style>
+        <p:txBody>
+          <a:bodyPr rtlCol="0" anchor="ctr"/>
+          <a:lstStyle/>
+          <a:p>
+            <a:pPr algn="ctr"/>
+            <a:r>
+              <a:rPr lang="nl-BE" sz="1000" i="1" dirty="0" smtClean="0">
+                <a:solidFill>
+                  <a:prstClr val="black"/>
+                </a:solidFill>
+              </a:rPr>
+              <a:t>(DE)MUX</a:t>
+            </a:r>
+            <a:endParaRPr lang="nl-BE" sz="1000" i="1" dirty="0">
+              <a:solidFill>
+                <a:prstClr val="black"/>
+              </a:solidFill>
+            </a:endParaRPr>
+          </a:p>
+        </p:txBody>
+      </p:sp>
+      <p:sp>
+        <p:nvSpPr>
+          <p:cNvPr id="15" name="Rectangle 14"/>
+          <p:cNvSpPr/>
+          <p:nvPr/>
+        </p:nvSpPr>
+        <p:spPr>
+          <a:xfrm>
+            <a:off x="4572000" y="2852937"/>
+            <a:ext cx="820104" cy="3204329"/>
+          </a:xfrm>
+          <a:prstGeom prst="rect">
+            <a:avLst/>
+          </a:prstGeom>
+        </p:spPr>
+        <p:style>
+          <a:lnRef idx="1">
+            <a:schemeClr val="accent3"/>
+          </a:lnRef>
+          <a:fillRef idx="2">
+            <a:schemeClr val="accent3"/>
+          </a:fillRef>
+          <a:effectRef idx="1">
+            <a:schemeClr val="accent3"/>
+          </a:effectRef>
+          <a:fontRef idx="minor">
+            <a:schemeClr val="dk1"/>
+          </a:fontRef>
+        </p:style>
+        <p:txBody>
+          <a:bodyPr rtlCol="0" anchor="ctr"/>
+          <a:lstStyle/>
+          <a:p>
+            <a:pPr algn="ctr"/>
+            <a:r>
+              <a:rPr lang="nl-BE" sz="1200" i="1" dirty="0" smtClean="0">
+                <a:solidFill>
+                  <a:prstClr val="black"/>
+                </a:solidFill>
+              </a:rPr>
+              <a:t>Analyzer</a:t>
+            </a:r>
+            <a:endParaRPr lang="nl-BE" sz="1200" i="1" dirty="0">
+              <a:solidFill>
+                <a:prstClr val="black"/>
+              </a:solidFill>
+            </a:endParaRPr>
+          </a:p>
+        </p:txBody>
+      </p:sp>
+      <p:cxnSp>
+        <p:nvCxnSpPr>
+          <p:cNvPr id="61" name="Elbow Connector 60"/>
+          <p:cNvCxnSpPr>
+            <a:stCxn id="15" idx="3"/>
+          </p:cNvCxnSpPr>
+          <p:nvPr/>
+        </p:nvCxnSpPr>
+        <p:spPr>
+          <a:xfrm>
+            <a:off x="5392104" y="4455102"/>
+            <a:ext cx="1770997" cy="612067"/>
+          </a:xfrm>
+          <a:prstGeom prst="bentConnector3">
+            <a:avLst>
+              <a:gd name="adj1" fmla="val 50000"/>
+            </a:avLst>
+          </a:prstGeom>
+          <a:ln w="25400">
+            <a:solidFill>
+              <a:schemeClr val="tx1"/>
+            </a:solidFill>
+            <a:headEnd type="arrow" w="med" len="med"/>
+            <a:tailEnd type="arrow" w="med" len="med"/>
           </a:ln>
         </p:spPr>
         <p:style>
@@ -9739,7 +10332,7 @@
     </p:spTree>
     <p:extLst>
       <p:ext uri="{BB962C8B-B14F-4D97-AF65-F5344CB8AC3E}">
-        <p14:creationId xmlns:p14="http://schemas.microsoft.com/office/powerpoint/2010/main" val="257762561"/>
+        <p14:creationId xmlns:p14="http://schemas.microsoft.com/office/powerpoint/2010/main" val="2685403650"/>
       </p:ext>
     </p:extLst>
   </p:cSld>
@@ -9799,6 +10392,932 @@
       </p:sp>
       <p:sp>
         <p:nvSpPr>
+          <p:cNvPr id="54" name="Rectangle 53"/>
+          <p:cNvSpPr/>
+          <p:nvPr/>
+        </p:nvSpPr>
+        <p:spPr>
+          <a:xfrm>
+            <a:off x="467544" y="2557378"/>
+            <a:ext cx="1368152" cy="1548172"/>
+          </a:xfrm>
+          <a:prstGeom prst="rect">
+            <a:avLst/>
+          </a:prstGeom>
+        </p:spPr>
+        <p:style>
+          <a:lnRef idx="1">
+            <a:schemeClr val="accent3"/>
+          </a:lnRef>
+          <a:fillRef idx="2">
+            <a:schemeClr val="accent3"/>
+          </a:fillRef>
+          <a:effectRef idx="1">
+            <a:schemeClr val="accent3"/>
+          </a:effectRef>
+          <a:fontRef idx="minor">
+            <a:schemeClr val="dk1"/>
+          </a:fontRef>
+        </p:style>
+        <p:txBody>
+          <a:bodyPr rtlCol="0" anchor="b"/>
+          <a:lstStyle/>
+          <a:p>
+            <a:pPr algn="ctr"/>
+            <a:r>
+              <a:rPr lang="nl-BE" sz="1200" dirty="0" smtClean="0">
+                <a:solidFill>
+                  <a:prstClr val="black"/>
+                </a:solidFill>
+              </a:rPr>
+              <a:t>libMXF++</a:t>
+            </a:r>
+            <a:endParaRPr lang="nl-BE" sz="1200" dirty="0">
+              <a:solidFill>
+                <a:prstClr val="black"/>
+              </a:solidFill>
+            </a:endParaRPr>
+          </a:p>
+        </p:txBody>
+      </p:sp>
+      <p:sp>
+        <p:nvSpPr>
+          <p:cNvPr id="2" name="Title 1"/>
+          <p:cNvSpPr>
+            <a:spLocks noGrp="1"/>
+          </p:cNvSpPr>
+          <p:nvPr>
+            <p:ph type="title"/>
+          </p:nvPr>
+        </p:nvSpPr>
+        <p:spPr/>
+        <p:txBody>
+          <a:bodyPr>
+            <a:normAutofit/>
+          </a:bodyPr>
+          <a:lstStyle/>
+          <a:p>
+            <a:endParaRPr lang="en-GB" dirty="0"/>
+          </a:p>
+        </p:txBody>
+      </p:sp>
+      <p:sp>
+        <p:nvSpPr>
+          <p:cNvPr id="197" name="Rectangle 196"/>
+          <p:cNvSpPr/>
+          <p:nvPr/>
+        </p:nvSpPr>
+        <p:spPr>
+          <a:xfrm>
+            <a:off x="586902" y="2701394"/>
+            <a:ext cx="1129437" cy="630070"/>
+          </a:xfrm>
+          <a:prstGeom prst="rect">
+            <a:avLst/>
+          </a:prstGeom>
+        </p:spPr>
+        <p:style>
+          <a:lnRef idx="1">
+            <a:schemeClr val="accent3"/>
+          </a:lnRef>
+          <a:fillRef idx="2">
+            <a:schemeClr val="accent3"/>
+          </a:fillRef>
+          <a:effectRef idx="1">
+            <a:schemeClr val="accent3"/>
+          </a:effectRef>
+          <a:fontRef idx="minor">
+            <a:schemeClr val="dk1"/>
+          </a:fontRef>
+        </p:style>
+        <p:txBody>
+          <a:bodyPr rtlCol="0" anchor="ctr"/>
+          <a:lstStyle/>
+          <a:p>
+            <a:pPr algn="ctr"/>
+            <a:r>
+              <a:rPr lang="nl-BE" sz="1200" dirty="0" smtClean="0">
+                <a:solidFill>
+                  <a:prstClr val="black"/>
+                </a:solidFill>
+              </a:rPr>
+              <a:t>libMXF</a:t>
+            </a:r>
+            <a:endParaRPr lang="nl-BE" sz="1200" dirty="0">
+              <a:solidFill>
+                <a:prstClr val="black"/>
+              </a:solidFill>
+            </a:endParaRPr>
+          </a:p>
+        </p:txBody>
+      </p:sp>
+      <p:sp>
+        <p:nvSpPr>
+          <p:cNvPr id="58" name="Rectangle 57"/>
+          <p:cNvSpPr/>
+          <p:nvPr/>
+        </p:nvSpPr>
+        <p:spPr>
+          <a:xfrm>
+            <a:off x="2840886" y="2557378"/>
+            <a:ext cx="1367739" cy="684076"/>
+          </a:xfrm>
+          <a:prstGeom prst="rect">
+            <a:avLst/>
+          </a:prstGeom>
+        </p:spPr>
+        <p:style>
+          <a:lnRef idx="1">
+            <a:schemeClr val="accent3"/>
+          </a:lnRef>
+          <a:fillRef idx="2">
+            <a:schemeClr val="accent3"/>
+          </a:fillRef>
+          <a:effectRef idx="1">
+            <a:schemeClr val="accent3"/>
+          </a:effectRef>
+          <a:fontRef idx="minor">
+            <a:schemeClr val="dk1"/>
+          </a:fontRef>
+        </p:style>
+        <p:txBody>
+          <a:bodyPr rtlCol="0" anchor="ctr"/>
+          <a:lstStyle/>
+          <a:p>
+            <a:pPr algn="ctr"/>
+            <a:r>
+              <a:rPr lang="nl-BE" sz="1200" dirty="0" smtClean="0">
+                <a:solidFill>
+                  <a:prstClr val="black"/>
+                </a:solidFill>
+              </a:rPr>
+              <a:t>BMX</a:t>
+            </a:r>
+            <a:endParaRPr lang="nl-BE" sz="1200" dirty="0">
+              <a:solidFill>
+                <a:prstClr val="black"/>
+              </a:solidFill>
+            </a:endParaRPr>
+          </a:p>
+        </p:txBody>
+      </p:sp>
+      <p:sp>
+        <p:nvSpPr>
+          <p:cNvPr id="57" name="Rectangle 56"/>
+          <p:cNvSpPr/>
+          <p:nvPr/>
+        </p:nvSpPr>
+        <p:spPr>
+          <a:xfrm>
+            <a:off x="2848691" y="3421474"/>
+            <a:ext cx="1368152" cy="684076"/>
+          </a:xfrm>
+          <a:prstGeom prst="rect">
+            <a:avLst/>
+          </a:prstGeom>
+        </p:spPr>
+        <p:style>
+          <a:lnRef idx="1">
+            <a:schemeClr val="accent3"/>
+          </a:lnRef>
+          <a:fillRef idx="2">
+            <a:schemeClr val="accent3"/>
+          </a:fillRef>
+          <a:effectRef idx="1">
+            <a:schemeClr val="accent3"/>
+          </a:effectRef>
+          <a:fontRef idx="minor">
+            <a:schemeClr val="dk1"/>
+          </a:fontRef>
+        </p:style>
+        <p:txBody>
+          <a:bodyPr rtlCol="0" anchor="ctr"/>
+          <a:lstStyle/>
+          <a:p>
+            <a:pPr algn="ctr"/>
+            <a:r>
+              <a:rPr lang="nl-BE" sz="1200" dirty="0" smtClean="0">
+                <a:solidFill>
+                  <a:prstClr val="black"/>
+                </a:solidFill>
+              </a:rPr>
+              <a:t>EBU SDK</a:t>
+            </a:r>
+            <a:endParaRPr lang="nl-BE" sz="1200" dirty="0">
+              <a:solidFill>
+                <a:prstClr val="black"/>
+              </a:solidFill>
+            </a:endParaRPr>
+          </a:p>
+        </p:txBody>
+      </p:sp>
+      <p:cxnSp>
+        <p:nvCxnSpPr>
+          <p:cNvPr id="59" name="Elbow Connector 58"/>
+          <p:cNvCxnSpPr>
+            <a:stCxn id="58" idx="1"/>
+            <a:endCxn id="54" idx="3"/>
+          </p:cNvCxnSpPr>
+          <p:nvPr/>
+        </p:nvCxnSpPr>
+        <p:spPr>
+          <a:xfrm rot="10800000" flipV="1">
+            <a:off x="1835696" y="2899416"/>
+            <a:ext cx="1005190" cy="432048"/>
+          </a:xfrm>
+          <a:prstGeom prst="bentConnector3">
+            <a:avLst>
+              <a:gd name="adj1" fmla="val 67215"/>
+            </a:avLst>
+          </a:prstGeom>
+          <a:ln w="25400">
+            <a:solidFill>
+              <a:schemeClr val="tx1"/>
+            </a:solidFill>
+            <a:tailEnd type="arrow"/>
+          </a:ln>
+        </p:spPr>
+        <p:style>
+          <a:lnRef idx="1">
+            <a:schemeClr val="accent1"/>
+          </a:lnRef>
+          <a:fillRef idx="0">
+            <a:schemeClr val="accent1"/>
+          </a:fillRef>
+          <a:effectRef idx="0">
+            <a:schemeClr val="accent1"/>
+          </a:effectRef>
+          <a:fontRef idx="minor">
+            <a:schemeClr val="tx1"/>
+          </a:fontRef>
+        </p:style>
+      </p:cxnSp>
+      <p:cxnSp>
+        <p:nvCxnSpPr>
+          <p:cNvPr id="61" name="Elbow Connector 60"/>
+          <p:cNvCxnSpPr>
+            <a:stCxn id="57" idx="1"/>
+            <a:endCxn id="54" idx="3"/>
+          </p:cNvCxnSpPr>
+          <p:nvPr/>
+        </p:nvCxnSpPr>
+        <p:spPr>
+          <a:xfrm rot="10800000">
+            <a:off x="1835697" y="3331464"/>
+            <a:ext cx="1012995" cy="432048"/>
+          </a:xfrm>
+          <a:prstGeom prst="bentConnector3">
+            <a:avLst>
+              <a:gd name="adj1" fmla="val 67552"/>
+            </a:avLst>
+          </a:prstGeom>
+          <a:ln w="25400">
+            <a:solidFill>
+              <a:schemeClr val="tx1"/>
+            </a:solidFill>
+            <a:tailEnd type="arrow"/>
+          </a:ln>
+        </p:spPr>
+        <p:style>
+          <a:lnRef idx="1">
+            <a:schemeClr val="accent1"/>
+          </a:lnRef>
+          <a:fillRef idx="0">
+            <a:schemeClr val="accent1"/>
+          </a:fillRef>
+          <a:effectRef idx="0">
+            <a:schemeClr val="accent1"/>
+          </a:effectRef>
+          <a:fontRef idx="minor">
+            <a:schemeClr val="tx1"/>
+          </a:fontRef>
+        </p:style>
+      </p:cxnSp>
+      <p:sp>
+        <p:nvSpPr>
+          <p:cNvPr id="22" name="TextBox 21"/>
+          <p:cNvSpPr txBox="1"/>
+          <p:nvPr/>
+        </p:nvSpPr>
+        <p:spPr>
+          <a:xfrm>
+            <a:off x="2069722" y="2629386"/>
+            <a:ext cx="702078" cy="276999"/>
+          </a:xfrm>
+          <a:prstGeom prst="rect">
+            <a:avLst/>
+          </a:prstGeom>
+          <a:noFill/>
+        </p:spPr>
+        <p:txBody>
+          <a:bodyPr wrap="square" rtlCol="0">
+            <a:spAutoFit/>
+          </a:bodyPr>
+          <a:lstStyle/>
+          <a:p>
+            <a:r>
+              <a:rPr lang="en-US" sz="1200" dirty="0" smtClean="0"/>
+              <a:t>«uses»</a:t>
+            </a:r>
+            <a:endParaRPr lang="en-GB" sz="1200" dirty="0"/>
+          </a:p>
+        </p:txBody>
+      </p:sp>
+      <p:sp>
+        <p:nvSpPr>
+          <p:cNvPr id="68" name="TextBox 67"/>
+          <p:cNvSpPr txBox="1"/>
+          <p:nvPr/>
+        </p:nvSpPr>
+        <p:spPr>
+          <a:xfrm>
+            <a:off x="2064786" y="3745940"/>
+            <a:ext cx="702078" cy="276999"/>
+          </a:xfrm>
+          <a:prstGeom prst="rect">
+            <a:avLst/>
+          </a:prstGeom>
+          <a:noFill/>
+        </p:spPr>
+        <p:txBody>
+          <a:bodyPr wrap="square" rtlCol="0">
+            <a:spAutoFit/>
+          </a:bodyPr>
+          <a:lstStyle/>
+          <a:p>
+            <a:r>
+              <a:rPr lang="en-US" sz="1200" dirty="0" smtClean="0"/>
+              <a:t>«uses»</a:t>
+            </a:r>
+            <a:endParaRPr lang="en-GB" sz="1200" dirty="0"/>
+          </a:p>
+        </p:txBody>
+      </p:sp>
+      <p:cxnSp>
+        <p:nvCxnSpPr>
+          <p:cNvPr id="69" name="Elbow Connector 68"/>
+          <p:cNvCxnSpPr>
+            <a:stCxn id="57" idx="3"/>
+            <a:endCxn id="58" idx="3"/>
+          </p:cNvCxnSpPr>
+          <p:nvPr/>
+        </p:nvCxnSpPr>
+        <p:spPr>
+          <a:xfrm flipH="1" flipV="1">
+            <a:off x="4208625" y="2899416"/>
+            <a:ext cx="8218" cy="864096"/>
+          </a:xfrm>
+          <a:prstGeom prst="bentConnector3">
+            <a:avLst>
+              <a:gd name="adj1" fmla="val -2781699"/>
+            </a:avLst>
+          </a:prstGeom>
+          <a:ln w="25400">
+            <a:solidFill>
+              <a:schemeClr val="tx1"/>
+            </a:solidFill>
+            <a:tailEnd type="arrow"/>
+          </a:ln>
+        </p:spPr>
+        <p:style>
+          <a:lnRef idx="1">
+            <a:schemeClr val="accent1"/>
+          </a:lnRef>
+          <a:fillRef idx="0">
+            <a:schemeClr val="accent1"/>
+          </a:fillRef>
+          <a:effectRef idx="0">
+            <a:schemeClr val="accent1"/>
+          </a:effectRef>
+          <a:fontRef idx="minor">
+            <a:schemeClr val="tx1"/>
+          </a:fontRef>
+        </p:style>
+      </p:cxnSp>
+      <p:sp>
+        <p:nvSpPr>
+          <p:cNvPr id="72" name="TextBox 71"/>
+          <p:cNvSpPr txBox="1"/>
+          <p:nvPr/>
+        </p:nvSpPr>
+        <p:spPr>
+          <a:xfrm>
+            <a:off x="4445986" y="3147929"/>
+            <a:ext cx="702078" cy="276999"/>
+          </a:xfrm>
+          <a:prstGeom prst="rect">
+            <a:avLst/>
+          </a:prstGeom>
+          <a:noFill/>
+        </p:spPr>
+        <p:txBody>
+          <a:bodyPr wrap="square" rtlCol="0">
+            <a:spAutoFit/>
+          </a:bodyPr>
+          <a:lstStyle/>
+          <a:p>
+            <a:r>
+              <a:rPr lang="en-US" sz="1200" dirty="0" smtClean="0"/>
+              <a:t>«uses»</a:t>
+            </a:r>
+            <a:endParaRPr lang="en-GB" sz="1200" dirty="0"/>
+          </a:p>
+        </p:txBody>
+      </p:sp>
+      <p:cxnSp>
+        <p:nvCxnSpPr>
+          <p:cNvPr id="73" name="Elbow Connector 72"/>
+          <p:cNvCxnSpPr/>
+          <p:nvPr/>
+        </p:nvCxnSpPr>
+        <p:spPr>
+          <a:xfrm rot="5400000" flipH="1" flipV="1">
+            <a:off x="683567" y="3547490"/>
+            <a:ext cx="432051" cy="1"/>
+          </a:xfrm>
+          <a:prstGeom prst="bentConnector3">
+            <a:avLst>
+              <a:gd name="adj1" fmla="val 50000"/>
+            </a:avLst>
+          </a:prstGeom>
+          <a:ln w="25400">
+            <a:solidFill>
+              <a:schemeClr val="tx1"/>
+            </a:solidFill>
+            <a:tailEnd type="arrow"/>
+          </a:ln>
+        </p:spPr>
+        <p:style>
+          <a:lnRef idx="1">
+            <a:schemeClr val="accent1"/>
+          </a:lnRef>
+          <a:fillRef idx="0">
+            <a:schemeClr val="accent1"/>
+          </a:fillRef>
+          <a:effectRef idx="0">
+            <a:schemeClr val="accent1"/>
+          </a:effectRef>
+          <a:fontRef idx="minor">
+            <a:schemeClr val="tx1"/>
+          </a:fontRef>
+        </p:style>
+      </p:cxnSp>
+      <p:sp>
+        <p:nvSpPr>
+          <p:cNvPr id="76" name="TextBox 75"/>
+          <p:cNvSpPr txBox="1"/>
+          <p:nvPr/>
+        </p:nvSpPr>
+        <p:spPr>
+          <a:xfrm>
+            <a:off x="899592" y="3468941"/>
+            <a:ext cx="936105" cy="276999"/>
+          </a:xfrm>
+          <a:prstGeom prst="rect">
+            <a:avLst/>
+          </a:prstGeom>
+          <a:noFill/>
+        </p:spPr>
+        <p:txBody>
+          <a:bodyPr wrap="square" rtlCol="0">
+            <a:spAutoFit/>
+          </a:bodyPr>
+          <a:lstStyle/>
+          <a:p>
+            <a:r>
+              <a:rPr lang="en-US" sz="1200" dirty="0" smtClean="0"/>
+              <a:t>«extends»</a:t>
+            </a:r>
+            <a:endParaRPr lang="en-GB" sz="1200" dirty="0"/>
+          </a:p>
+        </p:txBody>
+      </p:sp>
+      <p:sp>
+        <p:nvSpPr>
+          <p:cNvPr id="83" name="Rectangle 82"/>
+          <p:cNvSpPr/>
+          <p:nvPr/>
+        </p:nvSpPr>
+        <p:spPr>
+          <a:xfrm>
+            <a:off x="5868144" y="2556663"/>
+            <a:ext cx="1367739" cy="349722"/>
+          </a:xfrm>
+          <a:prstGeom prst="rect">
+            <a:avLst/>
+          </a:prstGeom>
+        </p:spPr>
+        <p:style>
+          <a:lnRef idx="1">
+            <a:schemeClr val="accent3"/>
+          </a:lnRef>
+          <a:fillRef idx="2">
+            <a:schemeClr val="accent3"/>
+          </a:fillRef>
+          <a:effectRef idx="1">
+            <a:schemeClr val="accent3"/>
+          </a:effectRef>
+          <a:fontRef idx="minor">
+            <a:schemeClr val="dk1"/>
+          </a:fontRef>
+        </p:style>
+        <p:txBody>
+          <a:bodyPr rtlCol="0" anchor="ctr"/>
+          <a:lstStyle/>
+          <a:p>
+            <a:pPr algn="ctr"/>
+            <a:r>
+              <a:rPr lang="nl-BE" sz="1200" dirty="0" smtClean="0">
+                <a:solidFill>
+                  <a:prstClr val="black"/>
+                </a:solidFill>
+              </a:rPr>
+              <a:t>uriparser</a:t>
+            </a:r>
+            <a:endParaRPr lang="nl-BE" sz="1200" dirty="0">
+              <a:solidFill>
+                <a:prstClr val="black"/>
+              </a:solidFill>
+            </a:endParaRPr>
+          </a:p>
+        </p:txBody>
+      </p:sp>
+      <p:sp>
+        <p:nvSpPr>
+          <p:cNvPr id="84" name="Rectangle 83"/>
+          <p:cNvSpPr/>
+          <p:nvPr/>
+        </p:nvSpPr>
+        <p:spPr>
+          <a:xfrm>
+            <a:off x="5868144" y="3421474"/>
+            <a:ext cx="1367739" cy="342038"/>
+          </a:xfrm>
+          <a:prstGeom prst="rect">
+            <a:avLst/>
+          </a:prstGeom>
+        </p:spPr>
+        <p:style>
+          <a:lnRef idx="1">
+            <a:schemeClr val="accent3"/>
+          </a:lnRef>
+          <a:fillRef idx="2">
+            <a:schemeClr val="accent3"/>
+          </a:fillRef>
+          <a:effectRef idx="1">
+            <a:schemeClr val="accent3"/>
+          </a:effectRef>
+          <a:fontRef idx="minor">
+            <a:schemeClr val="dk1"/>
+          </a:fontRef>
+        </p:style>
+        <p:txBody>
+          <a:bodyPr rtlCol="0" anchor="ctr"/>
+          <a:lstStyle/>
+          <a:p>
+            <a:pPr algn="ctr"/>
+            <a:r>
+              <a:rPr lang="nl-BE" sz="1200" dirty="0" smtClean="0">
+                <a:solidFill>
+                  <a:prstClr val="black"/>
+                </a:solidFill>
+              </a:rPr>
+              <a:t>Apache Xerces-C++</a:t>
+            </a:r>
+            <a:endParaRPr lang="nl-BE" sz="1200" dirty="0">
+              <a:solidFill>
+                <a:prstClr val="black"/>
+              </a:solidFill>
+            </a:endParaRPr>
+          </a:p>
+        </p:txBody>
+      </p:sp>
+      <p:sp>
+        <p:nvSpPr>
+          <p:cNvPr id="85" name="Rectangle 84"/>
+          <p:cNvSpPr/>
+          <p:nvPr/>
+        </p:nvSpPr>
+        <p:spPr>
+          <a:xfrm>
+            <a:off x="5868144" y="3851920"/>
+            <a:ext cx="1367739" cy="342038"/>
+          </a:xfrm>
+          <a:prstGeom prst="rect">
+            <a:avLst/>
+          </a:prstGeom>
+        </p:spPr>
+        <p:style>
+          <a:lnRef idx="1">
+            <a:schemeClr val="accent3"/>
+          </a:lnRef>
+          <a:fillRef idx="2">
+            <a:schemeClr val="accent3"/>
+          </a:fillRef>
+          <a:effectRef idx="1">
+            <a:schemeClr val="accent3"/>
+          </a:effectRef>
+          <a:fontRef idx="minor">
+            <a:schemeClr val="dk1"/>
+          </a:fontRef>
+        </p:style>
+        <p:txBody>
+          <a:bodyPr rtlCol="0" anchor="ctr"/>
+          <a:lstStyle/>
+          <a:p>
+            <a:pPr algn="ctr"/>
+            <a:r>
+              <a:rPr lang="nl-BE" sz="1200" dirty="0" smtClean="0">
+                <a:solidFill>
+                  <a:prstClr val="black"/>
+                </a:solidFill>
+              </a:rPr>
+              <a:t>Codesynthesis XSD</a:t>
+            </a:r>
+            <a:endParaRPr lang="nl-BE" sz="1200" dirty="0">
+              <a:solidFill>
+                <a:prstClr val="black"/>
+              </a:solidFill>
+            </a:endParaRPr>
+          </a:p>
+        </p:txBody>
+      </p:sp>
+      <p:cxnSp>
+        <p:nvCxnSpPr>
+          <p:cNvPr id="86" name="Elbow Connector 85"/>
+          <p:cNvCxnSpPr>
+            <a:stCxn id="58" idx="3"/>
+            <a:endCxn id="83" idx="1"/>
+          </p:cNvCxnSpPr>
+          <p:nvPr/>
+        </p:nvCxnSpPr>
+        <p:spPr>
+          <a:xfrm flipV="1">
+            <a:off x="4208625" y="2731524"/>
+            <a:ext cx="1659519" cy="167892"/>
+          </a:xfrm>
+          <a:prstGeom prst="bentConnector3">
+            <a:avLst>
+              <a:gd name="adj1" fmla="val 50000"/>
+            </a:avLst>
+          </a:prstGeom>
+          <a:ln w="25400">
+            <a:solidFill>
+              <a:schemeClr val="tx1"/>
+            </a:solidFill>
+            <a:tailEnd type="arrow"/>
+          </a:ln>
+        </p:spPr>
+        <p:style>
+          <a:lnRef idx="1">
+            <a:schemeClr val="accent1"/>
+          </a:lnRef>
+          <a:fillRef idx="0">
+            <a:schemeClr val="accent1"/>
+          </a:fillRef>
+          <a:effectRef idx="0">
+            <a:schemeClr val="accent1"/>
+          </a:effectRef>
+          <a:fontRef idx="minor">
+            <a:schemeClr val="tx1"/>
+          </a:fontRef>
+        </p:style>
+      </p:cxnSp>
+      <p:sp>
+        <p:nvSpPr>
+          <p:cNvPr id="95" name="TextBox 94"/>
+          <p:cNvSpPr txBox="1"/>
+          <p:nvPr/>
+        </p:nvSpPr>
+        <p:spPr>
+          <a:xfrm>
+            <a:off x="4967507" y="3340058"/>
+            <a:ext cx="892170" cy="276999"/>
+          </a:xfrm>
+          <a:prstGeom prst="rect">
+            <a:avLst/>
+          </a:prstGeom>
+          <a:noFill/>
+        </p:spPr>
+        <p:txBody>
+          <a:bodyPr wrap="square" rtlCol="0">
+            <a:spAutoFit/>
+          </a:bodyPr>
+          <a:lstStyle/>
+          <a:p>
+            <a:r>
+              <a:rPr lang="en-US" sz="1200" dirty="0" smtClean="0"/>
+              <a:t>«depends»</a:t>
+            </a:r>
+            <a:endParaRPr lang="en-GB" sz="1200" dirty="0"/>
+          </a:p>
+        </p:txBody>
+      </p:sp>
+      <p:sp>
+        <p:nvSpPr>
+          <p:cNvPr id="102" name="TextBox 101"/>
+          <p:cNvSpPr txBox="1"/>
+          <p:nvPr/>
+        </p:nvSpPr>
+        <p:spPr>
+          <a:xfrm>
+            <a:off x="4950573" y="2486995"/>
+            <a:ext cx="892170" cy="276999"/>
+          </a:xfrm>
+          <a:prstGeom prst="rect">
+            <a:avLst/>
+          </a:prstGeom>
+          <a:noFill/>
+        </p:spPr>
+        <p:txBody>
+          <a:bodyPr wrap="square" rtlCol="0">
+            <a:spAutoFit/>
+          </a:bodyPr>
+          <a:lstStyle/>
+          <a:p>
+            <a:r>
+              <a:rPr lang="en-US" sz="1200" dirty="0" smtClean="0"/>
+              <a:t>«depends»</a:t>
+            </a:r>
+            <a:endParaRPr lang="en-GB" sz="1200" dirty="0"/>
+          </a:p>
+        </p:txBody>
+      </p:sp>
+      <p:cxnSp>
+        <p:nvCxnSpPr>
+          <p:cNvPr id="103" name="Elbow Connector 102"/>
+          <p:cNvCxnSpPr>
+            <a:stCxn id="57" idx="3"/>
+            <a:endCxn id="84" idx="1"/>
+          </p:cNvCxnSpPr>
+          <p:nvPr/>
+        </p:nvCxnSpPr>
+        <p:spPr>
+          <a:xfrm flipV="1">
+            <a:off x="4216843" y="3592493"/>
+            <a:ext cx="1651301" cy="171019"/>
+          </a:xfrm>
+          <a:prstGeom prst="bentConnector3">
+            <a:avLst>
+              <a:gd name="adj1" fmla="val 50000"/>
+            </a:avLst>
+          </a:prstGeom>
+          <a:ln w="25400">
+            <a:solidFill>
+              <a:schemeClr val="tx1"/>
+            </a:solidFill>
+            <a:tailEnd type="arrow"/>
+          </a:ln>
+        </p:spPr>
+        <p:style>
+          <a:lnRef idx="1">
+            <a:schemeClr val="accent1"/>
+          </a:lnRef>
+          <a:fillRef idx="0">
+            <a:schemeClr val="accent1"/>
+          </a:fillRef>
+          <a:effectRef idx="0">
+            <a:schemeClr val="accent1"/>
+          </a:effectRef>
+          <a:fontRef idx="minor">
+            <a:schemeClr val="tx1"/>
+          </a:fontRef>
+        </p:style>
+      </p:cxnSp>
+      <p:sp>
+        <p:nvSpPr>
+          <p:cNvPr id="104" name="TextBox 103"/>
+          <p:cNvSpPr txBox="1"/>
+          <p:nvPr/>
+        </p:nvSpPr>
+        <p:spPr>
+          <a:xfrm>
+            <a:off x="4980413" y="3996189"/>
+            <a:ext cx="892170" cy="276999"/>
+          </a:xfrm>
+          <a:prstGeom prst="rect">
+            <a:avLst/>
+          </a:prstGeom>
+          <a:noFill/>
+        </p:spPr>
+        <p:txBody>
+          <a:bodyPr wrap="square" rtlCol="0">
+            <a:spAutoFit/>
+          </a:bodyPr>
+          <a:lstStyle/>
+          <a:p>
+            <a:r>
+              <a:rPr lang="en-US" sz="1200" dirty="0" smtClean="0"/>
+              <a:t>«depends»</a:t>
+            </a:r>
+            <a:endParaRPr lang="en-GB" sz="1200" dirty="0"/>
+          </a:p>
+        </p:txBody>
+      </p:sp>
+      <p:cxnSp>
+        <p:nvCxnSpPr>
+          <p:cNvPr id="110" name="Elbow Connector 109"/>
+          <p:cNvCxnSpPr>
+            <a:stCxn id="57" idx="3"/>
+            <a:endCxn id="85" idx="1"/>
+          </p:cNvCxnSpPr>
+          <p:nvPr/>
+        </p:nvCxnSpPr>
+        <p:spPr>
+          <a:xfrm>
+            <a:off x="4216843" y="3763512"/>
+            <a:ext cx="1651301" cy="259427"/>
+          </a:xfrm>
+          <a:prstGeom prst="bentConnector3">
+            <a:avLst>
+              <a:gd name="adj1" fmla="val 50000"/>
+            </a:avLst>
+          </a:prstGeom>
+          <a:ln w="25400">
+            <a:solidFill>
+              <a:schemeClr val="tx1"/>
+            </a:solidFill>
+            <a:tailEnd type="arrow"/>
+          </a:ln>
+        </p:spPr>
+        <p:style>
+          <a:lnRef idx="1">
+            <a:schemeClr val="accent1"/>
+          </a:lnRef>
+          <a:fillRef idx="0">
+            <a:schemeClr val="accent1"/>
+          </a:fillRef>
+          <a:effectRef idx="0">
+            <a:schemeClr val="accent1"/>
+          </a:effectRef>
+          <a:fontRef idx="minor">
+            <a:schemeClr val="tx1"/>
+          </a:fontRef>
+        </p:style>
+      </p:cxnSp>
+    </p:spTree>
+    <p:extLst>
+      <p:ext uri="{BB962C8B-B14F-4D97-AF65-F5344CB8AC3E}">
+        <p14:creationId xmlns:p14="http://schemas.microsoft.com/office/powerpoint/2010/main" val="257762561"/>
+      </p:ext>
+    </p:extLst>
+  </p:cSld>
+  <p:clrMapOvr>
+    <a:masterClrMapping/>
+  </p:clrMapOvr>
+  <p:timing>
+    <p:tnLst>
+      <p:par>
+        <p:cTn id="1" dur="indefinite" restart="never" nodeType="tmRoot"/>
+      </p:par>
+    </p:tnLst>
+  </p:timing>
+</p:sld>
+</file>
+
+<file path=ppt/slides/slide5.xml><?xml version="1.0" encoding="utf-8"?>
+<p:sld xmlns:a="http://schemas.openxmlformats.org/drawingml/2006/main" xmlns:r="http://schemas.openxmlformats.org/officeDocument/2006/relationships" xmlns:p="http://schemas.openxmlformats.org/presentationml/2006/main">
+  <p:cSld>
+    <p:spTree>
+      <p:nvGrpSpPr>
+        <p:cNvPr id="1" name=""/>
+        <p:cNvGrpSpPr/>
+        <p:nvPr/>
+      </p:nvGrpSpPr>
+      <p:grpSpPr>
+        <a:xfrm>
+          <a:off x="0" y="0"/>
+          <a:ext cx="0" cy="0"/>
+          <a:chOff x="0" y="0"/>
+          <a:chExt cx="0" cy="0"/>
+        </a:xfrm>
+      </p:grpSpPr>
+      <p:sp>
+        <p:nvSpPr>
+          <p:cNvPr id="3" name="Content Placeholder 2"/>
+          <p:cNvSpPr>
+            <a:spLocks noGrp="1"/>
+          </p:cNvSpPr>
+          <p:nvPr>
+            <p:ph idx="1"/>
+          </p:nvPr>
+        </p:nvSpPr>
+        <p:spPr>
+          <a:xfrm>
+            <a:off x="467544" y="1500534"/>
+            <a:ext cx="8229600" cy="4525963"/>
+          </a:xfrm>
+        </p:spPr>
+        <p:txBody>
+          <a:bodyPr/>
+          <a:lstStyle/>
+          <a:p>
+            <a:endParaRPr lang="en-US" dirty="0" smtClean="0"/>
+          </a:p>
+        </p:txBody>
+      </p:sp>
+      <p:sp>
+        <p:nvSpPr>
           <p:cNvPr id="2" name="Title 1"/>
           <p:cNvSpPr>
             <a:spLocks noGrp="1"/>
@@ -10484,7 +12003,7 @@
 </p:sld>
 </file>
 
-<file path=ppt/slides/slide5.xml><?xml version="1.0" encoding="utf-8"?>
+<file path=ppt/slides/slide6.xml><?xml version="1.0" encoding="utf-8"?>
 <p:sld xmlns:a="http://schemas.openxmlformats.org/drawingml/2006/main" xmlns:r="http://schemas.openxmlformats.org/officeDocument/2006/relationships" xmlns:p="http://schemas.openxmlformats.org/presentationml/2006/main">
   <p:cSld>
     <p:spTree>

</xml_diff>

<commit_message>
Documentation updated with info about versioned EBUCore and Analyzer functionality. Replaces EBU MXF SDK - EBUCore.docx.
</commit_message>
<xml_diff>
--- a/doc/EBU MXF SDK - EBUCore - images.pptx
+++ b/doc/EBU MXF SDK - EBUCore - images.pptx
@@ -294,7 +294,7 @@
           <a:p>
             <a:fld id="{F0AA596B-07FD-418F-9BC7-89A9D7D4BC61}" type="datetimeFigureOut">
               <a:rPr lang="en-GB" smtClean="0"/>
-              <a:t>16/12/2012</a:t>
+              <a:t>13/02/2013</a:t>
             </a:fld>
             <a:endParaRPr lang="en-GB"/>
           </a:p>
@@ -464,7 +464,7 @@
           <a:p>
             <a:fld id="{F0AA596B-07FD-418F-9BC7-89A9D7D4BC61}" type="datetimeFigureOut">
               <a:rPr lang="en-GB" smtClean="0"/>
-              <a:t>16/12/2012</a:t>
+              <a:t>13/02/2013</a:t>
             </a:fld>
             <a:endParaRPr lang="en-GB"/>
           </a:p>
@@ -644,7 +644,7 @@
           <a:p>
             <a:fld id="{F0AA596B-07FD-418F-9BC7-89A9D7D4BC61}" type="datetimeFigureOut">
               <a:rPr lang="en-GB" smtClean="0"/>
-              <a:t>16/12/2012</a:t>
+              <a:t>13/02/2013</a:t>
             </a:fld>
             <a:endParaRPr lang="en-GB"/>
           </a:p>
@@ -913,7 +913,7 @@
                 </a:solidFill>
               </a:rPr>
               <a:pPr/>
-              <a:t>16/12/2012</a:t>
+              <a:t>13/02/2013</a:t>
             </a:fld>
             <a:endParaRPr lang="nl-BE">
               <a:solidFill>
@@ -1211,7 +1211,7 @@
                 </a:solidFill>
               </a:rPr>
               <a:pPr/>
-              <a:t>16/12/2012</a:t>
+              <a:t>13/02/2013</a:t>
             </a:fld>
             <a:endParaRPr lang="nl-BE">
               <a:solidFill>
@@ -1489,7 +1489,7 @@
                 </a:solidFill>
               </a:rPr>
               <a:pPr/>
-              <a:t>16/12/2012</a:t>
+              <a:t>13/02/2013</a:t>
             </a:fld>
             <a:endParaRPr lang="nl-BE">
               <a:solidFill>
@@ -1809,7 +1809,7 @@
                 </a:solidFill>
               </a:rPr>
               <a:pPr/>
-              <a:t>16/12/2012</a:t>
+              <a:t>13/02/2013</a:t>
             </a:fld>
             <a:endParaRPr lang="nl-BE">
               <a:solidFill>
@@ -2263,7 +2263,7 @@
                 </a:solidFill>
               </a:rPr>
               <a:pPr/>
-              <a:t>16/12/2012</a:t>
+              <a:t>13/02/2013</a:t>
             </a:fld>
             <a:endParaRPr lang="nl-BE">
               <a:solidFill>
@@ -2413,7 +2413,7 @@
                 </a:solidFill>
               </a:rPr>
               <a:pPr/>
-              <a:t>16/12/2012</a:t>
+              <a:t>13/02/2013</a:t>
             </a:fld>
             <a:endParaRPr lang="nl-BE">
               <a:solidFill>
@@ -2540,7 +2540,7 @@
                 </a:solidFill>
               </a:rPr>
               <a:pPr/>
-              <a:t>16/12/2012</a:t>
+              <a:t>13/02/2013</a:t>
             </a:fld>
             <a:endParaRPr lang="nl-BE">
               <a:solidFill>
@@ -2849,7 +2849,7 @@
                 </a:solidFill>
               </a:rPr>
               <a:pPr/>
-              <a:t>16/12/2012</a:t>
+              <a:t>13/02/2013</a:t>
             </a:fld>
             <a:endParaRPr lang="nl-BE">
               <a:solidFill>
@@ -3044,7 +3044,7 @@
           <a:p>
             <a:fld id="{F0AA596B-07FD-418F-9BC7-89A9D7D4BC61}" type="datetimeFigureOut">
               <a:rPr lang="en-GB" smtClean="0"/>
-              <a:t>16/12/2012</a:t>
+              <a:t>13/02/2013</a:t>
             </a:fld>
             <a:endParaRPr lang="en-GB"/>
           </a:p>
@@ -3308,7 +3308,7 @@
                 </a:solidFill>
               </a:rPr>
               <a:pPr/>
-              <a:t>16/12/2012</a:t>
+              <a:t>13/02/2013</a:t>
             </a:fld>
             <a:endParaRPr lang="nl-BE">
               <a:solidFill>
@@ -3510,7 +3510,7 @@
                 </a:solidFill>
               </a:rPr>
               <a:pPr/>
-              <a:t>16/12/2012</a:t>
+              <a:t>13/02/2013</a:t>
             </a:fld>
             <a:endParaRPr lang="nl-BE">
               <a:solidFill>
@@ -3722,7 +3722,7 @@
                 </a:solidFill>
               </a:rPr>
               <a:pPr/>
-              <a:t>16/12/2012</a:t>
+              <a:t>13/02/2013</a:t>
             </a:fld>
             <a:endParaRPr lang="nl-BE">
               <a:solidFill>
@@ -3993,7 +3993,7 @@
           <a:p>
             <a:fld id="{F0AA596B-07FD-418F-9BC7-89A9D7D4BC61}" type="datetimeFigureOut">
               <a:rPr lang="en-GB" smtClean="0"/>
-              <a:t>16/12/2012</a:t>
+              <a:t>13/02/2013</a:t>
             </a:fld>
             <a:endParaRPr lang="en-GB"/>
           </a:p>
@@ -4281,7 +4281,7 @@
           <a:p>
             <a:fld id="{F0AA596B-07FD-418F-9BC7-89A9D7D4BC61}" type="datetimeFigureOut">
               <a:rPr lang="en-GB" smtClean="0"/>
-              <a:t>16/12/2012</a:t>
+              <a:t>13/02/2013</a:t>
             </a:fld>
             <a:endParaRPr lang="en-GB"/>
           </a:p>
@@ -4703,7 +4703,7 @@
           <a:p>
             <a:fld id="{F0AA596B-07FD-418F-9BC7-89A9D7D4BC61}" type="datetimeFigureOut">
               <a:rPr lang="en-GB" smtClean="0"/>
-              <a:t>16/12/2012</a:t>
+              <a:t>13/02/2013</a:t>
             </a:fld>
             <a:endParaRPr lang="en-GB"/>
           </a:p>
@@ -4821,7 +4821,7 @@
           <a:p>
             <a:fld id="{F0AA596B-07FD-418F-9BC7-89A9D7D4BC61}" type="datetimeFigureOut">
               <a:rPr lang="en-GB" smtClean="0"/>
-              <a:t>16/12/2012</a:t>
+              <a:t>13/02/2013</a:t>
             </a:fld>
             <a:endParaRPr lang="en-GB"/>
           </a:p>
@@ -4916,7 +4916,7 @@
           <a:p>
             <a:fld id="{F0AA596B-07FD-418F-9BC7-89A9D7D4BC61}" type="datetimeFigureOut">
               <a:rPr lang="en-GB" smtClean="0"/>
-              <a:t>16/12/2012</a:t>
+              <a:t>13/02/2013</a:t>
             </a:fld>
             <a:endParaRPr lang="en-GB"/>
           </a:p>
@@ -5193,7 +5193,7 @@
           <a:p>
             <a:fld id="{F0AA596B-07FD-418F-9BC7-89A9D7D4BC61}" type="datetimeFigureOut">
               <a:rPr lang="en-GB" smtClean="0"/>
-              <a:t>16/12/2012</a:t>
+              <a:t>13/02/2013</a:t>
             </a:fld>
             <a:endParaRPr lang="en-GB"/>
           </a:p>
@@ -5446,7 +5446,7 @@
           <a:p>
             <a:fld id="{F0AA596B-07FD-418F-9BC7-89A9D7D4BC61}" type="datetimeFigureOut">
               <a:rPr lang="en-GB" smtClean="0"/>
-              <a:t>16/12/2012</a:t>
+              <a:t>13/02/2013</a:t>
             </a:fld>
             <a:endParaRPr lang="en-GB"/>
           </a:p>
@@ -5659,7 +5659,7 @@
           <a:p>
             <a:fld id="{F0AA596B-07FD-418F-9BC7-89A9D7D4BC61}" type="datetimeFigureOut">
               <a:rPr lang="en-GB" smtClean="0"/>
-              <a:t>16/12/2012</a:t>
+              <a:t>13/02/2013</a:t>
             </a:fld>
             <a:endParaRPr lang="en-GB"/>
           </a:p>
@@ -6186,7 +6186,7 @@
                 </a:solidFill>
               </a:rPr>
               <a:pPr/>
-              <a:t>16/12/2012</a:t>
+              <a:t>13/02/2013</a:t>
             </a:fld>
             <a:endParaRPr lang="nl-BE">
               <a:solidFill>
@@ -9431,7 +9431,7 @@
               <a:schemeClr val="tx1"/>
             </a:solidFill>
             <a:headEnd type="arrow" w="med" len="med"/>
-            <a:tailEnd type="arrow" w="med" len="med"/>
+            <a:tailEnd type="none" w="med" len="med"/>
           </a:ln>
         </p:spPr>
         <p:style>
@@ -10069,7 +10069,7 @@
         </p:nvSpPr>
         <p:spPr>
           <a:xfrm>
-            <a:off x="1988504" y="2378100"/>
+            <a:off x="5689467" y="2796168"/>
             <a:ext cx="421064" cy="369332"/>
           </a:xfrm>
           <a:prstGeom prst="rect">
@@ -10101,7 +10101,7 @@
         </p:nvSpPr>
         <p:spPr>
           <a:xfrm>
-            <a:off x="1988504" y="3662608"/>
+            <a:off x="5689467" y="3701735"/>
             <a:ext cx="421064" cy="369332"/>
           </a:xfrm>
           <a:prstGeom prst="rect">
@@ -10127,45 +10127,13 @@
       </p:sp>
       <p:sp>
         <p:nvSpPr>
-          <p:cNvPr id="71" name="TextBox 70"/>
-          <p:cNvSpPr txBox="1"/>
-          <p:nvPr/>
-        </p:nvSpPr>
-        <p:spPr>
-          <a:xfrm>
-            <a:off x="1990696" y="4770276"/>
-            <a:ext cx="421064" cy="369332"/>
-          </a:xfrm>
-          <a:prstGeom prst="rect">
-            <a:avLst/>
-          </a:prstGeom>
-          <a:noFill/>
-        </p:spPr>
-        <p:txBody>
-          <a:bodyPr wrap="square" rtlCol="0">
-            <a:spAutoFit/>
-          </a:bodyPr>
-          <a:lstStyle/>
-          <a:p>
-            <a:r>
-              <a:rPr lang="en-GB" dirty="0" smtClean="0">
-                <a:sym typeface="Wingdings"/>
-              </a:rPr>
-              <a:t></a:t>
-            </a:r>
-            <a:endParaRPr lang="en-GB" dirty="0"/>
-          </a:p>
-        </p:txBody>
-      </p:sp>
-      <p:sp>
-        <p:nvSpPr>
           <p:cNvPr id="40" name="Rectangle 39"/>
           <p:cNvSpPr/>
           <p:nvPr/>
         </p:nvSpPr>
         <p:spPr>
           <a:xfrm>
-            <a:off x="1995534" y="5193532"/>
+            <a:off x="5713061" y="5243564"/>
             <a:ext cx="389850" cy="369332"/>
           </a:xfrm>
           <a:prstGeom prst="rect">
@@ -10329,6 +10297,38 @@
           </a:fontRef>
         </p:style>
       </p:cxnSp>
+      <p:sp>
+        <p:nvSpPr>
+          <p:cNvPr id="71" name="TextBox 70"/>
+          <p:cNvSpPr txBox="1"/>
+          <p:nvPr/>
+        </p:nvSpPr>
+        <p:spPr>
+          <a:xfrm>
+            <a:off x="4510976" y="2813395"/>
+            <a:ext cx="421064" cy="369332"/>
+          </a:xfrm>
+          <a:prstGeom prst="rect">
+            <a:avLst/>
+          </a:prstGeom>
+          <a:noFill/>
+        </p:spPr>
+        <p:txBody>
+          <a:bodyPr wrap="square" rtlCol="0">
+            <a:spAutoFit/>
+          </a:bodyPr>
+          <a:lstStyle/>
+          <a:p>
+            <a:r>
+              <a:rPr lang="en-GB" dirty="0" smtClean="0">
+                <a:sym typeface="Wingdings"/>
+              </a:rPr>
+              <a:t></a:t>
+            </a:r>
+            <a:endParaRPr lang="en-GB" dirty="0"/>
+          </a:p>
+        </p:txBody>
+      </p:sp>
     </p:spTree>
     <p:extLst>
       <p:ext uri="{BB962C8B-B14F-4D97-AF65-F5344CB8AC3E}">

</xml_diff>

<commit_message>
Updated images following FIAT IFTA conference submission.
</commit_message>
<xml_diff>
--- a/doc/EBU MXF SDK - EBUCore - images.pptx
+++ b/doc/EBU MXF SDK - EBUCore - images.pptx
@@ -10,8 +10,9 @@
     <p:sldId id="257" r:id="rId4"/>
     <p:sldId id="261" r:id="rId5"/>
     <p:sldId id="258" r:id="rId6"/>
-    <p:sldId id="260" r:id="rId7"/>
-    <p:sldId id="259" r:id="rId8"/>
+    <p:sldId id="262" r:id="rId7"/>
+    <p:sldId id="260" r:id="rId8"/>
+    <p:sldId id="259" r:id="rId9"/>
   </p:sldIdLst>
   <p:sldSz cx="9144000" cy="6858000" type="screen4x3"/>
   <p:notesSz cx="6858000" cy="9144000"/>
@@ -294,7 +295,7 @@
           <a:p>
             <a:fld id="{F0AA596B-07FD-418F-9BC7-89A9D7D4BC61}" type="datetimeFigureOut">
               <a:rPr lang="en-GB" smtClean="0"/>
-              <a:t>13/02/2013</a:t>
+              <a:t>10/07/2013</a:t>
             </a:fld>
             <a:endParaRPr lang="en-GB"/>
           </a:p>
@@ -464,7 +465,7 @@
           <a:p>
             <a:fld id="{F0AA596B-07FD-418F-9BC7-89A9D7D4BC61}" type="datetimeFigureOut">
               <a:rPr lang="en-GB" smtClean="0"/>
-              <a:t>13/02/2013</a:t>
+              <a:t>10/07/2013</a:t>
             </a:fld>
             <a:endParaRPr lang="en-GB"/>
           </a:p>
@@ -644,7 +645,7 @@
           <a:p>
             <a:fld id="{F0AA596B-07FD-418F-9BC7-89A9D7D4BC61}" type="datetimeFigureOut">
               <a:rPr lang="en-GB" smtClean="0"/>
-              <a:t>13/02/2013</a:t>
+              <a:t>10/07/2013</a:t>
             </a:fld>
             <a:endParaRPr lang="en-GB"/>
           </a:p>
@@ -913,7 +914,7 @@
                 </a:solidFill>
               </a:rPr>
               <a:pPr/>
-              <a:t>13/02/2013</a:t>
+              <a:t>10/07/2013</a:t>
             </a:fld>
             <a:endParaRPr lang="nl-BE">
               <a:solidFill>
@@ -1211,7 +1212,7 @@
                 </a:solidFill>
               </a:rPr>
               <a:pPr/>
-              <a:t>13/02/2013</a:t>
+              <a:t>10/07/2013</a:t>
             </a:fld>
             <a:endParaRPr lang="nl-BE">
               <a:solidFill>
@@ -1489,7 +1490,7 @@
                 </a:solidFill>
               </a:rPr>
               <a:pPr/>
-              <a:t>13/02/2013</a:t>
+              <a:t>10/07/2013</a:t>
             </a:fld>
             <a:endParaRPr lang="nl-BE">
               <a:solidFill>
@@ -1809,7 +1810,7 @@
                 </a:solidFill>
               </a:rPr>
               <a:pPr/>
-              <a:t>13/02/2013</a:t>
+              <a:t>10/07/2013</a:t>
             </a:fld>
             <a:endParaRPr lang="nl-BE">
               <a:solidFill>
@@ -2263,7 +2264,7 @@
                 </a:solidFill>
               </a:rPr>
               <a:pPr/>
-              <a:t>13/02/2013</a:t>
+              <a:t>10/07/2013</a:t>
             </a:fld>
             <a:endParaRPr lang="nl-BE">
               <a:solidFill>
@@ -2413,7 +2414,7 @@
                 </a:solidFill>
               </a:rPr>
               <a:pPr/>
-              <a:t>13/02/2013</a:t>
+              <a:t>10/07/2013</a:t>
             </a:fld>
             <a:endParaRPr lang="nl-BE">
               <a:solidFill>
@@ -2540,7 +2541,7 @@
                 </a:solidFill>
               </a:rPr>
               <a:pPr/>
-              <a:t>13/02/2013</a:t>
+              <a:t>10/07/2013</a:t>
             </a:fld>
             <a:endParaRPr lang="nl-BE">
               <a:solidFill>
@@ -2849,7 +2850,7 @@
                 </a:solidFill>
               </a:rPr>
               <a:pPr/>
-              <a:t>13/02/2013</a:t>
+              <a:t>10/07/2013</a:t>
             </a:fld>
             <a:endParaRPr lang="nl-BE">
               <a:solidFill>
@@ -3044,7 +3045,7 @@
           <a:p>
             <a:fld id="{F0AA596B-07FD-418F-9BC7-89A9D7D4BC61}" type="datetimeFigureOut">
               <a:rPr lang="en-GB" smtClean="0"/>
-              <a:t>13/02/2013</a:t>
+              <a:t>10/07/2013</a:t>
             </a:fld>
             <a:endParaRPr lang="en-GB"/>
           </a:p>
@@ -3308,7 +3309,7 @@
                 </a:solidFill>
               </a:rPr>
               <a:pPr/>
-              <a:t>13/02/2013</a:t>
+              <a:t>10/07/2013</a:t>
             </a:fld>
             <a:endParaRPr lang="nl-BE">
               <a:solidFill>
@@ -3510,7 +3511,7 @@
                 </a:solidFill>
               </a:rPr>
               <a:pPr/>
-              <a:t>13/02/2013</a:t>
+              <a:t>10/07/2013</a:t>
             </a:fld>
             <a:endParaRPr lang="nl-BE">
               <a:solidFill>
@@ -3722,7 +3723,7 @@
                 </a:solidFill>
               </a:rPr>
               <a:pPr/>
-              <a:t>13/02/2013</a:t>
+              <a:t>10/07/2013</a:t>
             </a:fld>
             <a:endParaRPr lang="nl-BE">
               <a:solidFill>
@@ -3993,7 +3994,7 @@
           <a:p>
             <a:fld id="{F0AA596B-07FD-418F-9BC7-89A9D7D4BC61}" type="datetimeFigureOut">
               <a:rPr lang="en-GB" smtClean="0"/>
-              <a:t>13/02/2013</a:t>
+              <a:t>10/07/2013</a:t>
             </a:fld>
             <a:endParaRPr lang="en-GB"/>
           </a:p>
@@ -4281,7 +4282,7 @@
           <a:p>
             <a:fld id="{F0AA596B-07FD-418F-9BC7-89A9D7D4BC61}" type="datetimeFigureOut">
               <a:rPr lang="en-GB" smtClean="0"/>
-              <a:t>13/02/2013</a:t>
+              <a:t>10/07/2013</a:t>
             </a:fld>
             <a:endParaRPr lang="en-GB"/>
           </a:p>
@@ -4703,7 +4704,7 @@
           <a:p>
             <a:fld id="{F0AA596B-07FD-418F-9BC7-89A9D7D4BC61}" type="datetimeFigureOut">
               <a:rPr lang="en-GB" smtClean="0"/>
-              <a:t>13/02/2013</a:t>
+              <a:t>10/07/2013</a:t>
             </a:fld>
             <a:endParaRPr lang="en-GB"/>
           </a:p>
@@ -4821,7 +4822,7 @@
           <a:p>
             <a:fld id="{F0AA596B-07FD-418F-9BC7-89A9D7D4BC61}" type="datetimeFigureOut">
               <a:rPr lang="en-GB" smtClean="0"/>
-              <a:t>13/02/2013</a:t>
+              <a:t>10/07/2013</a:t>
             </a:fld>
             <a:endParaRPr lang="en-GB"/>
           </a:p>
@@ -4916,7 +4917,7 @@
           <a:p>
             <a:fld id="{F0AA596B-07FD-418F-9BC7-89A9D7D4BC61}" type="datetimeFigureOut">
               <a:rPr lang="en-GB" smtClean="0"/>
-              <a:t>13/02/2013</a:t>
+              <a:t>10/07/2013</a:t>
             </a:fld>
             <a:endParaRPr lang="en-GB"/>
           </a:p>
@@ -5193,7 +5194,7 @@
           <a:p>
             <a:fld id="{F0AA596B-07FD-418F-9BC7-89A9D7D4BC61}" type="datetimeFigureOut">
               <a:rPr lang="en-GB" smtClean="0"/>
-              <a:t>13/02/2013</a:t>
+              <a:t>10/07/2013</a:t>
             </a:fld>
             <a:endParaRPr lang="en-GB"/>
           </a:p>
@@ -5446,7 +5447,7 @@
           <a:p>
             <a:fld id="{F0AA596B-07FD-418F-9BC7-89A9D7D4BC61}" type="datetimeFigureOut">
               <a:rPr lang="en-GB" smtClean="0"/>
-              <a:t>13/02/2013</a:t>
+              <a:t>10/07/2013</a:t>
             </a:fld>
             <a:endParaRPr lang="en-GB"/>
           </a:p>
@@ -5659,7 +5660,7 @@
           <a:p>
             <a:fld id="{F0AA596B-07FD-418F-9BC7-89A9D7D4BC61}" type="datetimeFigureOut">
               <a:rPr lang="en-GB" smtClean="0"/>
-              <a:t>13/02/2013</a:t>
+              <a:t>10/07/2013</a:t>
             </a:fld>
             <a:endParaRPr lang="en-GB"/>
           </a:p>
@@ -6186,7 +6187,7 @@
                 </a:solidFill>
               </a:rPr>
               <a:pPr/>
-              <a:t>13/02/2013</a:t>
+              <a:t>10/07/2013</a:t>
             </a:fld>
             <a:endParaRPr lang="nl-BE">
               <a:solidFill>
@@ -11326,6 +11327,737 @@
             <p:ph type="title"/>
           </p:nvPr>
         </p:nvSpPr>
+        <p:spPr/>
+        <p:txBody>
+          <a:bodyPr>
+            <a:normAutofit/>
+          </a:bodyPr>
+          <a:lstStyle/>
+          <a:p>
+            <a:endParaRPr lang="en-GB" dirty="0"/>
+          </a:p>
+        </p:txBody>
+      </p:sp>
+      <p:sp>
+        <p:nvSpPr>
+          <p:cNvPr id="58" name="Rectangle 57"/>
+          <p:cNvSpPr/>
+          <p:nvPr/>
+        </p:nvSpPr>
+        <p:spPr>
+          <a:xfrm>
+            <a:off x="4860032" y="3884439"/>
+            <a:ext cx="1361319" cy="1488777"/>
+          </a:xfrm>
+          <a:prstGeom prst="rect">
+            <a:avLst/>
+          </a:prstGeom>
+        </p:spPr>
+        <p:style>
+          <a:lnRef idx="1">
+            <a:schemeClr val="accent3"/>
+          </a:lnRef>
+          <a:fillRef idx="2">
+            <a:schemeClr val="accent3"/>
+          </a:fillRef>
+          <a:effectRef idx="1">
+            <a:schemeClr val="accent3"/>
+          </a:effectRef>
+          <a:fontRef idx="minor">
+            <a:schemeClr val="dk1"/>
+          </a:fontRef>
+        </p:style>
+        <p:txBody>
+          <a:bodyPr rtlCol="0" anchor="t"/>
+          <a:lstStyle/>
+          <a:p>
+            <a:pPr algn="ctr"/>
+            <a:r>
+              <a:rPr lang="nl-BE" sz="1200" dirty="0" smtClean="0">
+                <a:solidFill>
+                  <a:prstClr val="black"/>
+                </a:solidFill>
+              </a:rPr>
+              <a:t>BMX</a:t>
+            </a:r>
+            <a:endParaRPr lang="nl-BE" sz="1200" dirty="0">
+              <a:solidFill>
+                <a:prstClr val="black"/>
+              </a:solidFill>
+            </a:endParaRPr>
+          </a:p>
+        </p:txBody>
+      </p:sp>
+      <p:sp>
+        <p:nvSpPr>
+          <p:cNvPr id="57" name="Rectangle 56"/>
+          <p:cNvSpPr/>
+          <p:nvPr/>
+        </p:nvSpPr>
+        <p:spPr>
+          <a:xfrm>
+            <a:off x="1547662" y="3884438"/>
+            <a:ext cx="3312369" cy="1488777"/>
+          </a:xfrm>
+          <a:prstGeom prst="rect">
+            <a:avLst/>
+          </a:prstGeom>
+        </p:spPr>
+        <p:style>
+          <a:lnRef idx="1">
+            <a:schemeClr val="accent3"/>
+          </a:lnRef>
+          <a:fillRef idx="2">
+            <a:schemeClr val="accent3"/>
+          </a:fillRef>
+          <a:effectRef idx="1">
+            <a:schemeClr val="accent3"/>
+          </a:effectRef>
+          <a:fontRef idx="minor">
+            <a:schemeClr val="dk1"/>
+          </a:fontRef>
+        </p:style>
+        <p:txBody>
+          <a:bodyPr rtlCol="0" anchor="t"/>
+          <a:lstStyle/>
+          <a:p>
+            <a:pPr algn="ctr"/>
+            <a:r>
+              <a:rPr lang="nl-BE" sz="1200" dirty="0" smtClean="0">
+                <a:solidFill>
+                  <a:prstClr val="black"/>
+                </a:solidFill>
+              </a:rPr>
+              <a:t>EBU SDK</a:t>
+            </a:r>
+            <a:endParaRPr lang="nl-BE" sz="1200" dirty="0">
+              <a:solidFill>
+                <a:prstClr val="black"/>
+              </a:solidFill>
+            </a:endParaRPr>
+          </a:p>
+        </p:txBody>
+      </p:sp>
+      <p:sp>
+        <p:nvSpPr>
+          <p:cNvPr id="83" name="Rectangle 82"/>
+          <p:cNvSpPr/>
+          <p:nvPr/>
+        </p:nvSpPr>
+        <p:spPr>
+          <a:xfrm>
+            <a:off x="755576" y="4051257"/>
+            <a:ext cx="1367739" cy="349722"/>
+          </a:xfrm>
+          <a:prstGeom prst="rect">
+            <a:avLst/>
+          </a:prstGeom>
+        </p:spPr>
+        <p:style>
+          <a:lnRef idx="1">
+            <a:schemeClr val="accent3"/>
+          </a:lnRef>
+          <a:fillRef idx="2">
+            <a:schemeClr val="accent3"/>
+          </a:fillRef>
+          <a:effectRef idx="1">
+            <a:schemeClr val="accent3"/>
+          </a:effectRef>
+          <a:fontRef idx="minor">
+            <a:schemeClr val="dk1"/>
+          </a:fontRef>
+        </p:style>
+        <p:txBody>
+          <a:bodyPr rtlCol="0" anchor="ctr"/>
+          <a:lstStyle/>
+          <a:p>
+            <a:pPr algn="ctr"/>
+            <a:r>
+              <a:rPr lang="nl-BE" sz="1200" dirty="0" smtClean="0">
+                <a:solidFill>
+                  <a:prstClr val="black"/>
+                </a:solidFill>
+              </a:rPr>
+              <a:t>uriparser</a:t>
+            </a:r>
+            <a:endParaRPr lang="nl-BE" sz="1200" dirty="0">
+              <a:solidFill>
+                <a:prstClr val="black"/>
+              </a:solidFill>
+            </a:endParaRPr>
+          </a:p>
+        </p:txBody>
+      </p:sp>
+      <p:sp>
+        <p:nvSpPr>
+          <p:cNvPr id="84" name="Rectangle 83"/>
+          <p:cNvSpPr/>
+          <p:nvPr/>
+        </p:nvSpPr>
+        <p:spPr>
+          <a:xfrm>
+            <a:off x="755576" y="4474164"/>
+            <a:ext cx="1367739" cy="342038"/>
+          </a:xfrm>
+          <a:prstGeom prst="rect">
+            <a:avLst/>
+          </a:prstGeom>
+        </p:spPr>
+        <p:style>
+          <a:lnRef idx="1">
+            <a:schemeClr val="accent3"/>
+          </a:lnRef>
+          <a:fillRef idx="2">
+            <a:schemeClr val="accent3"/>
+          </a:fillRef>
+          <a:effectRef idx="1">
+            <a:schemeClr val="accent3"/>
+          </a:effectRef>
+          <a:fontRef idx="minor">
+            <a:schemeClr val="dk1"/>
+          </a:fontRef>
+        </p:style>
+        <p:txBody>
+          <a:bodyPr rtlCol="0" anchor="ctr"/>
+          <a:lstStyle/>
+          <a:p>
+            <a:pPr algn="ctr"/>
+            <a:r>
+              <a:rPr lang="nl-BE" sz="1200" dirty="0" smtClean="0">
+                <a:solidFill>
+                  <a:prstClr val="black"/>
+                </a:solidFill>
+              </a:rPr>
+              <a:t>Apache Xerces-C++</a:t>
+            </a:r>
+            <a:endParaRPr lang="nl-BE" sz="1200" dirty="0">
+              <a:solidFill>
+                <a:prstClr val="black"/>
+              </a:solidFill>
+            </a:endParaRPr>
+          </a:p>
+        </p:txBody>
+      </p:sp>
+      <p:sp>
+        <p:nvSpPr>
+          <p:cNvPr id="85" name="Rectangle 84"/>
+          <p:cNvSpPr/>
+          <p:nvPr/>
+        </p:nvSpPr>
+        <p:spPr>
+          <a:xfrm>
+            <a:off x="755576" y="4887162"/>
+            <a:ext cx="1367739" cy="342038"/>
+          </a:xfrm>
+          <a:prstGeom prst="rect">
+            <a:avLst/>
+          </a:prstGeom>
+        </p:spPr>
+        <p:style>
+          <a:lnRef idx="1">
+            <a:schemeClr val="accent3"/>
+          </a:lnRef>
+          <a:fillRef idx="2">
+            <a:schemeClr val="accent3"/>
+          </a:fillRef>
+          <a:effectRef idx="1">
+            <a:schemeClr val="accent3"/>
+          </a:effectRef>
+          <a:fontRef idx="minor">
+            <a:schemeClr val="dk1"/>
+          </a:fontRef>
+        </p:style>
+        <p:txBody>
+          <a:bodyPr rtlCol="0" anchor="ctr"/>
+          <a:lstStyle/>
+          <a:p>
+            <a:pPr algn="ctr"/>
+            <a:r>
+              <a:rPr lang="nl-BE" sz="1200" dirty="0" smtClean="0">
+                <a:solidFill>
+                  <a:prstClr val="black"/>
+                </a:solidFill>
+              </a:rPr>
+              <a:t>Codesynthesis XSD</a:t>
+            </a:r>
+            <a:endParaRPr lang="nl-BE" sz="1200" dirty="0">
+              <a:solidFill>
+                <a:prstClr val="black"/>
+              </a:solidFill>
+            </a:endParaRPr>
+          </a:p>
+        </p:txBody>
+      </p:sp>
+      <p:sp>
+        <p:nvSpPr>
+          <p:cNvPr id="54" name="Rectangle 53"/>
+          <p:cNvSpPr/>
+          <p:nvPr/>
+        </p:nvSpPr>
+        <p:spPr>
+          <a:xfrm>
+            <a:off x="1547663" y="5373216"/>
+            <a:ext cx="4680520" cy="936104"/>
+          </a:xfrm>
+          <a:prstGeom prst="rect">
+            <a:avLst/>
+          </a:prstGeom>
+        </p:spPr>
+        <p:style>
+          <a:lnRef idx="1">
+            <a:schemeClr val="accent3"/>
+          </a:lnRef>
+          <a:fillRef idx="2">
+            <a:schemeClr val="accent3"/>
+          </a:fillRef>
+          <a:effectRef idx="1">
+            <a:schemeClr val="accent3"/>
+          </a:effectRef>
+          <a:fontRef idx="minor">
+            <a:schemeClr val="dk1"/>
+          </a:fontRef>
+        </p:style>
+        <p:txBody>
+          <a:bodyPr rtlCol="0" anchor="b"/>
+          <a:lstStyle/>
+          <a:p>
+            <a:pPr algn="ctr"/>
+            <a:r>
+              <a:rPr lang="nl-BE" sz="1200" dirty="0" smtClean="0">
+                <a:solidFill>
+                  <a:prstClr val="black"/>
+                </a:solidFill>
+              </a:rPr>
+              <a:t>libMXF++</a:t>
+            </a:r>
+            <a:endParaRPr lang="nl-BE" sz="1200" dirty="0">
+              <a:solidFill>
+                <a:prstClr val="black"/>
+              </a:solidFill>
+            </a:endParaRPr>
+          </a:p>
+        </p:txBody>
+      </p:sp>
+      <p:sp>
+        <p:nvSpPr>
+          <p:cNvPr id="197" name="Rectangle 196"/>
+          <p:cNvSpPr/>
+          <p:nvPr/>
+        </p:nvSpPr>
+        <p:spPr>
+          <a:xfrm>
+            <a:off x="1685200" y="5517232"/>
+            <a:ext cx="4405446" cy="486054"/>
+          </a:xfrm>
+          <a:prstGeom prst="rect">
+            <a:avLst/>
+          </a:prstGeom>
+        </p:spPr>
+        <p:style>
+          <a:lnRef idx="1">
+            <a:schemeClr val="accent3"/>
+          </a:lnRef>
+          <a:fillRef idx="2">
+            <a:schemeClr val="accent3"/>
+          </a:fillRef>
+          <a:effectRef idx="1">
+            <a:schemeClr val="accent3"/>
+          </a:effectRef>
+          <a:fontRef idx="minor">
+            <a:schemeClr val="dk1"/>
+          </a:fontRef>
+        </p:style>
+        <p:txBody>
+          <a:bodyPr rtlCol="0" anchor="ctr"/>
+          <a:lstStyle/>
+          <a:p>
+            <a:pPr algn="ctr"/>
+            <a:r>
+              <a:rPr lang="nl-BE" sz="1200" dirty="0" smtClean="0">
+                <a:solidFill>
+                  <a:prstClr val="black"/>
+                </a:solidFill>
+              </a:rPr>
+              <a:t>libMXF</a:t>
+            </a:r>
+            <a:endParaRPr lang="nl-BE" sz="1200" dirty="0">
+              <a:solidFill>
+                <a:prstClr val="black"/>
+              </a:solidFill>
+            </a:endParaRPr>
+          </a:p>
+        </p:txBody>
+      </p:sp>
+      <p:sp>
+        <p:nvSpPr>
+          <p:cNvPr id="70" name="Rectangle 69"/>
+          <p:cNvSpPr/>
+          <p:nvPr/>
+        </p:nvSpPr>
+        <p:spPr>
+          <a:xfrm>
+            <a:off x="3908899" y="4231136"/>
+            <a:ext cx="807117" cy="1070071"/>
+          </a:xfrm>
+          <a:prstGeom prst="rect">
+            <a:avLst/>
+          </a:prstGeom>
+          <a:gradFill>
+            <a:gsLst>
+              <a:gs pos="0">
+                <a:srgbClr val="FFC000"/>
+              </a:gs>
+              <a:gs pos="35000">
+                <a:srgbClr val="FFC000"/>
+              </a:gs>
+              <a:gs pos="100000">
+                <a:schemeClr val="accent3">
+                  <a:tint val="15000"/>
+                  <a:satMod val="350000"/>
+                </a:schemeClr>
+              </a:gs>
+            </a:gsLst>
+          </a:gradFill>
+        </p:spPr>
+        <p:style>
+          <a:lnRef idx="1">
+            <a:schemeClr val="accent3"/>
+          </a:lnRef>
+          <a:fillRef idx="2">
+            <a:schemeClr val="accent3"/>
+          </a:fillRef>
+          <a:effectRef idx="1">
+            <a:schemeClr val="accent3"/>
+          </a:effectRef>
+          <a:fontRef idx="minor">
+            <a:schemeClr val="dk1"/>
+          </a:fontRef>
+        </p:style>
+        <p:txBody>
+          <a:bodyPr rtlCol="0" anchor="ctr"/>
+          <a:lstStyle/>
+          <a:p>
+            <a:pPr algn="ctr"/>
+            <a:r>
+              <a:rPr lang="nl-BE" sz="1200" dirty="0" smtClean="0">
+                <a:solidFill>
+                  <a:prstClr val="black"/>
+                </a:solidFill>
+              </a:rPr>
+              <a:t>ST-434</a:t>
+            </a:r>
+          </a:p>
+          <a:p>
+            <a:pPr algn="ctr"/>
+            <a:r>
+              <a:rPr lang="nl-BE" sz="1200" dirty="0" smtClean="0">
+                <a:solidFill>
+                  <a:prstClr val="black"/>
+                </a:solidFill>
+              </a:rPr>
+              <a:t>Analyzer</a:t>
+            </a:r>
+            <a:endParaRPr lang="nl-BE" sz="1200" dirty="0">
+              <a:solidFill>
+                <a:prstClr val="black"/>
+              </a:solidFill>
+            </a:endParaRPr>
+          </a:p>
+        </p:txBody>
+      </p:sp>
+      <p:sp>
+        <p:nvSpPr>
+          <p:cNvPr id="71" name="Rectangle 70"/>
+          <p:cNvSpPr/>
+          <p:nvPr/>
+        </p:nvSpPr>
+        <p:spPr>
+          <a:xfrm>
+            <a:off x="2420761" y="4879508"/>
+            <a:ext cx="1359151" cy="421700"/>
+          </a:xfrm>
+          <a:prstGeom prst="rect">
+            <a:avLst/>
+          </a:prstGeom>
+          <a:gradFill>
+            <a:gsLst>
+              <a:gs pos="0">
+                <a:srgbClr val="FFC000"/>
+              </a:gs>
+              <a:gs pos="35000">
+                <a:srgbClr val="FFC000"/>
+              </a:gs>
+              <a:gs pos="100000">
+                <a:schemeClr val="accent3">
+                  <a:tint val="15000"/>
+                  <a:satMod val="350000"/>
+                </a:schemeClr>
+              </a:gs>
+            </a:gsLst>
+          </a:gradFill>
+        </p:spPr>
+        <p:style>
+          <a:lnRef idx="1">
+            <a:schemeClr val="accent3"/>
+          </a:lnRef>
+          <a:fillRef idx="2">
+            <a:schemeClr val="accent3"/>
+          </a:fillRef>
+          <a:effectRef idx="1">
+            <a:schemeClr val="accent3"/>
+          </a:effectRef>
+          <a:fontRef idx="minor">
+            <a:schemeClr val="dk1"/>
+          </a:fontRef>
+        </p:style>
+        <p:txBody>
+          <a:bodyPr rtlCol="0" anchor="ctr"/>
+          <a:lstStyle/>
+          <a:p>
+            <a:pPr algn="ctr"/>
+            <a:r>
+              <a:rPr lang="nl-BE" sz="1200" dirty="0" smtClean="0">
+                <a:solidFill>
+                  <a:prstClr val="black"/>
+                </a:solidFill>
+              </a:rPr>
+              <a:t>CustomMetadata</a:t>
+            </a:r>
+            <a:endParaRPr lang="nl-BE" sz="1200" dirty="0">
+              <a:solidFill>
+                <a:prstClr val="black"/>
+              </a:solidFill>
+            </a:endParaRPr>
+          </a:p>
+        </p:txBody>
+      </p:sp>
+      <p:sp>
+        <p:nvSpPr>
+          <p:cNvPr id="74" name="Rectangle 73"/>
+          <p:cNvSpPr/>
+          <p:nvPr/>
+        </p:nvSpPr>
+        <p:spPr>
+          <a:xfrm>
+            <a:off x="2415825" y="4231136"/>
+            <a:ext cx="1364087" cy="608542"/>
+          </a:xfrm>
+          <a:prstGeom prst="rect">
+            <a:avLst/>
+          </a:prstGeom>
+          <a:gradFill>
+            <a:gsLst>
+              <a:gs pos="0">
+                <a:srgbClr val="FFC000"/>
+              </a:gs>
+              <a:gs pos="35000">
+                <a:srgbClr val="FFC000"/>
+              </a:gs>
+              <a:gs pos="100000">
+                <a:schemeClr val="accent3">
+                  <a:tint val="15000"/>
+                  <a:satMod val="350000"/>
+                </a:schemeClr>
+              </a:gs>
+            </a:gsLst>
+          </a:gradFill>
+        </p:spPr>
+        <p:style>
+          <a:lnRef idx="1">
+            <a:schemeClr val="accent3"/>
+          </a:lnRef>
+          <a:fillRef idx="2">
+            <a:schemeClr val="accent3"/>
+          </a:fillRef>
+          <a:effectRef idx="1">
+            <a:schemeClr val="accent3"/>
+          </a:effectRef>
+          <a:fontRef idx="minor">
+            <a:schemeClr val="dk1"/>
+          </a:fontRef>
+        </p:style>
+        <p:txBody>
+          <a:bodyPr rtlCol="0" anchor="ctr"/>
+          <a:lstStyle/>
+          <a:p>
+            <a:pPr algn="ctr"/>
+            <a:r>
+              <a:rPr lang="nl-BE" sz="1200" dirty="0" smtClean="0">
+                <a:solidFill>
+                  <a:prstClr val="black"/>
+                </a:solidFill>
+              </a:rPr>
+              <a:t>EBUCore Support</a:t>
+            </a:r>
+            <a:endParaRPr lang="nl-BE" sz="1200" dirty="0">
+              <a:solidFill>
+                <a:prstClr val="black"/>
+              </a:solidFill>
+            </a:endParaRPr>
+          </a:p>
+        </p:txBody>
+      </p:sp>
+      <p:sp>
+        <p:nvSpPr>
+          <p:cNvPr id="78" name="Rectangle 77"/>
+          <p:cNvSpPr/>
+          <p:nvPr/>
+        </p:nvSpPr>
+        <p:spPr>
+          <a:xfrm>
+            <a:off x="5053196" y="4255445"/>
+            <a:ext cx="434413" cy="1045763"/>
+          </a:xfrm>
+          <a:prstGeom prst="rect">
+            <a:avLst/>
+          </a:prstGeom>
+        </p:spPr>
+        <p:style>
+          <a:lnRef idx="1">
+            <a:schemeClr val="accent3"/>
+          </a:lnRef>
+          <a:fillRef idx="2">
+            <a:schemeClr val="accent3"/>
+          </a:fillRef>
+          <a:effectRef idx="1">
+            <a:schemeClr val="accent3"/>
+          </a:effectRef>
+          <a:fontRef idx="minor">
+            <a:schemeClr val="dk1"/>
+          </a:fontRef>
+        </p:style>
+        <p:txBody>
+          <a:bodyPr rtlCol="0" anchor="ctr"/>
+          <a:lstStyle/>
+          <a:p>
+            <a:pPr algn="ctr"/>
+            <a:r>
+              <a:rPr lang="nl-BE" sz="1200" dirty="0" smtClean="0">
+                <a:solidFill>
+                  <a:prstClr val="black"/>
+                </a:solidFill>
+              </a:rPr>
+              <a:t>AS-11</a:t>
+            </a:r>
+          </a:p>
+        </p:txBody>
+      </p:sp>
+      <p:sp>
+        <p:nvSpPr>
+          <p:cNvPr id="79" name="Rectangle 78"/>
+          <p:cNvSpPr/>
+          <p:nvPr/>
+        </p:nvSpPr>
+        <p:spPr>
+          <a:xfrm>
+            <a:off x="5625536" y="4255445"/>
+            <a:ext cx="434413" cy="1045763"/>
+          </a:xfrm>
+          <a:prstGeom prst="rect">
+            <a:avLst/>
+          </a:prstGeom>
+        </p:spPr>
+        <p:style>
+          <a:lnRef idx="1">
+            <a:schemeClr val="accent3"/>
+          </a:lnRef>
+          <a:fillRef idx="2">
+            <a:schemeClr val="accent3"/>
+          </a:fillRef>
+          <a:effectRef idx="1">
+            <a:schemeClr val="accent3"/>
+          </a:effectRef>
+          <a:fontRef idx="minor">
+            <a:schemeClr val="dk1"/>
+          </a:fontRef>
+        </p:style>
+        <p:txBody>
+          <a:bodyPr rtlCol="0" anchor="ctr"/>
+          <a:lstStyle/>
+          <a:p>
+            <a:pPr algn="ctr"/>
+            <a:r>
+              <a:rPr lang="nl-BE" sz="1200" dirty="0" smtClean="0">
+                <a:solidFill>
+                  <a:prstClr val="black"/>
+                </a:solidFill>
+              </a:rPr>
+              <a:t>AS-02</a:t>
+            </a:r>
+          </a:p>
+        </p:txBody>
+      </p:sp>
+    </p:spTree>
+    <p:extLst>
+      <p:ext uri="{BB962C8B-B14F-4D97-AF65-F5344CB8AC3E}">
+        <p14:creationId xmlns:p14="http://schemas.microsoft.com/office/powerpoint/2010/main" val="1383907670"/>
+      </p:ext>
+    </p:extLst>
+  </p:cSld>
+  <p:clrMapOvr>
+    <a:masterClrMapping/>
+  </p:clrMapOvr>
+  <p:timing>
+    <p:tnLst>
+      <p:par>
+        <p:cTn id="1" dur="indefinite" restart="never" nodeType="tmRoot"/>
+      </p:par>
+    </p:tnLst>
+  </p:timing>
+</p:sld>
+</file>
+
+<file path=ppt/slides/slide6.xml><?xml version="1.0" encoding="utf-8"?>
+<p:sld xmlns:a="http://schemas.openxmlformats.org/drawingml/2006/main" xmlns:r="http://schemas.openxmlformats.org/officeDocument/2006/relationships" xmlns:p="http://schemas.openxmlformats.org/presentationml/2006/main">
+  <p:cSld>
+    <p:spTree>
+      <p:nvGrpSpPr>
+        <p:cNvPr id="1" name=""/>
+        <p:cNvGrpSpPr/>
+        <p:nvPr/>
+      </p:nvGrpSpPr>
+      <p:grpSpPr>
+        <a:xfrm>
+          <a:off x="0" y="0"/>
+          <a:ext cx="0" cy="0"/>
+          <a:chOff x="0" y="0"/>
+          <a:chExt cx="0" cy="0"/>
+        </a:xfrm>
+      </p:grpSpPr>
+      <p:sp>
+        <p:nvSpPr>
+          <p:cNvPr id="3" name="Content Placeholder 2"/>
+          <p:cNvSpPr>
+            <a:spLocks noGrp="1"/>
+          </p:cNvSpPr>
+          <p:nvPr>
+            <p:ph idx="1"/>
+          </p:nvPr>
+        </p:nvSpPr>
+        <p:spPr>
+          <a:xfrm>
+            <a:off x="467544" y="1500534"/>
+            <a:ext cx="8229600" cy="4525963"/>
+          </a:xfrm>
+        </p:spPr>
+        <p:txBody>
+          <a:bodyPr/>
+          <a:lstStyle/>
+          <a:p>
+            <a:endParaRPr lang="en-US" dirty="0" smtClean="0"/>
+          </a:p>
+        </p:txBody>
+      </p:sp>
+      <p:sp>
+        <p:nvSpPr>
+          <p:cNvPr id="2" name="Title 1"/>
+          <p:cNvSpPr>
+            <a:spLocks noGrp="1"/>
+          </p:cNvSpPr>
+          <p:nvPr>
+            <p:ph type="title"/>
+          </p:nvPr>
+        </p:nvSpPr>
         <p:spPr>
           <a:xfrm>
             <a:off x="238207" y="49188"/>
@@ -12003,7 +12735,7 @@
 </p:sld>
 </file>
 
-<file path=ppt/slides/slide6.xml><?xml version="1.0" encoding="utf-8"?>
+<file path=ppt/slides/slide7.xml><?xml version="1.0" encoding="utf-8"?>
 <p:sld xmlns:a="http://schemas.openxmlformats.org/drawingml/2006/main" xmlns:r="http://schemas.openxmlformats.org/officeDocument/2006/relationships" xmlns:p="http://schemas.openxmlformats.org/presentationml/2006/main">
   <p:cSld>
     <p:spTree>

</xml_diff>